<commit_message>
Apresentação com content sharing
</commit_message>
<xml_diff>
--- a/_Presentation/apresentacao.pptx
+++ b/_Presentation/apresentacao.pptx
@@ -323,6 +323,7 @@
           <a:p>
             <a:fld id="{42D09E55-3BF8-45D5-80BD-5A745629D33A}" type="datetimeFigureOut">
               <a:rPr lang="pt-BR" smtClean="0"/>
+              <a:pPr/>
               <a:t>25/10/2015</a:t>
             </a:fld>
             <a:endParaRPr lang="pt-BR"/>
@@ -365,7 +366,8 @@
           <a:p>
             <a:fld id="{E650F5AF-5A7A-4DEE-952A-AB5DF242B9CD}" type="slidenum">
               <a:rPr lang="pt-BR" smtClean="0"/>
-              <a:t>‹#›</a:t>
+              <a:pPr/>
+              <a:t>‹nº›</a:t>
             </a:fld>
             <a:endParaRPr lang="pt-BR"/>
           </a:p>
@@ -374,7 +376,7 @@
     </p:spTree>
     <p:extLst>
       <p:ext uri="{BB962C8B-B14F-4D97-AF65-F5344CB8AC3E}">
-        <p14:creationId xmlns:p14="http://schemas.microsoft.com/office/powerpoint/2010/main" val="1871700233"/>
+        <p14:creationId xmlns:p14="http://schemas.microsoft.com/office/powerpoint/2010/main" xmlns="" val="1871700233"/>
       </p:ext>
     </p:extLst>
   </p:cSld>
@@ -493,6 +495,7 @@
           <a:p>
             <a:fld id="{42D09E55-3BF8-45D5-80BD-5A745629D33A}" type="datetimeFigureOut">
               <a:rPr lang="pt-BR" smtClean="0"/>
+              <a:pPr/>
               <a:t>25/10/2015</a:t>
             </a:fld>
             <a:endParaRPr lang="pt-BR"/>
@@ -535,7 +538,8 @@
           <a:p>
             <a:fld id="{E650F5AF-5A7A-4DEE-952A-AB5DF242B9CD}" type="slidenum">
               <a:rPr lang="pt-BR" smtClean="0"/>
-              <a:t>‹#›</a:t>
+              <a:pPr/>
+              <a:t>‹nº›</a:t>
             </a:fld>
             <a:endParaRPr lang="pt-BR"/>
           </a:p>
@@ -544,7 +548,7 @@
     </p:spTree>
     <p:extLst>
       <p:ext uri="{BB962C8B-B14F-4D97-AF65-F5344CB8AC3E}">
-        <p14:creationId xmlns:p14="http://schemas.microsoft.com/office/powerpoint/2010/main" val="3922913854"/>
+        <p14:creationId xmlns:p14="http://schemas.microsoft.com/office/powerpoint/2010/main" xmlns="" val="3922913854"/>
       </p:ext>
     </p:extLst>
   </p:cSld>
@@ -673,6 +677,7 @@
           <a:p>
             <a:fld id="{42D09E55-3BF8-45D5-80BD-5A745629D33A}" type="datetimeFigureOut">
               <a:rPr lang="pt-BR" smtClean="0"/>
+              <a:pPr/>
               <a:t>25/10/2015</a:t>
             </a:fld>
             <a:endParaRPr lang="pt-BR"/>
@@ -715,7 +720,8 @@
           <a:p>
             <a:fld id="{E650F5AF-5A7A-4DEE-952A-AB5DF242B9CD}" type="slidenum">
               <a:rPr lang="pt-BR" smtClean="0"/>
-              <a:t>‹#›</a:t>
+              <a:pPr/>
+              <a:t>‹nº›</a:t>
             </a:fld>
             <a:endParaRPr lang="pt-BR"/>
           </a:p>
@@ -724,7 +730,7 @@
     </p:spTree>
     <p:extLst>
       <p:ext uri="{BB962C8B-B14F-4D97-AF65-F5344CB8AC3E}">
-        <p14:creationId xmlns:p14="http://schemas.microsoft.com/office/powerpoint/2010/main" val="2432475685"/>
+        <p14:creationId xmlns:p14="http://schemas.microsoft.com/office/powerpoint/2010/main" xmlns="" val="2432475685"/>
       </p:ext>
     </p:extLst>
   </p:cSld>
@@ -843,6 +849,7 @@
           <a:p>
             <a:fld id="{42D09E55-3BF8-45D5-80BD-5A745629D33A}" type="datetimeFigureOut">
               <a:rPr lang="pt-BR" smtClean="0"/>
+              <a:pPr/>
               <a:t>25/10/2015</a:t>
             </a:fld>
             <a:endParaRPr lang="pt-BR"/>
@@ -885,7 +892,8 @@
           <a:p>
             <a:fld id="{E650F5AF-5A7A-4DEE-952A-AB5DF242B9CD}" type="slidenum">
               <a:rPr lang="pt-BR" smtClean="0"/>
-              <a:t>‹#›</a:t>
+              <a:pPr/>
+              <a:t>‹nº›</a:t>
             </a:fld>
             <a:endParaRPr lang="pt-BR"/>
           </a:p>
@@ -894,7 +902,7 @@
     </p:spTree>
     <p:extLst>
       <p:ext uri="{BB962C8B-B14F-4D97-AF65-F5344CB8AC3E}">
-        <p14:creationId xmlns:p14="http://schemas.microsoft.com/office/powerpoint/2010/main" val="2071654542"/>
+        <p14:creationId xmlns:p14="http://schemas.microsoft.com/office/powerpoint/2010/main" xmlns="" val="2071654542"/>
       </p:ext>
     </p:extLst>
   </p:cSld>
@@ -1089,6 +1097,7 @@
           <a:p>
             <a:fld id="{42D09E55-3BF8-45D5-80BD-5A745629D33A}" type="datetimeFigureOut">
               <a:rPr lang="pt-BR" smtClean="0"/>
+              <a:pPr/>
               <a:t>25/10/2015</a:t>
             </a:fld>
             <a:endParaRPr lang="pt-BR"/>
@@ -1131,7 +1140,8 @@
           <a:p>
             <a:fld id="{E650F5AF-5A7A-4DEE-952A-AB5DF242B9CD}" type="slidenum">
               <a:rPr lang="pt-BR" smtClean="0"/>
-              <a:t>‹#›</a:t>
+              <a:pPr/>
+              <a:t>‹nº›</a:t>
             </a:fld>
             <a:endParaRPr lang="pt-BR"/>
           </a:p>
@@ -1140,7 +1150,7 @@
     </p:spTree>
     <p:extLst>
       <p:ext uri="{BB962C8B-B14F-4D97-AF65-F5344CB8AC3E}">
-        <p14:creationId xmlns:p14="http://schemas.microsoft.com/office/powerpoint/2010/main" val="236866593"/>
+        <p14:creationId xmlns:p14="http://schemas.microsoft.com/office/powerpoint/2010/main" xmlns="" val="236866593"/>
       </p:ext>
     </p:extLst>
   </p:cSld>
@@ -1377,6 +1387,7 @@
           <a:p>
             <a:fld id="{42D09E55-3BF8-45D5-80BD-5A745629D33A}" type="datetimeFigureOut">
               <a:rPr lang="pt-BR" smtClean="0"/>
+              <a:pPr/>
               <a:t>25/10/2015</a:t>
             </a:fld>
             <a:endParaRPr lang="pt-BR"/>
@@ -1419,7 +1430,8 @@
           <a:p>
             <a:fld id="{E650F5AF-5A7A-4DEE-952A-AB5DF242B9CD}" type="slidenum">
               <a:rPr lang="pt-BR" smtClean="0"/>
-              <a:t>‹#›</a:t>
+              <a:pPr/>
+              <a:t>‹nº›</a:t>
             </a:fld>
             <a:endParaRPr lang="pt-BR"/>
           </a:p>
@@ -1428,7 +1440,7 @@
     </p:spTree>
     <p:extLst>
       <p:ext uri="{BB962C8B-B14F-4D97-AF65-F5344CB8AC3E}">
-        <p14:creationId xmlns:p14="http://schemas.microsoft.com/office/powerpoint/2010/main" val="220780165"/>
+        <p14:creationId xmlns:p14="http://schemas.microsoft.com/office/powerpoint/2010/main" xmlns="" val="220780165"/>
       </p:ext>
     </p:extLst>
   </p:cSld>
@@ -1799,6 +1811,7 @@
           <a:p>
             <a:fld id="{42D09E55-3BF8-45D5-80BD-5A745629D33A}" type="datetimeFigureOut">
               <a:rPr lang="pt-BR" smtClean="0"/>
+              <a:pPr/>
               <a:t>25/10/2015</a:t>
             </a:fld>
             <a:endParaRPr lang="pt-BR"/>
@@ -1841,7 +1854,8 @@
           <a:p>
             <a:fld id="{E650F5AF-5A7A-4DEE-952A-AB5DF242B9CD}" type="slidenum">
               <a:rPr lang="pt-BR" smtClean="0"/>
-              <a:t>‹#›</a:t>
+              <a:pPr/>
+              <a:t>‹nº›</a:t>
             </a:fld>
             <a:endParaRPr lang="pt-BR"/>
           </a:p>
@@ -1850,7 +1864,7 @@
     </p:spTree>
     <p:extLst>
       <p:ext uri="{BB962C8B-B14F-4D97-AF65-F5344CB8AC3E}">
-        <p14:creationId xmlns:p14="http://schemas.microsoft.com/office/powerpoint/2010/main" val="3569403052"/>
+        <p14:creationId xmlns:p14="http://schemas.microsoft.com/office/powerpoint/2010/main" xmlns="" val="3569403052"/>
       </p:ext>
     </p:extLst>
   </p:cSld>
@@ -1917,6 +1931,7 @@
           <a:p>
             <a:fld id="{42D09E55-3BF8-45D5-80BD-5A745629D33A}" type="datetimeFigureOut">
               <a:rPr lang="pt-BR" smtClean="0"/>
+              <a:pPr/>
               <a:t>25/10/2015</a:t>
             </a:fld>
             <a:endParaRPr lang="pt-BR"/>
@@ -1959,7 +1974,8 @@
           <a:p>
             <a:fld id="{E650F5AF-5A7A-4DEE-952A-AB5DF242B9CD}" type="slidenum">
               <a:rPr lang="pt-BR" smtClean="0"/>
-              <a:t>‹#›</a:t>
+              <a:pPr/>
+              <a:t>‹nº›</a:t>
             </a:fld>
             <a:endParaRPr lang="pt-BR"/>
           </a:p>
@@ -1968,7 +1984,7 @@
     </p:spTree>
     <p:extLst>
       <p:ext uri="{BB962C8B-B14F-4D97-AF65-F5344CB8AC3E}">
-        <p14:creationId xmlns:p14="http://schemas.microsoft.com/office/powerpoint/2010/main" val="2359431751"/>
+        <p14:creationId xmlns:p14="http://schemas.microsoft.com/office/powerpoint/2010/main" xmlns="" val="2359431751"/>
       </p:ext>
     </p:extLst>
   </p:cSld>
@@ -2012,6 +2028,7 @@
           <a:p>
             <a:fld id="{42D09E55-3BF8-45D5-80BD-5A745629D33A}" type="datetimeFigureOut">
               <a:rPr lang="pt-BR" smtClean="0"/>
+              <a:pPr/>
               <a:t>25/10/2015</a:t>
             </a:fld>
             <a:endParaRPr lang="pt-BR"/>
@@ -2054,7 +2071,8 @@
           <a:p>
             <a:fld id="{E650F5AF-5A7A-4DEE-952A-AB5DF242B9CD}" type="slidenum">
               <a:rPr lang="pt-BR" smtClean="0"/>
-              <a:t>‹#›</a:t>
+              <a:pPr/>
+              <a:t>‹nº›</a:t>
             </a:fld>
             <a:endParaRPr lang="pt-BR"/>
           </a:p>
@@ -2063,7 +2081,7 @@
     </p:spTree>
     <p:extLst>
       <p:ext uri="{BB962C8B-B14F-4D97-AF65-F5344CB8AC3E}">
-        <p14:creationId xmlns:p14="http://schemas.microsoft.com/office/powerpoint/2010/main" val="487197514"/>
+        <p14:creationId xmlns:p14="http://schemas.microsoft.com/office/powerpoint/2010/main" xmlns="" val="487197514"/>
       </p:ext>
     </p:extLst>
   </p:cSld>
@@ -2289,6 +2307,7 @@
           <a:p>
             <a:fld id="{42D09E55-3BF8-45D5-80BD-5A745629D33A}" type="datetimeFigureOut">
               <a:rPr lang="pt-BR" smtClean="0"/>
+              <a:pPr/>
               <a:t>25/10/2015</a:t>
             </a:fld>
             <a:endParaRPr lang="pt-BR"/>
@@ -2331,7 +2350,8 @@
           <a:p>
             <a:fld id="{E650F5AF-5A7A-4DEE-952A-AB5DF242B9CD}" type="slidenum">
               <a:rPr lang="pt-BR" smtClean="0"/>
-              <a:t>‹#›</a:t>
+              <a:pPr/>
+              <a:t>‹nº›</a:t>
             </a:fld>
             <a:endParaRPr lang="pt-BR"/>
           </a:p>
@@ -2340,7 +2360,7 @@
     </p:spTree>
     <p:extLst>
       <p:ext uri="{BB962C8B-B14F-4D97-AF65-F5344CB8AC3E}">
-        <p14:creationId xmlns:p14="http://schemas.microsoft.com/office/powerpoint/2010/main" val="3436097000"/>
+        <p14:creationId xmlns:p14="http://schemas.microsoft.com/office/powerpoint/2010/main" xmlns="" val="3436097000"/>
       </p:ext>
     </p:extLst>
   </p:cSld>
@@ -2542,6 +2562,7 @@
           <a:p>
             <a:fld id="{42D09E55-3BF8-45D5-80BD-5A745629D33A}" type="datetimeFigureOut">
               <a:rPr lang="pt-BR" smtClean="0"/>
+              <a:pPr/>
               <a:t>25/10/2015</a:t>
             </a:fld>
             <a:endParaRPr lang="pt-BR"/>
@@ -2584,7 +2605,8 @@
           <a:p>
             <a:fld id="{E650F5AF-5A7A-4DEE-952A-AB5DF242B9CD}" type="slidenum">
               <a:rPr lang="pt-BR" smtClean="0"/>
-              <a:t>‹#›</a:t>
+              <a:pPr/>
+              <a:t>‹nº›</a:t>
             </a:fld>
             <a:endParaRPr lang="pt-BR"/>
           </a:p>
@@ -2593,7 +2615,7 @@
     </p:spTree>
     <p:extLst>
       <p:ext uri="{BB962C8B-B14F-4D97-AF65-F5344CB8AC3E}">
-        <p14:creationId xmlns:p14="http://schemas.microsoft.com/office/powerpoint/2010/main" val="524006705"/>
+        <p14:creationId xmlns:p14="http://schemas.microsoft.com/office/powerpoint/2010/main" xmlns="" val="524006705"/>
       </p:ext>
     </p:extLst>
   </p:cSld>
@@ -2755,6 +2777,7 @@
           <a:p>
             <a:fld id="{42D09E55-3BF8-45D5-80BD-5A745629D33A}" type="datetimeFigureOut">
               <a:rPr lang="pt-BR" smtClean="0"/>
+              <a:pPr/>
               <a:t>25/10/2015</a:t>
             </a:fld>
             <a:endParaRPr lang="pt-BR"/>
@@ -2833,7 +2856,8 @@
           <a:p>
             <a:fld id="{E650F5AF-5A7A-4DEE-952A-AB5DF242B9CD}" type="slidenum">
               <a:rPr lang="pt-BR" smtClean="0"/>
-              <a:t>‹#›</a:t>
+              <a:pPr/>
+              <a:t>‹nº›</a:t>
             </a:fld>
             <a:endParaRPr lang="pt-BR"/>
           </a:p>
@@ -2842,7 +2866,7 @@
     </p:spTree>
     <p:extLst>
       <p:ext uri="{BB962C8B-B14F-4D97-AF65-F5344CB8AC3E}">
-        <p14:creationId xmlns:p14="http://schemas.microsoft.com/office/powerpoint/2010/main" val="1043027552"/>
+        <p14:creationId xmlns:p14="http://schemas.microsoft.com/office/powerpoint/2010/main" xmlns="" val="1043027552"/>
       </p:ext>
     </p:extLst>
   </p:cSld>
@@ -3139,10 +3163,10 @@
           <p:nvPr/>
         </p:nvPicPr>
         <p:blipFill>
-          <a:blip r:embed="rId2">
+          <a:blip r:embed="rId2" cstate="print">
             <a:extLst>
               <a:ext uri="{28A0092B-C50C-407E-A947-70E740481C1C}">
-                <a14:useLocalDpi xmlns:a14="http://schemas.microsoft.com/office/drawing/2010/main" val="0"/>
+                <a14:useLocalDpi xmlns:a14="http://schemas.microsoft.com/office/drawing/2010/main" xmlns="" val="0"/>
               </a:ext>
             </a:extLst>
           </a:blip>
@@ -3259,10 +3283,10 @@
           <p:nvPr/>
         </p:nvPicPr>
         <p:blipFill>
-          <a:blip r:embed="rId3">
+          <a:blip r:embed="rId3" cstate="print">
             <a:extLst>
               <a:ext uri="{28A0092B-C50C-407E-A947-70E740481C1C}">
-                <a14:useLocalDpi xmlns:a14="http://schemas.microsoft.com/office/drawing/2010/main" val="0"/>
+                <a14:useLocalDpi xmlns:a14="http://schemas.microsoft.com/office/drawing/2010/main" xmlns="" val="0"/>
               </a:ext>
             </a:extLst>
           </a:blip>
@@ -3283,7 +3307,7 @@
     </p:spTree>
     <p:extLst>
       <p:ext uri="{BB962C8B-B14F-4D97-AF65-F5344CB8AC3E}">
-        <p14:creationId xmlns:p14="http://schemas.microsoft.com/office/powerpoint/2010/main" val="1124906220"/>
+        <p14:creationId xmlns:p14="http://schemas.microsoft.com/office/powerpoint/2010/main" xmlns="" val="1124906220"/>
       </p:ext>
     </p:extLst>
   </p:cSld>
@@ -3326,10 +3350,10 @@
           <p:nvPr/>
         </p:nvPicPr>
         <p:blipFill>
-          <a:blip r:embed="rId2">
+          <a:blip r:embed="rId2" cstate="print">
             <a:extLst>
               <a:ext uri="{28A0092B-C50C-407E-A947-70E740481C1C}">
-                <a14:useLocalDpi xmlns:a14="http://schemas.microsoft.com/office/drawing/2010/main" val="0"/>
+                <a14:useLocalDpi xmlns:a14="http://schemas.microsoft.com/office/drawing/2010/main" xmlns="" val="0"/>
               </a:ext>
             </a:extLst>
           </a:blip>
@@ -3442,7 +3466,7 @@
     </p:spTree>
     <p:extLst>
       <p:ext uri="{BB962C8B-B14F-4D97-AF65-F5344CB8AC3E}">
-        <p14:creationId xmlns:p14="http://schemas.microsoft.com/office/powerpoint/2010/main" val="4060812770"/>
+        <p14:creationId xmlns:p14="http://schemas.microsoft.com/office/powerpoint/2010/main" xmlns="" val="4060812770"/>
       </p:ext>
     </p:extLst>
   </p:cSld>
@@ -3485,10 +3509,10 @@
           <p:nvPr/>
         </p:nvPicPr>
         <p:blipFill>
-          <a:blip r:embed="rId2">
+          <a:blip r:embed="rId2" cstate="print">
             <a:extLst>
               <a:ext uri="{28A0092B-C50C-407E-A947-70E740481C1C}">
-                <a14:useLocalDpi xmlns:a14="http://schemas.microsoft.com/office/drawing/2010/main" val="0"/>
+                <a14:useLocalDpi xmlns:a14="http://schemas.microsoft.com/office/drawing/2010/main" xmlns="" val="0"/>
               </a:ext>
             </a:extLst>
           </a:blip>
@@ -3618,13 +3642,6 @@
               </a:rPr>
               <a:t>Content Sharing</a:t>
             </a:r>
-            <a:endParaRPr lang="pt-PT" dirty="0" smtClean="0">
-              <a:solidFill>
-                <a:schemeClr val="bg1">
-                  <a:lumMod val="85000"/>
-                </a:schemeClr>
-              </a:solidFill>
-            </a:endParaRPr>
           </a:p>
           <a:p>
             <a:pPr marL="514350" indent="-514350">
@@ -3670,7 +3687,7 @@
     </p:spTree>
     <p:extLst>
       <p:ext uri="{BB962C8B-B14F-4D97-AF65-F5344CB8AC3E}">
-        <p14:creationId xmlns:p14="http://schemas.microsoft.com/office/powerpoint/2010/main" val="1236626834"/>
+        <p14:creationId xmlns:p14="http://schemas.microsoft.com/office/powerpoint/2010/main" xmlns="" val="1236626834"/>
       </p:ext>
     </p:extLst>
   </p:cSld>
@@ -3713,10 +3730,10 @@
           <p:nvPr/>
         </p:nvPicPr>
         <p:blipFill>
-          <a:blip r:embed="rId2">
+          <a:blip r:embed="rId2" cstate="print">
             <a:extLst>
               <a:ext uri="{28A0092B-C50C-407E-A947-70E740481C1C}">
-                <a14:useLocalDpi xmlns:a14="http://schemas.microsoft.com/office/drawing/2010/main" val="0"/>
+                <a14:useLocalDpi xmlns:a14="http://schemas.microsoft.com/office/drawing/2010/main" xmlns="" val="0"/>
               </a:ext>
             </a:extLst>
           </a:blip>
@@ -3914,7 +3931,7 @@
     </p:spTree>
     <p:extLst>
       <p:ext uri="{BB962C8B-B14F-4D97-AF65-F5344CB8AC3E}">
-        <p14:creationId xmlns:p14="http://schemas.microsoft.com/office/powerpoint/2010/main" val="4060812770"/>
+        <p14:creationId xmlns:p14="http://schemas.microsoft.com/office/powerpoint/2010/main" xmlns="" val="4060812770"/>
       </p:ext>
     </p:extLst>
   </p:cSld>
@@ -3957,10 +3974,10 @@
           <p:nvPr/>
         </p:nvPicPr>
         <p:blipFill>
-          <a:blip r:embed="rId2">
+          <a:blip r:embed="rId2" cstate="print">
             <a:extLst>
               <a:ext uri="{28A0092B-C50C-407E-A947-70E740481C1C}">
-                <a14:useLocalDpi xmlns:a14="http://schemas.microsoft.com/office/drawing/2010/main" val="0"/>
+                <a14:useLocalDpi xmlns:a14="http://schemas.microsoft.com/office/drawing/2010/main" xmlns="" val="0"/>
               </a:ext>
             </a:extLst>
           </a:blip>
@@ -4139,7 +4156,7 @@
     </p:spTree>
     <p:extLst>
       <p:ext uri="{BB962C8B-B14F-4D97-AF65-F5344CB8AC3E}">
-        <p14:creationId xmlns:p14="http://schemas.microsoft.com/office/powerpoint/2010/main" val="3308039092"/>
+        <p14:creationId xmlns:p14="http://schemas.microsoft.com/office/powerpoint/2010/main" xmlns="" val="3308039092"/>
       </p:ext>
     </p:extLst>
   </p:cSld>
@@ -4182,10 +4199,10 @@
           <p:nvPr/>
         </p:nvPicPr>
         <p:blipFill>
-          <a:blip r:embed="rId2">
+          <a:blip r:embed="rId2" cstate="print">
             <a:extLst>
               <a:ext uri="{28A0092B-C50C-407E-A947-70E740481C1C}">
-                <a14:useLocalDpi xmlns:a14="http://schemas.microsoft.com/office/drawing/2010/main" val="0"/>
+                <a14:useLocalDpi xmlns:a14="http://schemas.microsoft.com/office/drawing/2010/main" xmlns="" val="0"/>
               </a:ext>
             </a:extLst>
           </a:blip>
@@ -4329,7 +4346,7 @@
     </p:spTree>
     <p:extLst>
       <p:ext uri="{BB962C8B-B14F-4D97-AF65-F5344CB8AC3E}">
-        <p14:creationId xmlns:p14="http://schemas.microsoft.com/office/powerpoint/2010/main" val="3308039092"/>
+        <p14:creationId xmlns:p14="http://schemas.microsoft.com/office/powerpoint/2010/main" xmlns="" val="3308039092"/>
       </p:ext>
     </p:extLst>
   </p:cSld>
@@ -4372,10 +4389,10 @@
           <p:nvPr/>
         </p:nvPicPr>
         <p:blipFill>
-          <a:blip r:embed="rId2">
+          <a:blip r:embed="rId2" cstate="print">
             <a:extLst>
               <a:ext uri="{28A0092B-C50C-407E-A947-70E740481C1C}">
-                <a14:useLocalDpi xmlns:a14="http://schemas.microsoft.com/office/drawing/2010/main" val="0"/>
+                <a14:useLocalDpi xmlns:a14="http://schemas.microsoft.com/office/drawing/2010/main" xmlns="" val="0"/>
               </a:ext>
             </a:extLst>
           </a:blip>
@@ -4546,7 +4563,7 @@
     </p:spTree>
     <p:extLst>
       <p:ext uri="{BB962C8B-B14F-4D97-AF65-F5344CB8AC3E}">
-        <p14:creationId xmlns:p14="http://schemas.microsoft.com/office/powerpoint/2010/main" val="3345411651"/>
+        <p14:creationId xmlns:p14="http://schemas.microsoft.com/office/powerpoint/2010/main" xmlns="" val="3345411651"/>
       </p:ext>
     </p:extLst>
   </p:cSld>
@@ -4589,10 +4606,10 @@
           <p:nvPr/>
         </p:nvPicPr>
         <p:blipFill>
-          <a:blip r:embed="rId2">
+          <a:blip r:embed="rId2" cstate="print">
             <a:extLst>
               <a:ext uri="{28A0092B-C50C-407E-A947-70E740481C1C}">
-                <a14:useLocalDpi xmlns:a14="http://schemas.microsoft.com/office/drawing/2010/main" val="0"/>
+                <a14:useLocalDpi xmlns:a14="http://schemas.microsoft.com/office/drawing/2010/main" xmlns="" val="0"/>
               </a:ext>
             </a:extLst>
           </a:blip>
@@ -4696,10 +4713,10 @@
           </p:nvPr>
         </p:nvPicPr>
         <p:blipFill>
-          <a:blip r:embed="rId3">
+          <a:blip r:embed="rId3" cstate="print">
             <a:extLst>
               <a:ext uri="{28A0092B-C50C-407E-A947-70E740481C1C}">
-                <a14:useLocalDpi xmlns:a14="http://schemas.microsoft.com/office/drawing/2010/main" val="0"/>
+                <a14:useLocalDpi xmlns:a14="http://schemas.microsoft.com/office/drawing/2010/main" xmlns="" val="0"/>
               </a:ext>
             </a:extLst>
           </a:blip>
@@ -4717,7 +4734,7 @@
     </p:spTree>
     <p:extLst>
       <p:ext uri="{BB962C8B-B14F-4D97-AF65-F5344CB8AC3E}">
-        <p14:creationId xmlns:p14="http://schemas.microsoft.com/office/powerpoint/2010/main" val="3308039092"/>
+        <p14:creationId xmlns:p14="http://schemas.microsoft.com/office/powerpoint/2010/main" xmlns="" val="3308039092"/>
       </p:ext>
     </p:extLst>
   </p:cSld>
@@ -4760,10 +4777,10 @@
           <p:nvPr/>
         </p:nvPicPr>
         <p:blipFill>
-          <a:blip r:embed="rId2">
+          <a:blip r:embed="rId2" cstate="print">
             <a:extLst>
               <a:ext uri="{28A0092B-C50C-407E-A947-70E740481C1C}">
-                <a14:useLocalDpi xmlns:a14="http://schemas.microsoft.com/office/drawing/2010/main" val="0"/>
+                <a14:useLocalDpi xmlns:a14="http://schemas.microsoft.com/office/drawing/2010/main" xmlns="" val="0"/>
               </a:ext>
             </a:extLst>
           </a:blip>
@@ -4867,10 +4884,10 @@
           </p:nvPr>
         </p:nvPicPr>
         <p:blipFill>
-          <a:blip r:embed="rId3">
+          <a:blip r:embed="rId3" cstate="print">
             <a:extLst>
               <a:ext uri="{28A0092B-C50C-407E-A947-70E740481C1C}">
-                <a14:useLocalDpi xmlns:a14="http://schemas.microsoft.com/office/drawing/2010/main" val="0"/>
+                <a14:useLocalDpi xmlns:a14="http://schemas.microsoft.com/office/drawing/2010/main" xmlns="" val="0"/>
               </a:ext>
             </a:extLst>
           </a:blip>
@@ -4888,7 +4905,7 @@
     </p:spTree>
     <p:extLst>
       <p:ext uri="{BB962C8B-B14F-4D97-AF65-F5344CB8AC3E}">
-        <p14:creationId xmlns:p14="http://schemas.microsoft.com/office/powerpoint/2010/main" val="3308039092"/>
+        <p14:creationId xmlns:p14="http://schemas.microsoft.com/office/powerpoint/2010/main" xmlns="" val="3308039092"/>
       </p:ext>
     </p:extLst>
   </p:cSld>
@@ -4931,10 +4948,10 @@
           <p:nvPr/>
         </p:nvPicPr>
         <p:blipFill>
-          <a:blip r:embed="rId2">
+          <a:blip r:embed="rId2" cstate="print">
             <a:extLst>
               <a:ext uri="{28A0092B-C50C-407E-A947-70E740481C1C}">
-                <a14:useLocalDpi xmlns:a14="http://schemas.microsoft.com/office/drawing/2010/main" val="0"/>
+                <a14:useLocalDpi xmlns:a14="http://schemas.microsoft.com/office/drawing/2010/main" xmlns="" val="0"/>
               </a:ext>
             </a:extLst>
           </a:blip>
@@ -5168,7 +5185,7 @@
     </p:spTree>
     <p:extLst>
       <p:ext uri="{BB962C8B-B14F-4D97-AF65-F5344CB8AC3E}">
-        <p14:creationId xmlns:p14="http://schemas.microsoft.com/office/powerpoint/2010/main" val="3308039092"/>
+        <p14:creationId xmlns:p14="http://schemas.microsoft.com/office/powerpoint/2010/main" xmlns="" val="3308039092"/>
       </p:ext>
     </p:extLst>
   </p:cSld>
@@ -5211,10 +5228,10 @@
           <p:nvPr/>
         </p:nvPicPr>
         <p:blipFill>
-          <a:blip r:embed="rId2">
+          <a:blip r:embed="rId2" cstate="print">
             <a:extLst>
               <a:ext uri="{28A0092B-C50C-407E-A947-70E740481C1C}">
-                <a14:useLocalDpi xmlns:a14="http://schemas.microsoft.com/office/drawing/2010/main" val="0"/>
+                <a14:useLocalDpi xmlns:a14="http://schemas.microsoft.com/office/drawing/2010/main" xmlns="" val="0"/>
               </a:ext>
             </a:extLst>
           </a:blip>
@@ -5422,7 +5439,7 @@
     </p:spTree>
     <p:extLst>
       <p:ext uri="{BB962C8B-B14F-4D97-AF65-F5344CB8AC3E}">
-        <p14:creationId xmlns:p14="http://schemas.microsoft.com/office/powerpoint/2010/main" val="3308039092"/>
+        <p14:creationId xmlns:p14="http://schemas.microsoft.com/office/powerpoint/2010/main" xmlns="" val="3308039092"/>
       </p:ext>
     </p:extLst>
   </p:cSld>
@@ -5465,10 +5482,10 @@
           <p:nvPr/>
         </p:nvPicPr>
         <p:blipFill>
-          <a:blip r:embed="rId2">
+          <a:blip r:embed="rId2" cstate="print">
             <a:extLst>
               <a:ext uri="{28A0092B-C50C-407E-A947-70E740481C1C}">
-                <a14:useLocalDpi xmlns:a14="http://schemas.microsoft.com/office/drawing/2010/main" val="0"/>
+                <a14:useLocalDpi xmlns:a14="http://schemas.microsoft.com/office/drawing/2010/main" xmlns="" val="0"/>
               </a:ext>
             </a:extLst>
           </a:blip>
@@ -5615,7 +5632,7 @@
     </p:spTree>
     <p:extLst>
       <p:ext uri="{BB962C8B-B14F-4D97-AF65-F5344CB8AC3E}">
-        <p14:creationId xmlns:p14="http://schemas.microsoft.com/office/powerpoint/2010/main" val="4060812770"/>
+        <p14:creationId xmlns:p14="http://schemas.microsoft.com/office/powerpoint/2010/main" xmlns="" val="4060812770"/>
       </p:ext>
     </p:extLst>
   </p:cSld>
@@ -5658,10 +5675,10 @@
           <p:nvPr/>
         </p:nvPicPr>
         <p:blipFill>
-          <a:blip r:embed="rId2">
+          <a:blip r:embed="rId2" cstate="print">
             <a:extLst>
               <a:ext uri="{28A0092B-C50C-407E-A947-70E740481C1C}">
-                <a14:useLocalDpi xmlns:a14="http://schemas.microsoft.com/office/drawing/2010/main" val="0"/>
+                <a14:useLocalDpi xmlns:a14="http://schemas.microsoft.com/office/drawing/2010/main" xmlns="" val="0"/>
               </a:ext>
             </a:extLst>
           </a:blip>
@@ -5847,7 +5864,7 @@
     </p:spTree>
     <p:extLst>
       <p:ext uri="{BB962C8B-B14F-4D97-AF65-F5344CB8AC3E}">
-        <p14:creationId xmlns:p14="http://schemas.microsoft.com/office/powerpoint/2010/main" val="3308039092"/>
+        <p14:creationId xmlns:p14="http://schemas.microsoft.com/office/powerpoint/2010/main" xmlns="" val="3308039092"/>
       </p:ext>
     </p:extLst>
   </p:cSld>
@@ -5890,10 +5907,10 @@
           <p:nvPr/>
         </p:nvPicPr>
         <p:blipFill>
-          <a:blip r:embed="rId2">
+          <a:blip r:embed="rId2" cstate="print">
             <a:extLst>
               <a:ext uri="{28A0092B-C50C-407E-A947-70E740481C1C}">
-                <a14:useLocalDpi xmlns:a14="http://schemas.microsoft.com/office/drawing/2010/main" val="0"/>
+                <a14:useLocalDpi xmlns:a14="http://schemas.microsoft.com/office/drawing/2010/main" xmlns="" val="0"/>
               </a:ext>
             </a:extLst>
           </a:blip>
@@ -6124,7 +6141,7 @@
     </p:spTree>
     <p:extLst>
       <p:ext uri="{BB962C8B-B14F-4D97-AF65-F5344CB8AC3E}">
-        <p14:creationId xmlns:p14="http://schemas.microsoft.com/office/powerpoint/2010/main" val="3308039092"/>
+        <p14:creationId xmlns:p14="http://schemas.microsoft.com/office/powerpoint/2010/main" xmlns="" val="3308039092"/>
       </p:ext>
     </p:extLst>
   </p:cSld>
@@ -6167,10 +6184,10 @@
           <p:nvPr/>
         </p:nvPicPr>
         <p:blipFill>
-          <a:blip r:embed="rId2">
+          <a:blip r:embed="rId2" cstate="print">
             <a:extLst>
               <a:ext uri="{28A0092B-C50C-407E-A947-70E740481C1C}">
-                <a14:useLocalDpi xmlns:a14="http://schemas.microsoft.com/office/drawing/2010/main" val="0"/>
+                <a14:useLocalDpi xmlns:a14="http://schemas.microsoft.com/office/drawing/2010/main" xmlns="" val="0"/>
               </a:ext>
             </a:extLst>
           </a:blip>
@@ -6360,7 +6377,7 @@
     </p:spTree>
     <p:extLst>
       <p:ext uri="{BB962C8B-B14F-4D97-AF65-F5344CB8AC3E}">
-        <p14:creationId xmlns:p14="http://schemas.microsoft.com/office/powerpoint/2010/main" val="3308039092"/>
+        <p14:creationId xmlns:p14="http://schemas.microsoft.com/office/powerpoint/2010/main" xmlns="" val="3308039092"/>
       </p:ext>
     </p:extLst>
   </p:cSld>
@@ -6403,10 +6420,10 @@
           <p:nvPr/>
         </p:nvPicPr>
         <p:blipFill>
-          <a:blip r:embed="rId2">
+          <a:blip r:embed="rId2" cstate="print">
             <a:extLst>
               <a:ext uri="{28A0092B-C50C-407E-A947-70E740481C1C}">
-                <a14:useLocalDpi xmlns:a14="http://schemas.microsoft.com/office/drawing/2010/main" val="0"/>
+                <a14:useLocalDpi xmlns:a14="http://schemas.microsoft.com/office/drawing/2010/main" xmlns="" val="0"/>
               </a:ext>
             </a:extLst>
           </a:blip>
@@ -6567,7 +6584,7 @@
     </p:spTree>
     <p:extLst>
       <p:ext uri="{BB962C8B-B14F-4D97-AF65-F5344CB8AC3E}">
-        <p14:creationId xmlns:p14="http://schemas.microsoft.com/office/powerpoint/2010/main" val="3308039092"/>
+        <p14:creationId xmlns:p14="http://schemas.microsoft.com/office/powerpoint/2010/main" xmlns="" val="3308039092"/>
       </p:ext>
     </p:extLst>
   </p:cSld>
@@ -6610,10 +6627,10 @@
           <p:nvPr/>
         </p:nvPicPr>
         <p:blipFill>
-          <a:blip r:embed="rId2">
+          <a:blip r:embed="rId2" cstate="print">
             <a:extLst>
               <a:ext uri="{28A0092B-C50C-407E-A947-70E740481C1C}">
-                <a14:useLocalDpi xmlns:a14="http://schemas.microsoft.com/office/drawing/2010/main" val="0"/>
+                <a14:useLocalDpi xmlns:a14="http://schemas.microsoft.com/office/drawing/2010/main" xmlns="" val="0"/>
               </a:ext>
             </a:extLst>
           </a:blip>
@@ -6788,7 +6805,7 @@
     </p:spTree>
     <p:extLst>
       <p:ext uri="{BB962C8B-B14F-4D97-AF65-F5344CB8AC3E}">
-        <p14:creationId xmlns:p14="http://schemas.microsoft.com/office/powerpoint/2010/main" val="3308039092"/>
+        <p14:creationId xmlns:p14="http://schemas.microsoft.com/office/powerpoint/2010/main" xmlns="" val="3308039092"/>
       </p:ext>
     </p:extLst>
   </p:cSld>
@@ -6831,10 +6848,10 @@
           <p:nvPr/>
         </p:nvPicPr>
         <p:blipFill>
-          <a:blip r:embed="rId2">
+          <a:blip r:embed="rId2" cstate="print">
             <a:extLst>
               <a:ext uri="{28A0092B-C50C-407E-A947-70E740481C1C}">
-                <a14:useLocalDpi xmlns:a14="http://schemas.microsoft.com/office/drawing/2010/main" val="0"/>
+                <a14:useLocalDpi xmlns:a14="http://schemas.microsoft.com/office/drawing/2010/main" xmlns="" val="0"/>
               </a:ext>
             </a:extLst>
           </a:blip>
@@ -6963,10 +6980,10 @@
           <p:nvPr/>
         </p:nvPicPr>
         <p:blipFill>
-          <a:blip r:embed="rId3">
+          <a:blip r:embed="rId3" cstate="print">
             <a:extLst>
               <a:ext uri="{28A0092B-C50C-407E-A947-70E740481C1C}">
-                <a14:useLocalDpi xmlns:a14="http://schemas.microsoft.com/office/drawing/2010/main" val="0"/>
+                <a14:useLocalDpi xmlns:a14="http://schemas.microsoft.com/office/drawing/2010/main" xmlns="" val="0"/>
               </a:ext>
             </a:extLst>
           </a:blip>
@@ -6990,14 +7007,14 @@
           <a:effectLst/>
           <a:extLst>
             <a:ext uri="{909E8E84-426E-40DD-AFC4-6F175D3DCCD1}">
-              <a14:hiddenFill xmlns:a14="http://schemas.microsoft.com/office/drawing/2010/main">
+              <a14:hiddenFill xmlns:a14="http://schemas.microsoft.com/office/drawing/2010/main" xmlns="">
                 <a:solidFill>
                   <a:schemeClr val="accent1"/>
                 </a:solidFill>
               </a14:hiddenFill>
             </a:ext>
             <a:ext uri="{91240B29-F687-4F45-9708-019B960494DF}">
-              <a14:hiddenLine xmlns:a14="http://schemas.microsoft.com/office/drawing/2010/main" w="9525">
+              <a14:hiddenLine xmlns:a14="http://schemas.microsoft.com/office/drawing/2010/main" xmlns="" w="9525">
                 <a:solidFill>
                   <a:schemeClr val="tx1"/>
                 </a:solidFill>
@@ -7007,7 +7024,7 @@
               </a14:hiddenLine>
             </a:ext>
             <a:ext uri="{AF507438-7753-43E0-B8FC-AC1667EBCBE1}">
-              <a14:hiddenEffects xmlns:a14="http://schemas.microsoft.com/office/drawing/2010/main">
+              <a14:hiddenEffects xmlns:a14="http://schemas.microsoft.com/office/drawing/2010/main" xmlns="">
                 <a:effectLst>
                   <a:outerShdw dist="35921" dir="2700000" algn="ctr" rotWithShape="0">
                     <a:schemeClr val="bg2"/>
@@ -7021,7 +7038,7 @@
     </p:spTree>
     <p:extLst>
       <p:ext uri="{BB962C8B-B14F-4D97-AF65-F5344CB8AC3E}">
-        <p14:creationId xmlns:p14="http://schemas.microsoft.com/office/powerpoint/2010/main" val="1156373279"/>
+        <p14:creationId xmlns:p14="http://schemas.microsoft.com/office/powerpoint/2010/main" xmlns="" val="1156373279"/>
       </p:ext>
     </p:extLst>
   </p:cSld>
@@ -7064,10 +7081,10 @@
           <p:nvPr/>
         </p:nvPicPr>
         <p:blipFill>
-          <a:blip r:embed="rId2">
+          <a:blip r:embed="rId2" cstate="print">
             <a:extLst>
               <a:ext uri="{28A0092B-C50C-407E-A947-70E740481C1C}">
-                <a14:useLocalDpi xmlns:a14="http://schemas.microsoft.com/office/drawing/2010/main" val="0"/>
+                <a14:useLocalDpi xmlns:a14="http://schemas.microsoft.com/office/drawing/2010/main" xmlns="" val="0"/>
               </a:ext>
             </a:extLst>
           </a:blip>
@@ -7169,10 +7186,10 @@
           <p:nvPr/>
         </p:nvPicPr>
         <p:blipFill>
-          <a:blip r:embed="rId3">
+          <a:blip r:embed="rId3" cstate="print">
             <a:extLst>
               <a:ext uri="{28A0092B-C50C-407E-A947-70E740481C1C}">
-                <a14:useLocalDpi xmlns:a14="http://schemas.microsoft.com/office/drawing/2010/main" val="0"/>
+                <a14:useLocalDpi xmlns:a14="http://schemas.microsoft.com/office/drawing/2010/main" xmlns="" val="0"/>
               </a:ext>
             </a:extLst>
           </a:blip>
@@ -7196,14 +7213,14 @@
           <a:effectLst/>
           <a:extLst>
             <a:ext uri="{909E8E84-426E-40DD-AFC4-6F175D3DCCD1}">
-              <a14:hiddenFill xmlns:a14="http://schemas.microsoft.com/office/drawing/2010/main">
+              <a14:hiddenFill xmlns:a14="http://schemas.microsoft.com/office/drawing/2010/main" xmlns="">
                 <a:solidFill>
                   <a:schemeClr val="accent1"/>
                 </a:solidFill>
               </a14:hiddenFill>
             </a:ext>
             <a:ext uri="{91240B29-F687-4F45-9708-019B960494DF}">
-              <a14:hiddenLine xmlns:a14="http://schemas.microsoft.com/office/drawing/2010/main" w="9525">
+              <a14:hiddenLine xmlns:a14="http://schemas.microsoft.com/office/drawing/2010/main" xmlns="" w="9525">
                 <a:solidFill>
                   <a:schemeClr val="tx1"/>
                 </a:solidFill>
@@ -7213,7 +7230,7 @@
               </a14:hiddenLine>
             </a:ext>
             <a:ext uri="{AF507438-7753-43E0-B8FC-AC1667EBCBE1}">
-              <a14:hiddenEffects xmlns:a14="http://schemas.microsoft.com/office/drawing/2010/main">
+              <a14:hiddenEffects xmlns:a14="http://schemas.microsoft.com/office/drawing/2010/main" xmlns="">
                 <a:effectLst>
                   <a:outerShdw dist="35921" dir="2700000" algn="ctr" rotWithShape="0">
                     <a:schemeClr val="bg2"/>
@@ -7227,7 +7244,7 @@
     </p:spTree>
     <p:extLst>
       <p:ext uri="{BB962C8B-B14F-4D97-AF65-F5344CB8AC3E}">
-        <p14:creationId xmlns:p14="http://schemas.microsoft.com/office/powerpoint/2010/main" val="1156373279"/>
+        <p14:creationId xmlns:p14="http://schemas.microsoft.com/office/powerpoint/2010/main" xmlns="" val="1156373279"/>
       </p:ext>
     </p:extLst>
   </p:cSld>
@@ -7270,10 +7287,10 @@
           <p:nvPr/>
         </p:nvPicPr>
         <p:blipFill>
-          <a:blip r:embed="rId2">
+          <a:blip r:embed="rId2" cstate="print">
             <a:extLst>
               <a:ext uri="{28A0092B-C50C-407E-A947-70E740481C1C}">
-                <a14:useLocalDpi xmlns:a14="http://schemas.microsoft.com/office/drawing/2010/main" val="0"/>
+                <a14:useLocalDpi xmlns:a14="http://schemas.microsoft.com/office/drawing/2010/main" xmlns="" val="0"/>
               </a:ext>
             </a:extLst>
           </a:blip>
@@ -7349,14 +7366,100 @@
           <a:bodyPr/>
           <a:lstStyle/>
           <a:p>
-            <a:endParaRPr lang="pt-BR" dirty="0"/>
-          </a:p>
-        </p:txBody>
-      </p:sp>
+            <a:r>
+              <a:rPr lang="pt-BR" dirty="0" smtClean="0">
+                <a:solidFill>
+                  <a:schemeClr val="bg1">
+                    <a:lumMod val="75000"/>
+                  </a:schemeClr>
+                </a:solidFill>
+              </a:rPr>
+              <a:t>Compartilhamento de informações entre diversos aplicativos</a:t>
+            </a:r>
+          </a:p>
+          <a:p>
+            <a:endParaRPr lang="pt-BR" dirty="0" smtClean="0">
+              <a:solidFill>
+                <a:schemeClr val="bg1">
+                  <a:lumMod val="75000"/>
+                </a:schemeClr>
+              </a:solidFill>
+            </a:endParaRPr>
+          </a:p>
+          <a:p>
+            <a:r>
+              <a:rPr lang="pt-BR" dirty="0" smtClean="0">
+                <a:solidFill>
+                  <a:srgbClr val="AEC908"/>
+                </a:solidFill>
+                <a:ea typeface="+mj-ea"/>
+                <a:cs typeface="+mj-cs"/>
+              </a:rPr>
+              <a:t>Facebook</a:t>
+            </a:r>
+          </a:p>
+          <a:p>
+            <a:pPr lvl="1"/>
+            <a:r>
+              <a:rPr lang="pt-BR" dirty="0" smtClean="0">
+                <a:solidFill>
+                  <a:schemeClr val="bg1">
+                    <a:lumMod val="75000"/>
+                  </a:schemeClr>
+                </a:solidFill>
+                <a:ea typeface="+mj-ea"/>
+                <a:cs typeface="+mj-cs"/>
+              </a:rPr>
+              <a:t>Título: </a:t>
+            </a:r>
+            <a:endParaRPr lang="pt-BR" dirty="0">
+              <a:solidFill>
+                <a:schemeClr val="bg1">
+                  <a:lumMod val="75000"/>
+                </a:schemeClr>
+              </a:solidFill>
+              <a:ea typeface="+mj-ea"/>
+              <a:cs typeface="+mj-cs"/>
+            </a:endParaRPr>
+          </a:p>
+        </p:txBody>
+      </p:sp>
+      <p:pic>
+        <p:nvPicPr>
+          <p:cNvPr id="1026" name="Picture 2"/>
+          <p:cNvPicPr>
+            <a:picLocks noChangeAspect="1" noChangeArrowheads="1"/>
+          </p:cNvPicPr>
+          <p:nvPr/>
+        </p:nvPicPr>
+        <p:blipFill>
+          <a:blip r:embed="rId3" cstate="print"/>
+          <a:srcRect/>
+          <a:stretch>
+            <a:fillRect/>
+          </a:stretch>
+        </p:blipFill>
+        <p:spPr bwMode="auto">
+          <a:xfrm>
+            <a:off x="1043608" y="4797152"/>
+            <a:ext cx="7432690" cy="1080120"/>
+          </a:xfrm>
+          <a:prstGeom prst="rect">
+            <a:avLst/>
+          </a:prstGeom>
+          <a:noFill/>
+          <a:ln w="9525">
+            <a:noFill/>
+            <a:miter lim="800000"/>
+            <a:headEnd/>
+            <a:tailEnd/>
+          </a:ln>
+        </p:spPr>
+      </p:pic>
     </p:spTree>
     <p:extLst>
       <p:ext uri="{BB962C8B-B14F-4D97-AF65-F5344CB8AC3E}">
-        <p14:creationId xmlns:p14="http://schemas.microsoft.com/office/powerpoint/2010/main" val="1156373279"/>
+        <p14:creationId xmlns:p14="http://schemas.microsoft.com/office/powerpoint/2010/main" xmlns="" val="1156373279"/>
       </p:ext>
     </p:extLst>
   </p:cSld>
@@ -7399,10 +7502,10 @@
           <p:nvPr/>
         </p:nvPicPr>
         <p:blipFill>
-          <a:blip r:embed="rId2">
+          <a:blip r:embed="rId2" cstate="print">
             <a:extLst>
               <a:ext uri="{28A0092B-C50C-407E-A947-70E740481C1C}">
-                <a14:useLocalDpi xmlns:a14="http://schemas.microsoft.com/office/drawing/2010/main" val="0"/>
+                <a14:useLocalDpi xmlns:a14="http://schemas.microsoft.com/office/drawing/2010/main" xmlns="" val="0"/>
               </a:ext>
             </a:extLst>
           </a:blip>
@@ -7435,7 +7538,25 @@
           <a:bodyPr/>
           <a:lstStyle/>
           <a:p>
-            <a:endParaRPr lang="pt-BR"/>
+            <a:r>
+              <a:rPr lang="pt-PT" dirty="0" smtClean="0">
+                <a:solidFill>
+                  <a:schemeClr val="bg1">
+                    <a:lumMod val="85000"/>
+                  </a:schemeClr>
+                </a:solidFill>
+              </a:rPr>
+              <a:t>Content </a:t>
+            </a:r>
+            <a:r>
+              <a:rPr lang="pt-PT" dirty="0" smtClean="0">
+                <a:solidFill>
+                  <a:srgbClr val="AEC908"/>
+                </a:solidFill>
+              </a:rPr>
+              <a:t>Sharing</a:t>
+            </a:r>
+            <a:endParaRPr lang="pt-BR" dirty="0"/>
           </a:p>
         </p:txBody>
       </p:sp>
@@ -7454,14 +7575,151 @@
           <a:bodyPr/>
           <a:lstStyle/>
           <a:p>
-            <a:endParaRPr lang="pt-BR"/>
-          </a:p>
-        </p:txBody>
-      </p:sp>
+            <a:r>
+              <a:rPr lang="pt-BR" dirty="0" smtClean="0">
+                <a:solidFill>
+                  <a:srgbClr val="AEC908"/>
+                </a:solidFill>
+              </a:rPr>
+              <a:t>Facebook</a:t>
+            </a:r>
+          </a:p>
+          <a:p>
+            <a:pPr lvl="1"/>
+            <a:r>
+              <a:rPr lang="pt-BR" dirty="0" smtClean="0">
+                <a:solidFill>
+                  <a:schemeClr val="bg1">
+                    <a:lumMod val="75000"/>
+                  </a:schemeClr>
+                </a:solidFill>
+              </a:rPr>
+              <a:t>Nome do site:</a:t>
+            </a:r>
+          </a:p>
+          <a:p>
+            <a:pPr lvl="1"/>
+            <a:endParaRPr lang="pt-BR" dirty="0" smtClean="0">
+              <a:solidFill>
+                <a:schemeClr val="bg1">
+                  <a:lumMod val="75000"/>
+                </a:schemeClr>
+              </a:solidFill>
+            </a:endParaRPr>
+          </a:p>
+          <a:p>
+            <a:pPr lvl="1"/>
+            <a:endParaRPr lang="pt-BR" dirty="0" smtClean="0">
+              <a:solidFill>
+                <a:schemeClr val="bg1">
+                  <a:lumMod val="75000"/>
+                </a:schemeClr>
+              </a:solidFill>
+            </a:endParaRPr>
+          </a:p>
+          <a:p>
+            <a:pPr lvl="1"/>
+            <a:endParaRPr lang="pt-BR" dirty="0" smtClean="0">
+              <a:solidFill>
+                <a:schemeClr val="bg1">
+                  <a:lumMod val="75000"/>
+                </a:schemeClr>
+              </a:solidFill>
+            </a:endParaRPr>
+          </a:p>
+          <a:p>
+            <a:pPr lvl="1"/>
+            <a:r>
+              <a:rPr lang="pt-BR" dirty="0" smtClean="0">
+                <a:solidFill>
+                  <a:schemeClr val="bg1">
+                    <a:lumMod val="75000"/>
+                  </a:schemeClr>
+                </a:solidFill>
+              </a:rPr>
+              <a:t>URL:</a:t>
+            </a:r>
+          </a:p>
+          <a:p>
+            <a:pPr lvl="1"/>
+            <a:endParaRPr lang="pt-BR" dirty="0">
+              <a:solidFill>
+                <a:schemeClr val="bg1">
+                  <a:lumMod val="75000"/>
+                </a:schemeClr>
+              </a:solidFill>
+            </a:endParaRPr>
+          </a:p>
+        </p:txBody>
+      </p:sp>
+      <p:pic>
+        <p:nvPicPr>
+          <p:cNvPr id="2050" name="Picture 2"/>
+          <p:cNvPicPr>
+            <a:picLocks noChangeAspect="1" noChangeArrowheads="1"/>
+          </p:cNvPicPr>
+          <p:nvPr/>
+        </p:nvPicPr>
+        <p:blipFill>
+          <a:blip r:embed="rId3" cstate="print"/>
+          <a:srcRect/>
+          <a:stretch>
+            <a:fillRect/>
+          </a:stretch>
+        </p:blipFill>
+        <p:spPr bwMode="auto">
+          <a:xfrm>
+            <a:off x="467544" y="2924944"/>
+            <a:ext cx="8306533" cy="699318"/>
+          </a:xfrm>
+          <a:prstGeom prst="rect">
+            <a:avLst/>
+          </a:prstGeom>
+          <a:noFill/>
+          <a:ln w="9525">
+            <a:noFill/>
+            <a:miter lim="800000"/>
+            <a:headEnd/>
+            <a:tailEnd/>
+          </a:ln>
+        </p:spPr>
+      </p:pic>
+      <p:pic>
+        <p:nvPicPr>
+          <p:cNvPr id="2051" name="Picture 3"/>
+          <p:cNvPicPr>
+            <a:picLocks noChangeAspect="1" noChangeArrowheads="1"/>
+          </p:cNvPicPr>
+          <p:nvPr/>
+        </p:nvPicPr>
+        <p:blipFill>
+          <a:blip r:embed="rId4" cstate="print"/>
+          <a:srcRect/>
+          <a:stretch>
+            <a:fillRect/>
+          </a:stretch>
+        </p:blipFill>
+        <p:spPr bwMode="auto">
+          <a:xfrm>
+            <a:off x="539552" y="5013176"/>
+            <a:ext cx="7863274" cy="864096"/>
+          </a:xfrm>
+          <a:prstGeom prst="rect">
+            <a:avLst/>
+          </a:prstGeom>
+          <a:noFill/>
+          <a:ln w="9525">
+            <a:noFill/>
+            <a:miter lim="800000"/>
+            <a:headEnd/>
+            <a:tailEnd/>
+          </a:ln>
+        </p:spPr>
+      </p:pic>
     </p:spTree>
     <p:extLst>
       <p:ext uri="{BB962C8B-B14F-4D97-AF65-F5344CB8AC3E}">
-        <p14:creationId xmlns:p14="http://schemas.microsoft.com/office/powerpoint/2010/main" val="1156373279"/>
+        <p14:creationId xmlns:p14="http://schemas.microsoft.com/office/powerpoint/2010/main" xmlns="" val="1156373279"/>
       </p:ext>
     </p:extLst>
   </p:cSld>
@@ -7504,10 +7762,10 @@
           <p:nvPr/>
         </p:nvPicPr>
         <p:blipFill>
-          <a:blip r:embed="rId2">
+          <a:blip r:embed="rId2" cstate="print">
             <a:extLst>
               <a:ext uri="{28A0092B-C50C-407E-A947-70E740481C1C}">
-                <a14:useLocalDpi xmlns:a14="http://schemas.microsoft.com/office/drawing/2010/main" val="0"/>
+                <a14:useLocalDpi xmlns:a14="http://schemas.microsoft.com/office/drawing/2010/main" xmlns="" val="0"/>
               </a:ext>
             </a:extLst>
           </a:blip>
@@ -7540,7 +7798,25 @@
           <a:bodyPr/>
           <a:lstStyle/>
           <a:p>
-            <a:endParaRPr lang="pt-BR"/>
+            <a:r>
+              <a:rPr lang="pt-PT" dirty="0" smtClean="0">
+                <a:solidFill>
+                  <a:schemeClr val="bg1">
+                    <a:lumMod val="85000"/>
+                  </a:schemeClr>
+                </a:solidFill>
+              </a:rPr>
+              <a:t>Content </a:t>
+            </a:r>
+            <a:r>
+              <a:rPr lang="pt-PT" dirty="0" smtClean="0">
+                <a:solidFill>
+                  <a:srgbClr val="AEC908"/>
+                </a:solidFill>
+              </a:rPr>
+              <a:t>Sharing</a:t>
+            </a:r>
+            <a:endParaRPr lang="pt-BR" dirty="0"/>
           </a:p>
         </p:txBody>
       </p:sp>
@@ -7559,14 +7835,74 @@
           <a:bodyPr/>
           <a:lstStyle/>
           <a:p>
-            <a:endParaRPr lang="pt-BR"/>
-          </a:p>
-        </p:txBody>
-      </p:sp>
+            <a:r>
+              <a:rPr lang="pt-BR" dirty="0" smtClean="0">
+                <a:solidFill>
+                  <a:srgbClr val="AEC908"/>
+                </a:solidFill>
+              </a:rPr>
+              <a:t>Facebook</a:t>
+            </a:r>
+            <a:endParaRPr lang="pt-BR" dirty="0"/>
+          </a:p>
+          <a:p>
+            <a:pPr lvl="1"/>
+            <a:r>
+              <a:rPr lang="pt-BR" dirty="0" smtClean="0">
+                <a:solidFill>
+                  <a:schemeClr val="bg1">
+                    <a:lumMod val="75000"/>
+                  </a:schemeClr>
+                </a:solidFill>
+              </a:rPr>
+              <a:t>Descrição:</a:t>
+            </a:r>
+            <a:endParaRPr lang="pt-BR" dirty="0" smtClean="0">
+              <a:solidFill>
+                <a:schemeClr val="bg1">
+                  <a:lumMod val="75000"/>
+                </a:schemeClr>
+              </a:solidFill>
+            </a:endParaRPr>
+          </a:p>
+        </p:txBody>
+      </p:sp>
+      <p:pic>
+        <p:nvPicPr>
+          <p:cNvPr id="3074" name="Picture 2"/>
+          <p:cNvPicPr>
+            <a:picLocks noChangeAspect="1" noChangeArrowheads="1"/>
+          </p:cNvPicPr>
+          <p:nvPr/>
+        </p:nvPicPr>
+        <p:blipFill>
+          <a:blip r:embed="rId3" cstate="print"/>
+          <a:srcRect/>
+          <a:stretch>
+            <a:fillRect/>
+          </a:stretch>
+        </p:blipFill>
+        <p:spPr bwMode="auto">
+          <a:xfrm>
+            <a:off x="395536" y="3068960"/>
+            <a:ext cx="8423396" cy="2520280"/>
+          </a:xfrm>
+          <a:prstGeom prst="rect">
+            <a:avLst/>
+          </a:prstGeom>
+          <a:noFill/>
+          <a:ln w="9525">
+            <a:noFill/>
+            <a:miter lim="800000"/>
+            <a:headEnd/>
+            <a:tailEnd/>
+          </a:ln>
+        </p:spPr>
+      </p:pic>
     </p:spTree>
     <p:extLst>
       <p:ext uri="{BB962C8B-B14F-4D97-AF65-F5344CB8AC3E}">
-        <p14:creationId xmlns:p14="http://schemas.microsoft.com/office/powerpoint/2010/main" val="1156373279"/>
+        <p14:creationId xmlns:p14="http://schemas.microsoft.com/office/powerpoint/2010/main" xmlns="" val="1156373279"/>
       </p:ext>
     </p:extLst>
   </p:cSld>
@@ -7609,10 +7945,10 @@
           <p:nvPr/>
         </p:nvPicPr>
         <p:blipFill>
-          <a:blip r:embed="rId2">
+          <a:blip r:embed="rId2" cstate="print">
             <a:extLst>
               <a:ext uri="{28A0092B-C50C-407E-A947-70E740481C1C}">
-                <a14:useLocalDpi xmlns:a14="http://schemas.microsoft.com/office/drawing/2010/main" val="0"/>
+                <a14:useLocalDpi xmlns:a14="http://schemas.microsoft.com/office/drawing/2010/main" xmlns="" val="0"/>
               </a:ext>
             </a:extLst>
           </a:blip>
@@ -7729,10 +8065,10 @@
           <p:nvPr/>
         </p:nvPicPr>
         <p:blipFill>
-          <a:blip r:embed="rId3">
+          <a:blip r:embed="rId3" cstate="print">
             <a:extLst>
               <a:ext uri="{28A0092B-C50C-407E-A947-70E740481C1C}">
-                <a14:useLocalDpi xmlns:a14="http://schemas.microsoft.com/office/drawing/2010/main" val="0"/>
+                <a14:useLocalDpi xmlns:a14="http://schemas.microsoft.com/office/drawing/2010/main" xmlns="" val="0"/>
               </a:ext>
             </a:extLst>
           </a:blip>
@@ -7753,7 +8089,7 @@
     </p:spTree>
     <p:extLst>
       <p:ext uri="{BB962C8B-B14F-4D97-AF65-F5344CB8AC3E}">
-        <p14:creationId xmlns:p14="http://schemas.microsoft.com/office/powerpoint/2010/main" val="4060812770"/>
+        <p14:creationId xmlns:p14="http://schemas.microsoft.com/office/powerpoint/2010/main" xmlns="" val="4060812770"/>
       </p:ext>
     </p:extLst>
   </p:cSld>
@@ -7796,10 +8132,10 @@
           <p:nvPr/>
         </p:nvPicPr>
         <p:blipFill>
-          <a:blip r:embed="rId2">
+          <a:blip r:embed="rId2" cstate="print">
             <a:extLst>
               <a:ext uri="{28A0092B-C50C-407E-A947-70E740481C1C}">
-                <a14:useLocalDpi xmlns:a14="http://schemas.microsoft.com/office/drawing/2010/main" val="0"/>
+                <a14:useLocalDpi xmlns:a14="http://schemas.microsoft.com/office/drawing/2010/main" xmlns="" val="0"/>
               </a:ext>
             </a:extLst>
           </a:blip>
@@ -7832,7 +8168,25 @@
           <a:bodyPr/>
           <a:lstStyle/>
           <a:p>
-            <a:endParaRPr lang="pt-BR"/>
+            <a:r>
+              <a:rPr lang="pt-PT" dirty="0" smtClean="0">
+                <a:solidFill>
+                  <a:schemeClr val="bg1">
+                    <a:lumMod val="85000"/>
+                  </a:schemeClr>
+                </a:solidFill>
+              </a:rPr>
+              <a:t>Content </a:t>
+            </a:r>
+            <a:r>
+              <a:rPr lang="pt-PT" dirty="0" smtClean="0">
+                <a:solidFill>
+                  <a:srgbClr val="AEC908"/>
+                </a:solidFill>
+              </a:rPr>
+              <a:t>Sharing</a:t>
+            </a:r>
+            <a:endParaRPr lang="pt-BR" dirty="0"/>
           </a:p>
         </p:txBody>
       </p:sp>
@@ -7851,14 +8205,151 @@
           <a:bodyPr/>
           <a:lstStyle/>
           <a:p>
-            <a:endParaRPr lang="pt-BR"/>
-          </a:p>
-        </p:txBody>
-      </p:sp>
+            <a:r>
+              <a:rPr lang="pt-BR" dirty="0" smtClean="0">
+                <a:solidFill>
+                  <a:srgbClr val="AEC908"/>
+                </a:solidFill>
+              </a:rPr>
+              <a:t>Facebook</a:t>
+            </a:r>
+          </a:p>
+          <a:p>
+            <a:pPr lvl="1"/>
+            <a:r>
+              <a:rPr lang="pt-BR" dirty="0" smtClean="0">
+                <a:solidFill>
+                  <a:schemeClr val="bg1">
+                    <a:lumMod val="75000"/>
+                  </a:schemeClr>
+                </a:solidFill>
+              </a:rPr>
+              <a:t>Tipo de publicação:</a:t>
+            </a:r>
+          </a:p>
+          <a:p>
+            <a:pPr lvl="1"/>
+            <a:endParaRPr lang="pt-BR" dirty="0" smtClean="0">
+              <a:solidFill>
+                <a:schemeClr val="bg1">
+                  <a:lumMod val="75000"/>
+                </a:schemeClr>
+              </a:solidFill>
+            </a:endParaRPr>
+          </a:p>
+          <a:p>
+            <a:pPr lvl="1"/>
+            <a:endParaRPr lang="pt-BR" dirty="0" smtClean="0">
+              <a:solidFill>
+                <a:schemeClr val="bg1">
+                  <a:lumMod val="75000"/>
+                </a:schemeClr>
+              </a:solidFill>
+            </a:endParaRPr>
+          </a:p>
+          <a:p>
+            <a:pPr lvl="1"/>
+            <a:endParaRPr lang="pt-BR" dirty="0" smtClean="0">
+              <a:solidFill>
+                <a:schemeClr val="bg1">
+                  <a:lumMod val="75000"/>
+                </a:schemeClr>
+              </a:solidFill>
+            </a:endParaRPr>
+          </a:p>
+          <a:p>
+            <a:pPr lvl="1"/>
+            <a:r>
+              <a:rPr lang="pt-BR" dirty="0" smtClean="0">
+                <a:solidFill>
+                  <a:schemeClr val="bg1">
+                    <a:lumMod val="75000"/>
+                  </a:schemeClr>
+                </a:solidFill>
+              </a:rPr>
+              <a:t>Imagem:</a:t>
+            </a:r>
+            <a:endParaRPr lang="pt-BR" dirty="0" smtClean="0">
+              <a:solidFill>
+                <a:schemeClr val="bg1">
+                  <a:lumMod val="75000"/>
+                </a:schemeClr>
+              </a:solidFill>
+            </a:endParaRPr>
+          </a:p>
+          <a:p>
+            <a:endParaRPr lang="pt-BR" dirty="0"/>
+          </a:p>
+        </p:txBody>
+      </p:sp>
+      <p:pic>
+        <p:nvPicPr>
+          <p:cNvPr id="4098" name="Picture 2"/>
+          <p:cNvPicPr>
+            <a:picLocks noChangeAspect="1" noChangeArrowheads="1"/>
+          </p:cNvPicPr>
+          <p:nvPr/>
+        </p:nvPicPr>
+        <p:blipFill>
+          <a:blip r:embed="rId3" cstate="print"/>
+          <a:srcRect/>
+          <a:stretch>
+            <a:fillRect/>
+          </a:stretch>
+        </p:blipFill>
+        <p:spPr bwMode="auto">
+          <a:xfrm>
+            <a:off x="467544" y="4941168"/>
+            <a:ext cx="8337768" cy="864096"/>
+          </a:xfrm>
+          <a:prstGeom prst="rect">
+            <a:avLst/>
+          </a:prstGeom>
+          <a:noFill/>
+          <a:ln w="9525">
+            <a:noFill/>
+            <a:miter lim="800000"/>
+            <a:headEnd/>
+            <a:tailEnd/>
+          </a:ln>
+        </p:spPr>
+      </p:pic>
+      <p:pic>
+        <p:nvPicPr>
+          <p:cNvPr id="4099" name="Picture 3"/>
+          <p:cNvPicPr>
+            <a:picLocks noChangeAspect="1" noChangeArrowheads="1"/>
+          </p:cNvPicPr>
+          <p:nvPr/>
+        </p:nvPicPr>
+        <p:blipFill>
+          <a:blip r:embed="rId4" cstate="print"/>
+          <a:srcRect/>
+          <a:stretch>
+            <a:fillRect/>
+          </a:stretch>
+        </p:blipFill>
+        <p:spPr bwMode="auto">
+          <a:xfrm>
+            <a:off x="611560" y="3068960"/>
+            <a:ext cx="6120679" cy="649409"/>
+          </a:xfrm>
+          <a:prstGeom prst="rect">
+            <a:avLst/>
+          </a:prstGeom>
+          <a:noFill/>
+          <a:ln w="9525">
+            <a:noFill/>
+            <a:miter lim="800000"/>
+            <a:headEnd/>
+            <a:tailEnd/>
+          </a:ln>
+        </p:spPr>
+      </p:pic>
     </p:spTree>
     <p:extLst>
       <p:ext uri="{BB962C8B-B14F-4D97-AF65-F5344CB8AC3E}">
-        <p14:creationId xmlns:p14="http://schemas.microsoft.com/office/powerpoint/2010/main" val="1156373279"/>
+        <p14:creationId xmlns:p14="http://schemas.microsoft.com/office/powerpoint/2010/main" xmlns="" val="1156373279"/>
       </p:ext>
     </p:extLst>
   </p:cSld>
@@ -7901,10 +8392,10 @@
           <p:nvPr/>
         </p:nvPicPr>
         <p:blipFill>
-          <a:blip r:embed="rId2">
+          <a:blip r:embed="rId2" cstate="print">
             <a:extLst>
               <a:ext uri="{28A0092B-C50C-407E-A947-70E740481C1C}">
-                <a14:useLocalDpi xmlns:a14="http://schemas.microsoft.com/office/drawing/2010/main" val="0"/>
+                <a14:useLocalDpi xmlns:a14="http://schemas.microsoft.com/office/drawing/2010/main" xmlns="" val="0"/>
               </a:ext>
             </a:extLst>
           </a:blip>
@@ -7937,7 +8428,25 @@
           <a:bodyPr/>
           <a:lstStyle/>
           <a:p>
-            <a:endParaRPr lang="pt-BR"/>
+            <a:r>
+              <a:rPr lang="pt-PT" dirty="0" smtClean="0">
+                <a:solidFill>
+                  <a:schemeClr val="bg1">
+                    <a:lumMod val="85000"/>
+                  </a:schemeClr>
+                </a:solidFill>
+              </a:rPr>
+              <a:t>Content </a:t>
+            </a:r>
+            <a:r>
+              <a:rPr lang="pt-PT" dirty="0" smtClean="0">
+                <a:solidFill>
+                  <a:srgbClr val="AEC908"/>
+                </a:solidFill>
+              </a:rPr>
+              <a:t>Sharing</a:t>
+            </a:r>
+            <a:endParaRPr lang="pt-BR" dirty="0"/>
           </a:p>
         </p:txBody>
       </p:sp>
@@ -7956,14 +8465,170 @@
           <a:bodyPr/>
           <a:lstStyle/>
           <a:p>
-            <a:endParaRPr lang="pt-BR"/>
-          </a:p>
-        </p:txBody>
-      </p:sp>
+            <a:r>
+              <a:rPr lang="pt-BR" dirty="0" smtClean="0">
+                <a:solidFill>
+                  <a:srgbClr val="AEC908"/>
+                </a:solidFill>
+              </a:rPr>
+              <a:t>Facebook</a:t>
+            </a:r>
+          </a:p>
+          <a:p>
+            <a:pPr lvl="1"/>
+            <a:r>
+              <a:rPr lang="pt-BR" dirty="0" smtClean="0">
+                <a:solidFill>
+                  <a:schemeClr val="bg1">
+                    <a:lumMod val="75000"/>
+                  </a:schemeClr>
+                </a:solidFill>
+              </a:rPr>
+              <a:t>Tipo da imagem:</a:t>
+            </a:r>
+          </a:p>
+          <a:p>
+            <a:pPr lvl="1"/>
+            <a:endParaRPr lang="pt-BR" dirty="0" smtClean="0">
+              <a:solidFill>
+                <a:schemeClr val="bg1">
+                  <a:lumMod val="75000"/>
+                </a:schemeClr>
+              </a:solidFill>
+            </a:endParaRPr>
+          </a:p>
+          <a:p>
+            <a:pPr lvl="1"/>
+            <a:endParaRPr lang="pt-BR" dirty="0" smtClean="0">
+              <a:solidFill>
+                <a:schemeClr val="bg1">
+                  <a:lumMod val="75000"/>
+                </a:schemeClr>
+              </a:solidFill>
+            </a:endParaRPr>
+          </a:p>
+          <a:p>
+            <a:pPr lvl="1"/>
+            <a:r>
+              <a:rPr lang="pt-BR" dirty="0" smtClean="0">
+                <a:solidFill>
+                  <a:schemeClr val="bg1">
+                    <a:lumMod val="75000"/>
+                  </a:schemeClr>
+                </a:solidFill>
+              </a:rPr>
+              <a:t>Largura e altura da imagem:</a:t>
+            </a:r>
+            <a:endParaRPr lang="pt-BR" dirty="0">
+              <a:solidFill>
+                <a:schemeClr val="bg1">
+                  <a:lumMod val="75000"/>
+                </a:schemeClr>
+              </a:solidFill>
+            </a:endParaRPr>
+          </a:p>
+        </p:txBody>
+      </p:sp>
+      <p:pic>
+        <p:nvPicPr>
+          <p:cNvPr id="5122" name="Picture 2"/>
+          <p:cNvPicPr>
+            <a:picLocks noChangeAspect="1" noChangeArrowheads="1"/>
+          </p:cNvPicPr>
+          <p:nvPr/>
+        </p:nvPicPr>
+        <p:blipFill>
+          <a:blip r:embed="rId3" cstate="print"/>
+          <a:srcRect/>
+          <a:stretch>
+            <a:fillRect/>
+          </a:stretch>
+        </p:blipFill>
+        <p:spPr bwMode="auto">
+          <a:xfrm>
+            <a:off x="1043608" y="2780928"/>
+            <a:ext cx="3888432" cy="768643"/>
+          </a:xfrm>
+          <a:prstGeom prst="rect">
+            <a:avLst/>
+          </a:prstGeom>
+          <a:noFill/>
+          <a:ln w="9525">
+            <a:noFill/>
+            <a:miter lim="800000"/>
+            <a:headEnd/>
+            <a:tailEnd/>
+          </a:ln>
+        </p:spPr>
+      </p:pic>
+      <p:pic>
+        <p:nvPicPr>
+          <p:cNvPr id="5123" name="Picture 3"/>
+          <p:cNvPicPr>
+            <a:picLocks noChangeAspect="1" noChangeArrowheads="1"/>
+          </p:cNvPicPr>
+          <p:nvPr/>
+        </p:nvPicPr>
+        <p:blipFill>
+          <a:blip r:embed="rId4" cstate="print"/>
+          <a:srcRect/>
+          <a:stretch>
+            <a:fillRect/>
+          </a:stretch>
+        </p:blipFill>
+        <p:spPr bwMode="auto">
+          <a:xfrm>
+            <a:off x="1043608" y="4509120"/>
+            <a:ext cx="4180064" cy="648072"/>
+          </a:xfrm>
+          <a:prstGeom prst="rect">
+            <a:avLst/>
+          </a:prstGeom>
+          <a:noFill/>
+          <a:ln w="9525">
+            <a:noFill/>
+            <a:miter lim="800000"/>
+            <a:headEnd/>
+            <a:tailEnd/>
+          </a:ln>
+        </p:spPr>
+      </p:pic>
+      <p:pic>
+        <p:nvPicPr>
+          <p:cNvPr id="5124" name="Picture 4"/>
+          <p:cNvPicPr>
+            <a:picLocks noChangeAspect="1" noChangeArrowheads="1"/>
+          </p:cNvPicPr>
+          <p:nvPr/>
+        </p:nvPicPr>
+        <p:blipFill>
+          <a:blip r:embed="rId5" cstate="print"/>
+          <a:srcRect/>
+          <a:stretch>
+            <a:fillRect/>
+          </a:stretch>
+        </p:blipFill>
+        <p:spPr bwMode="auto">
+          <a:xfrm>
+            <a:off x="1043608" y="5445224"/>
+            <a:ext cx="4602973" cy="648072"/>
+          </a:xfrm>
+          <a:prstGeom prst="rect">
+            <a:avLst/>
+          </a:prstGeom>
+          <a:noFill/>
+          <a:ln w="9525">
+            <a:noFill/>
+            <a:miter lim="800000"/>
+            <a:headEnd/>
+            <a:tailEnd/>
+          </a:ln>
+        </p:spPr>
+      </p:pic>
     </p:spTree>
     <p:extLst>
       <p:ext uri="{BB962C8B-B14F-4D97-AF65-F5344CB8AC3E}">
-        <p14:creationId xmlns:p14="http://schemas.microsoft.com/office/powerpoint/2010/main" val="1156373279"/>
+        <p14:creationId xmlns:p14="http://schemas.microsoft.com/office/powerpoint/2010/main" xmlns="" val="1156373279"/>
       </p:ext>
     </p:extLst>
   </p:cSld>
@@ -8006,10 +8671,10 @@
           <p:nvPr/>
         </p:nvPicPr>
         <p:blipFill>
-          <a:blip r:embed="rId2">
+          <a:blip r:embed="rId2" cstate="print">
             <a:extLst>
               <a:ext uri="{28A0092B-C50C-407E-A947-70E740481C1C}">
-                <a14:useLocalDpi xmlns:a14="http://schemas.microsoft.com/office/drawing/2010/main" val="0"/>
+                <a14:useLocalDpi xmlns:a14="http://schemas.microsoft.com/office/drawing/2010/main" xmlns="" val="0"/>
               </a:ext>
             </a:extLst>
           </a:blip>
@@ -8068,7 +8733,7 @@
     </p:spTree>
     <p:extLst>
       <p:ext uri="{BB962C8B-B14F-4D97-AF65-F5344CB8AC3E}">
-        <p14:creationId xmlns:p14="http://schemas.microsoft.com/office/powerpoint/2010/main" val="1156373279"/>
+        <p14:creationId xmlns:p14="http://schemas.microsoft.com/office/powerpoint/2010/main" xmlns="" val="1156373279"/>
       </p:ext>
     </p:extLst>
   </p:cSld>
@@ -8111,10 +8776,10 @@
           <p:nvPr/>
         </p:nvPicPr>
         <p:blipFill>
-          <a:blip r:embed="rId2">
+          <a:blip r:embed="rId2" cstate="print">
             <a:extLst>
               <a:ext uri="{28A0092B-C50C-407E-A947-70E740481C1C}">
-                <a14:useLocalDpi xmlns:a14="http://schemas.microsoft.com/office/drawing/2010/main" val="0"/>
+                <a14:useLocalDpi xmlns:a14="http://schemas.microsoft.com/office/drawing/2010/main" xmlns="" val="0"/>
               </a:ext>
             </a:extLst>
           </a:blip>
@@ -8173,7 +8838,7 @@
     </p:spTree>
     <p:extLst>
       <p:ext uri="{BB962C8B-B14F-4D97-AF65-F5344CB8AC3E}">
-        <p14:creationId xmlns:p14="http://schemas.microsoft.com/office/powerpoint/2010/main" val="1156373279"/>
+        <p14:creationId xmlns:p14="http://schemas.microsoft.com/office/powerpoint/2010/main" xmlns="" val="1156373279"/>
       </p:ext>
     </p:extLst>
   </p:cSld>
@@ -8216,10 +8881,10 @@
           <p:nvPr/>
         </p:nvPicPr>
         <p:blipFill>
-          <a:blip r:embed="rId2">
+          <a:blip r:embed="rId2" cstate="print">
             <a:extLst>
               <a:ext uri="{28A0092B-C50C-407E-A947-70E740481C1C}">
-                <a14:useLocalDpi xmlns:a14="http://schemas.microsoft.com/office/drawing/2010/main" val="0"/>
+                <a14:useLocalDpi xmlns:a14="http://schemas.microsoft.com/office/drawing/2010/main" xmlns="" val="0"/>
               </a:ext>
             </a:extLst>
           </a:blip>
@@ -8278,7 +8943,7 @@
     </p:spTree>
     <p:extLst>
       <p:ext uri="{BB962C8B-B14F-4D97-AF65-F5344CB8AC3E}">
-        <p14:creationId xmlns:p14="http://schemas.microsoft.com/office/powerpoint/2010/main" val="1156373279"/>
+        <p14:creationId xmlns:p14="http://schemas.microsoft.com/office/powerpoint/2010/main" xmlns="" val="1156373279"/>
       </p:ext>
     </p:extLst>
   </p:cSld>
@@ -8321,10 +8986,10 @@
           <p:nvPr/>
         </p:nvPicPr>
         <p:blipFill>
-          <a:blip r:embed="rId2">
+          <a:blip r:embed="rId2" cstate="print">
             <a:extLst>
               <a:ext uri="{28A0092B-C50C-407E-A947-70E740481C1C}">
-                <a14:useLocalDpi xmlns:a14="http://schemas.microsoft.com/office/drawing/2010/main" val="0"/>
+                <a14:useLocalDpi xmlns:a14="http://schemas.microsoft.com/office/drawing/2010/main" xmlns="" val="0"/>
               </a:ext>
             </a:extLst>
           </a:blip>
@@ -8497,20 +9162,13 @@
               </a:rPr>
               <a:t>http://schema.org/</a:t>
             </a:r>
-            <a:endParaRPr lang="pt-BR" dirty="0">
-              <a:solidFill>
-                <a:schemeClr val="bg1">
-                  <a:lumMod val="85000"/>
-                </a:schemeClr>
-              </a:solidFill>
-            </a:endParaRPr>
           </a:p>
         </p:txBody>
       </p:sp>
     </p:spTree>
     <p:extLst>
       <p:ext uri="{BB962C8B-B14F-4D97-AF65-F5344CB8AC3E}">
-        <p14:creationId xmlns:p14="http://schemas.microsoft.com/office/powerpoint/2010/main" val="1156373279"/>
+        <p14:creationId xmlns:p14="http://schemas.microsoft.com/office/powerpoint/2010/main" xmlns="" val="1156373279"/>
       </p:ext>
     </p:extLst>
   </p:cSld>
@@ -8553,10 +9211,10 @@
           <p:nvPr/>
         </p:nvPicPr>
         <p:blipFill>
-          <a:blip r:embed="rId2">
+          <a:blip r:embed="rId2" cstate="print">
             <a:extLst>
               <a:ext uri="{28A0092B-C50C-407E-A947-70E740481C1C}">
-                <a14:useLocalDpi xmlns:a14="http://schemas.microsoft.com/office/drawing/2010/main" val="0"/>
+                <a14:useLocalDpi xmlns:a14="http://schemas.microsoft.com/office/drawing/2010/main" xmlns="" val="0"/>
               </a:ext>
             </a:extLst>
           </a:blip>
@@ -8636,20 +9294,13 @@
               </a:rPr>
               <a:t>http://www.htmlprogressivo.net/2014/02/HTML-HTML5-Qual-a-Diferenca-O-que-muda.html</a:t>
             </a:r>
-            <a:endParaRPr lang="pt-BR" dirty="0">
-              <a:solidFill>
-                <a:schemeClr val="bg1">
-                  <a:lumMod val="85000"/>
-                </a:schemeClr>
-              </a:solidFill>
-            </a:endParaRPr>
           </a:p>
         </p:txBody>
       </p:sp>
     </p:spTree>
     <p:extLst>
       <p:ext uri="{BB962C8B-B14F-4D97-AF65-F5344CB8AC3E}">
-        <p14:creationId xmlns:p14="http://schemas.microsoft.com/office/powerpoint/2010/main" val="1981461259"/>
+        <p14:creationId xmlns:p14="http://schemas.microsoft.com/office/powerpoint/2010/main" xmlns="" val="1981461259"/>
       </p:ext>
     </p:extLst>
   </p:cSld>
@@ -8692,10 +9343,10 @@
           <p:nvPr/>
         </p:nvPicPr>
         <p:blipFill>
-          <a:blip r:embed="rId2">
+          <a:blip r:embed="rId2" cstate="print">
             <a:extLst>
               <a:ext uri="{28A0092B-C50C-407E-A947-70E740481C1C}">
-                <a14:useLocalDpi xmlns:a14="http://schemas.microsoft.com/office/drawing/2010/main" val="0"/>
+                <a14:useLocalDpi xmlns:a14="http://schemas.microsoft.com/office/drawing/2010/main" xmlns="" val="0"/>
               </a:ext>
             </a:extLst>
           </a:blip>
@@ -8796,10 +9447,10 @@
           <p:nvPr/>
         </p:nvPicPr>
         <p:blipFill>
-          <a:blip r:embed="rId3">
+          <a:blip r:embed="rId3" cstate="print">
             <a:extLst>
               <a:ext uri="{28A0092B-C50C-407E-A947-70E740481C1C}">
-                <a14:useLocalDpi xmlns:a14="http://schemas.microsoft.com/office/drawing/2010/main" val="0"/>
+                <a14:useLocalDpi xmlns:a14="http://schemas.microsoft.com/office/drawing/2010/main" xmlns="" val="0"/>
               </a:ext>
             </a:extLst>
           </a:blip>
@@ -8823,14 +9474,14 @@
           <a:effectLst/>
           <a:extLst>
             <a:ext uri="{909E8E84-426E-40DD-AFC4-6F175D3DCCD1}">
-              <a14:hiddenFill xmlns:a14="http://schemas.microsoft.com/office/drawing/2010/main">
+              <a14:hiddenFill xmlns:a14="http://schemas.microsoft.com/office/drawing/2010/main" xmlns="">
                 <a:solidFill>
                   <a:schemeClr val="accent1"/>
                 </a:solidFill>
               </a14:hiddenFill>
             </a:ext>
             <a:ext uri="{91240B29-F687-4F45-9708-019B960494DF}">
-              <a14:hiddenLine xmlns:a14="http://schemas.microsoft.com/office/drawing/2010/main" w="9525">
+              <a14:hiddenLine xmlns:a14="http://schemas.microsoft.com/office/drawing/2010/main" xmlns="" w="9525">
                 <a:solidFill>
                   <a:schemeClr val="tx1"/>
                 </a:solidFill>
@@ -8840,7 +9491,7 @@
               </a14:hiddenLine>
             </a:ext>
             <a:ext uri="{AF507438-7753-43E0-B8FC-AC1667EBCBE1}">
-              <a14:hiddenEffects xmlns:a14="http://schemas.microsoft.com/office/drawing/2010/main">
+              <a14:hiddenEffects xmlns:a14="http://schemas.microsoft.com/office/drawing/2010/main" xmlns="">
                 <a:effectLst>
                   <a:outerShdw dist="35921" dir="2700000" algn="ctr" rotWithShape="0">
                     <a:schemeClr val="bg2"/>
@@ -8854,7 +9505,7 @@
     </p:spTree>
     <p:extLst>
       <p:ext uri="{BB962C8B-B14F-4D97-AF65-F5344CB8AC3E}">
-        <p14:creationId xmlns:p14="http://schemas.microsoft.com/office/powerpoint/2010/main" val="4060812770"/>
+        <p14:creationId xmlns:p14="http://schemas.microsoft.com/office/powerpoint/2010/main" xmlns="" val="4060812770"/>
       </p:ext>
     </p:extLst>
   </p:cSld>
@@ -8897,10 +9548,10 @@
           <p:nvPr/>
         </p:nvPicPr>
         <p:blipFill>
-          <a:blip r:embed="rId2">
+          <a:blip r:embed="rId2" cstate="print">
             <a:extLst>
               <a:ext uri="{28A0092B-C50C-407E-A947-70E740481C1C}">
-                <a14:useLocalDpi xmlns:a14="http://schemas.microsoft.com/office/drawing/2010/main" val="0"/>
+                <a14:useLocalDpi xmlns:a14="http://schemas.microsoft.com/office/drawing/2010/main" xmlns="" val="0"/>
               </a:ext>
             </a:extLst>
           </a:blip>
@@ -9040,7 +9691,7 @@
     </p:spTree>
     <p:extLst>
       <p:ext uri="{BB962C8B-B14F-4D97-AF65-F5344CB8AC3E}">
-        <p14:creationId xmlns:p14="http://schemas.microsoft.com/office/powerpoint/2010/main" val="4060812770"/>
+        <p14:creationId xmlns:p14="http://schemas.microsoft.com/office/powerpoint/2010/main" xmlns="" val="4060812770"/>
       </p:ext>
     </p:extLst>
   </p:cSld>
@@ -9083,10 +9734,10 @@
           <p:nvPr/>
         </p:nvPicPr>
         <p:blipFill>
-          <a:blip r:embed="rId2">
+          <a:blip r:embed="rId2" cstate="print">
             <a:extLst>
               <a:ext uri="{28A0092B-C50C-407E-A947-70E740481C1C}">
-                <a14:useLocalDpi xmlns:a14="http://schemas.microsoft.com/office/drawing/2010/main" val="0"/>
+                <a14:useLocalDpi xmlns:a14="http://schemas.microsoft.com/office/drawing/2010/main" xmlns="" val="0"/>
               </a:ext>
             </a:extLst>
           </a:blip>
@@ -9224,7 +9875,7 @@
     </p:spTree>
     <p:extLst>
       <p:ext uri="{BB962C8B-B14F-4D97-AF65-F5344CB8AC3E}">
-        <p14:creationId xmlns:p14="http://schemas.microsoft.com/office/powerpoint/2010/main" val="4060812770"/>
+        <p14:creationId xmlns:p14="http://schemas.microsoft.com/office/powerpoint/2010/main" xmlns="" val="4060812770"/>
       </p:ext>
     </p:extLst>
   </p:cSld>
@@ -9267,10 +9918,10 @@
           <p:nvPr/>
         </p:nvPicPr>
         <p:blipFill>
-          <a:blip r:embed="rId2">
+          <a:blip r:embed="rId2" cstate="print">
             <a:extLst>
               <a:ext uri="{28A0092B-C50C-407E-A947-70E740481C1C}">
-                <a14:useLocalDpi xmlns:a14="http://schemas.microsoft.com/office/drawing/2010/main" val="0"/>
+                <a14:useLocalDpi xmlns:a14="http://schemas.microsoft.com/office/drawing/2010/main" xmlns="" val="0"/>
               </a:ext>
             </a:extLst>
           </a:blip>
@@ -9401,10 +10052,10 @@
           <p:nvPr/>
         </p:nvPicPr>
         <p:blipFill>
-          <a:blip r:embed="rId3">
+          <a:blip r:embed="rId3" cstate="print">
             <a:extLst>
               <a:ext uri="{28A0092B-C50C-407E-A947-70E740481C1C}">
-                <a14:useLocalDpi xmlns:a14="http://schemas.microsoft.com/office/drawing/2010/main" val="0"/>
+                <a14:useLocalDpi xmlns:a14="http://schemas.microsoft.com/office/drawing/2010/main" xmlns="" val="0"/>
               </a:ext>
             </a:extLst>
           </a:blip>
@@ -9428,14 +10079,14 @@
           <a:effectLst/>
           <a:extLst>
             <a:ext uri="{909E8E84-426E-40DD-AFC4-6F175D3DCCD1}">
-              <a14:hiddenFill xmlns:a14="http://schemas.microsoft.com/office/drawing/2010/main">
+              <a14:hiddenFill xmlns:a14="http://schemas.microsoft.com/office/drawing/2010/main" xmlns="">
                 <a:solidFill>
                   <a:schemeClr val="accent1"/>
                 </a:solidFill>
               </a14:hiddenFill>
             </a:ext>
             <a:ext uri="{91240B29-F687-4F45-9708-019B960494DF}">
-              <a14:hiddenLine xmlns:a14="http://schemas.microsoft.com/office/drawing/2010/main" w="9525">
+              <a14:hiddenLine xmlns:a14="http://schemas.microsoft.com/office/drawing/2010/main" xmlns="" w="9525">
                 <a:solidFill>
                   <a:schemeClr val="tx1"/>
                 </a:solidFill>
@@ -9445,7 +10096,7 @@
               </a14:hiddenLine>
             </a:ext>
             <a:ext uri="{AF507438-7753-43E0-B8FC-AC1667EBCBE1}">
-              <a14:hiddenEffects xmlns:a14="http://schemas.microsoft.com/office/drawing/2010/main">
+              <a14:hiddenEffects xmlns:a14="http://schemas.microsoft.com/office/drawing/2010/main" xmlns="">
                 <a:effectLst>
                   <a:outerShdw dist="35921" dir="2700000" algn="ctr" rotWithShape="0">
                     <a:schemeClr val="bg2"/>
@@ -9465,10 +10116,10 @@
           <p:nvPr/>
         </p:nvPicPr>
         <p:blipFill>
-          <a:blip r:embed="rId4">
+          <a:blip r:embed="rId4" cstate="print">
             <a:extLst>
               <a:ext uri="{28A0092B-C50C-407E-A947-70E740481C1C}">
-                <a14:useLocalDpi xmlns:a14="http://schemas.microsoft.com/office/drawing/2010/main" val="0"/>
+                <a14:useLocalDpi xmlns:a14="http://schemas.microsoft.com/office/drawing/2010/main" xmlns="" val="0"/>
               </a:ext>
             </a:extLst>
           </a:blip>
@@ -9492,14 +10143,14 @@
           <a:effectLst/>
           <a:extLst>
             <a:ext uri="{909E8E84-426E-40DD-AFC4-6F175D3DCCD1}">
-              <a14:hiddenFill xmlns:a14="http://schemas.microsoft.com/office/drawing/2010/main">
+              <a14:hiddenFill xmlns:a14="http://schemas.microsoft.com/office/drawing/2010/main" xmlns="">
                 <a:solidFill>
                   <a:schemeClr val="accent1"/>
                 </a:solidFill>
               </a14:hiddenFill>
             </a:ext>
             <a:ext uri="{91240B29-F687-4F45-9708-019B960494DF}">
-              <a14:hiddenLine xmlns:a14="http://schemas.microsoft.com/office/drawing/2010/main" w="9525">
+              <a14:hiddenLine xmlns:a14="http://schemas.microsoft.com/office/drawing/2010/main" xmlns="" w="9525">
                 <a:solidFill>
                   <a:schemeClr val="tx1"/>
                 </a:solidFill>
@@ -9509,7 +10160,7 @@
               </a14:hiddenLine>
             </a:ext>
             <a:ext uri="{AF507438-7753-43E0-B8FC-AC1667EBCBE1}">
-              <a14:hiddenEffects xmlns:a14="http://schemas.microsoft.com/office/drawing/2010/main">
+              <a14:hiddenEffects xmlns:a14="http://schemas.microsoft.com/office/drawing/2010/main" xmlns="">
                 <a:effectLst>
                   <a:outerShdw dist="35921" dir="2700000" algn="ctr" rotWithShape="0">
                     <a:schemeClr val="bg2"/>
@@ -9523,7 +10174,7 @@
     </p:spTree>
     <p:extLst>
       <p:ext uri="{BB962C8B-B14F-4D97-AF65-F5344CB8AC3E}">
-        <p14:creationId xmlns:p14="http://schemas.microsoft.com/office/powerpoint/2010/main" val="4060812770"/>
+        <p14:creationId xmlns:p14="http://schemas.microsoft.com/office/powerpoint/2010/main" xmlns="" val="4060812770"/>
       </p:ext>
     </p:extLst>
   </p:cSld>
@@ -9566,10 +10217,10 @@
           <p:nvPr/>
         </p:nvPicPr>
         <p:blipFill>
-          <a:blip r:embed="rId2">
+          <a:blip r:embed="rId2" cstate="print">
             <a:extLst>
               <a:ext uri="{28A0092B-C50C-407E-A947-70E740481C1C}">
-                <a14:useLocalDpi xmlns:a14="http://schemas.microsoft.com/office/drawing/2010/main" val="0"/>
+                <a14:useLocalDpi xmlns:a14="http://schemas.microsoft.com/office/drawing/2010/main" xmlns="" val="0"/>
               </a:ext>
             </a:extLst>
           </a:blip>
@@ -9703,10 +10354,10 @@
           <p:nvPr/>
         </p:nvPicPr>
         <p:blipFill>
-          <a:blip r:embed="rId3">
+          <a:blip r:embed="rId3" cstate="print">
             <a:extLst>
               <a:ext uri="{28A0092B-C50C-407E-A947-70E740481C1C}">
-                <a14:useLocalDpi xmlns:a14="http://schemas.microsoft.com/office/drawing/2010/main" val="0"/>
+                <a14:useLocalDpi xmlns:a14="http://schemas.microsoft.com/office/drawing/2010/main" xmlns="" val="0"/>
               </a:ext>
             </a:extLst>
           </a:blip>
@@ -9730,14 +10381,14 @@
           <a:effectLst/>
           <a:extLst>
             <a:ext uri="{909E8E84-426E-40DD-AFC4-6F175D3DCCD1}">
-              <a14:hiddenFill xmlns:a14="http://schemas.microsoft.com/office/drawing/2010/main">
+              <a14:hiddenFill xmlns:a14="http://schemas.microsoft.com/office/drawing/2010/main" xmlns="">
                 <a:solidFill>
                   <a:schemeClr val="accent1"/>
                 </a:solidFill>
               </a14:hiddenFill>
             </a:ext>
             <a:ext uri="{91240B29-F687-4F45-9708-019B960494DF}">
-              <a14:hiddenLine xmlns:a14="http://schemas.microsoft.com/office/drawing/2010/main" w="9525">
+              <a14:hiddenLine xmlns:a14="http://schemas.microsoft.com/office/drawing/2010/main" xmlns="" w="9525">
                 <a:solidFill>
                   <a:schemeClr val="tx1"/>
                 </a:solidFill>
@@ -9747,7 +10398,7 @@
               </a14:hiddenLine>
             </a:ext>
             <a:ext uri="{AF507438-7753-43E0-B8FC-AC1667EBCBE1}">
-              <a14:hiddenEffects xmlns:a14="http://schemas.microsoft.com/office/drawing/2010/main">
+              <a14:hiddenEffects xmlns:a14="http://schemas.microsoft.com/office/drawing/2010/main" xmlns="">
                 <a:effectLst>
                   <a:outerShdw dist="35921" dir="2700000" algn="ctr" rotWithShape="0">
                     <a:schemeClr val="bg2"/>
@@ -9767,10 +10418,10 @@
           <p:nvPr/>
         </p:nvPicPr>
         <p:blipFill>
-          <a:blip r:embed="rId4">
+          <a:blip r:embed="rId4" cstate="print">
             <a:extLst>
               <a:ext uri="{28A0092B-C50C-407E-A947-70E740481C1C}">
-                <a14:useLocalDpi xmlns:a14="http://schemas.microsoft.com/office/drawing/2010/main" val="0"/>
+                <a14:useLocalDpi xmlns:a14="http://schemas.microsoft.com/office/drawing/2010/main" xmlns="" val="0"/>
               </a:ext>
             </a:extLst>
           </a:blip>
@@ -9794,14 +10445,14 @@
           <a:effectLst/>
           <a:extLst>
             <a:ext uri="{909E8E84-426E-40DD-AFC4-6F175D3DCCD1}">
-              <a14:hiddenFill xmlns:a14="http://schemas.microsoft.com/office/drawing/2010/main">
+              <a14:hiddenFill xmlns:a14="http://schemas.microsoft.com/office/drawing/2010/main" xmlns="">
                 <a:solidFill>
                   <a:schemeClr val="accent1"/>
                 </a:solidFill>
               </a14:hiddenFill>
             </a:ext>
             <a:ext uri="{91240B29-F687-4F45-9708-019B960494DF}">
-              <a14:hiddenLine xmlns:a14="http://schemas.microsoft.com/office/drawing/2010/main" w="9525">
+              <a14:hiddenLine xmlns:a14="http://schemas.microsoft.com/office/drawing/2010/main" xmlns="" w="9525">
                 <a:solidFill>
                   <a:schemeClr val="tx1"/>
                 </a:solidFill>
@@ -9811,7 +10462,7 @@
               </a14:hiddenLine>
             </a:ext>
             <a:ext uri="{AF507438-7753-43E0-B8FC-AC1667EBCBE1}">
-              <a14:hiddenEffects xmlns:a14="http://schemas.microsoft.com/office/drawing/2010/main">
+              <a14:hiddenEffects xmlns:a14="http://schemas.microsoft.com/office/drawing/2010/main" xmlns="">
                 <a:effectLst>
                   <a:outerShdw dist="35921" dir="2700000" algn="ctr" rotWithShape="0">
                     <a:schemeClr val="bg2"/>
@@ -9825,7 +10476,7 @@
     </p:spTree>
     <p:extLst>
       <p:ext uri="{BB962C8B-B14F-4D97-AF65-F5344CB8AC3E}">
-        <p14:creationId xmlns:p14="http://schemas.microsoft.com/office/powerpoint/2010/main" val="4060812770"/>
+        <p14:creationId xmlns:p14="http://schemas.microsoft.com/office/powerpoint/2010/main" xmlns="" val="4060812770"/>
       </p:ext>
     </p:extLst>
   </p:cSld>
@@ -9868,10 +10519,10 @@
           <p:nvPr/>
         </p:nvPicPr>
         <p:blipFill>
-          <a:blip r:embed="rId2">
+          <a:blip r:embed="rId2" cstate="print">
             <a:extLst>
               <a:ext uri="{28A0092B-C50C-407E-A947-70E740481C1C}">
-                <a14:useLocalDpi xmlns:a14="http://schemas.microsoft.com/office/drawing/2010/main" val="0"/>
+                <a14:useLocalDpi xmlns:a14="http://schemas.microsoft.com/office/drawing/2010/main" xmlns="" val="0"/>
               </a:ext>
             </a:extLst>
           </a:blip>
@@ -10000,10 +10651,10 @@
           <p:nvPr/>
         </p:nvPicPr>
         <p:blipFill>
-          <a:blip r:embed="rId3">
+          <a:blip r:embed="rId3" cstate="print">
             <a:extLst>
               <a:ext uri="{28A0092B-C50C-407E-A947-70E740481C1C}">
-                <a14:useLocalDpi xmlns:a14="http://schemas.microsoft.com/office/drawing/2010/main" val="0"/>
+                <a14:useLocalDpi xmlns:a14="http://schemas.microsoft.com/office/drawing/2010/main" xmlns="" val="0"/>
               </a:ext>
             </a:extLst>
           </a:blip>
@@ -10027,14 +10678,14 @@
           <a:effectLst/>
           <a:extLst>
             <a:ext uri="{909E8E84-426E-40DD-AFC4-6F175D3DCCD1}">
-              <a14:hiddenFill xmlns:a14="http://schemas.microsoft.com/office/drawing/2010/main">
+              <a14:hiddenFill xmlns:a14="http://schemas.microsoft.com/office/drawing/2010/main" xmlns="">
                 <a:solidFill>
                   <a:schemeClr val="accent1"/>
                 </a:solidFill>
               </a14:hiddenFill>
             </a:ext>
             <a:ext uri="{91240B29-F687-4F45-9708-019B960494DF}">
-              <a14:hiddenLine xmlns:a14="http://schemas.microsoft.com/office/drawing/2010/main" w="9525">
+              <a14:hiddenLine xmlns:a14="http://schemas.microsoft.com/office/drawing/2010/main" xmlns="" w="9525">
                 <a:solidFill>
                   <a:schemeClr val="tx1"/>
                 </a:solidFill>
@@ -10044,7 +10695,7 @@
               </a14:hiddenLine>
             </a:ext>
             <a:ext uri="{AF507438-7753-43E0-B8FC-AC1667EBCBE1}">
-              <a14:hiddenEffects xmlns:a14="http://schemas.microsoft.com/office/drawing/2010/main">
+              <a14:hiddenEffects xmlns:a14="http://schemas.microsoft.com/office/drawing/2010/main" xmlns="">
                 <a:effectLst>
                   <a:outerShdw dist="35921" dir="2700000" algn="ctr" rotWithShape="0">
                     <a:schemeClr val="bg2"/>
@@ -10064,10 +10715,10 @@
           <p:nvPr/>
         </p:nvPicPr>
         <p:blipFill>
-          <a:blip r:embed="rId4">
+          <a:blip r:embed="rId4" cstate="print">
             <a:extLst>
               <a:ext uri="{28A0092B-C50C-407E-A947-70E740481C1C}">
-                <a14:useLocalDpi xmlns:a14="http://schemas.microsoft.com/office/drawing/2010/main" val="0"/>
+                <a14:useLocalDpi xmlns:a14="http://schemas.microsoft.com/office/drawing/2010/main" xmlns="" val="0"/>
               </a:ext>
             </a:extLst>
           </a:blip>
@@ -10091,14 +10742,14 @@
           <a:effectLst/>
           <a:extLst>
             <a:ext uri="{909E8E84-426E-40DD-AFC4-6F175D3DCCD1}">
-              <a14:hiddenFill xmlns:a14="http://schemas.microsoft.com/office/drawing/2010/main">
+              <a14:hiddenFill xmlns:a14="http://schemas.microsoft.com/office/drawing/2010/main" xmlns="">
                 <a:solidFill>
                   <a:schemeClr val="accent1"/>
                 </a:solidFill>
               </a14:hiddenFill>
             </a:ext>
             <a:ext uri="{91240B29-F687-4F45-9708-019B960494DF}">
-              <a14:hiddenLine xmlns:a14="http://schemas.microsoft.com/office/drawing/2010/main" w="9525">
+              <a14:hiddenLine xmlns:a14="http://schemas.microsoft.com/office/drawing/2010/main" xmlns="" w="9525">
                 <a:solidFill>
                   <a:schemeClr val="tx1"/>
                 </a:solidFill>
@@ -10108,7 +10759,7 @@
               </a14:hiddenLine>
             </a:ext>
             <a:ext uri="{AF507438-7753-43E0-B8FC-AC1667EBCBE1}">
-              <a14:hiddenEffects xmlns:a14="http://schemas.microsoft.com/office/drawing/2010/main">
+              <a14:hiddenEffects xmlns:a14="http://schemas.microsoft.com/office/drawing/2010/main" xmlns="">
                 <a:effectLst>
                   <a:outerShdw dist="35921" dir="2700000" algn="ctr" rotWithShape="0">
                     <a:schemeClr val="bg2"/>
@@ -10122,7 +10773,7 @@
     </p:spTree>
     <p:extLst>
       <p:ext uri="{BB962C8B-B14F-4D97-AF65-F5344CB8AC3E}">
-        <p14:creationId xmlns:p14="http://schemas.microsoft.com/office/powerpoint/2010/main" val="4060812770"/>
+        <p14:creationId xmlns:p14="http://schemas.microsoft.com/office/powerpoint/2010/main" xmlns="" val="4060812770"/>
       </p:ext>
     </p:extLst>
   </p:cSld>

</xml_diff>

<commit_message>
Página de exemplo concluída.
</commit_message>
<xml_diff>
--- a/_Presentation/apresentacao.pptx
+++ b/_Presentation/apresentacao.pptx
@@ -383,7 +383,7 @@
             <a:fld id="{E650F5AF-5A7A-4DEE-952A-AB5DF242B9CD}" type="slidenum">
               <a:rPr lang="pt-BR" smtClean="0"/>
               <a:pPr/>
-              <a:t>‹nº›</a:t>
+              <a:t>‹#›</a:t>
             </a:fld>
             <a:endParaRPr lang="pt-BR"/>
           </a:p>
@@ -392,7 +392,7 @@
     </p:spTree>
     <p:extLst>
       <p:ext uri="{BB962C8B-B14F-4D97-AF65-F5344CB8AC3E}">
-        <p14:creationId xmlns="" xmlns:p14="http://schemas.microsoft.com/office/powerpoint/2010/main" val="1871700233"/>
+        <p14:creationId xmlns:p14="http://schemas.microsoft.com/office/powerpoint/2010/main" val="1871700233"/>
       </p:ext>
     </p:extLst>
   </p:cSld>
@@ -555,7 +555,7 @@
             <a:fld id="{E650F5AF-5A7A-4DEE-952A-AB5DF242B9CD}" type="slidenum">
               <a:rPr lang="pt-BR" smtClean="0"/>
               <a:pPr/>
-              <a:t>‹nº›</a:t>
+              <a:t>‹#›</a:t>
             </a:fld>
             <a:endParaRPr lang="pt-BR"/>
           </a:p>
@@ -564,7 +564,7 @@
     </p:spTree>
     <p:extLst>
       <p:ext uri="{BB962C8B-B14F-4D97-AF65-F5344CB8AC3E}">
-        <p14:creationId xmlns="" xmlns:p14="http://schemas.microsoft.com/office/powerpoint/2010/main" val="3922913854"/>
+        <p14:creationId xmlns:p14="http://schemas.microsoft.com/office/powerpoint/2010/main" val="3922913854"/>
       </p:ext>
     </p:extLst>
   </p:cSld>
@@ -737,7 +737,7 @@
             <a:fld id="{E650F5AF-5A7A-4DEE-952A-AB5DF242B9CD}" type="slidenum">
               <a:rPr lang="pt-BR" smtClean="0"/>
               <a:pPr/>
-              <a:t>‹nº›</a:t>
+              <a:t>‹#›</a:t>
             </a:fld>
             <a:endParaRPr lang="pt-BR"/>
           </a:p>
@@ -746,7 +746,7 @@
     </p:spTree>
     <p:extLst>
       <p:ext uri="{BB962C8B-B14F-4D97-AF65-F5344CB8AC3E}">
-        <p14:creationId xmlns="" xmlns:p14="http://schemas.microsoft.com/office/powerpoint/2010/main" val="2432475685"/>
+        <p14:creationId xmlns:p14="http://schemas.microsoft.com/office/powerpoint/2010/main" val="2432475685"/>
       </p:ext>
     </p:extLst>
   </p:cSld>
@@ -909,7 +909,7 @@
             <a:fld id="{E650F5AF-5A7A-4DEE-952A-AB5DF242B9CD}" type="slidenum">
               <a:rPr lang="pt-BR" smtClean="0"/>
               <a:pPr/>
-              <a:t>‹nº›</a:t>
+              <a:t>‹#›</a:t>
             </a:fld>
             <a:endParaRPr lang="pt-BR"/>
           </a:p>
@@ -918,7 +918,7 @@
     </p:spTree>
     <p:extLst>
       <p:ext uri="{BB962C8B-B14F-4D97-AF65-F5344CB8AC3E}">
-        <p14:creationId xmlns="" xmlns:p14="http://schemas.microsoft.com/office/powerpoint/2010/main" val="2071654542"/>
+        <p14:creationId xmlns:p14="http://schemas.microsoft.com/office/powerpoint/2010/main" val="2071654542"/>
       </p:ext>
     </p:extLst>
   </p:cSld>
@@ -1157,7 +1157,7 @@
             <a:fld id="{E650F5AF-5A7A-4DEE-952A-AB5DF242B9CD}" type="slidenum">
               <a:rPr lang="pt-BR" smtClean="0"/>
               <a:pPr/>
-              <a:t>‹nº›</a:t>
+              <a:t>‹#›</a:t>
             </a:fld>
             <a:endParaRPr lang="pt-BR"/>
           </a:p>
@@ -1166,7 +1166,7 @@
     </p:spTree>
     <p:extLst>
       <p:ext uri="{BB962C8B-B14F-4D97-AF65-F5344CB8AC3E}">
-        <p14:creationId xmlns="" xmlns:p14="http://schemas.microsoft.com/office/powerpoint/2010/main" val="236866593"/>
+        <p14:creationId xmlns:p14="http://schemas.microsoft.com/office/powerpoint/2010/main" val="236866593"/>
       </p:ext>
     </p:extLst>
   </p:cSld>
@@ -1447,7 +1447,7 @@
             <a:fld id="{E650F5AF-5A7A-4DEE-952A-AB5DF242B9CD}" type="slidenum">
               <a:rPr lang="pt-BR" smtClean="0"/>
               <a:pPr/>
-              <a:t>‹nº›</a:t>
+              <a:t>‹#›</a:t>
             </a:fld>
             <a:endParaRPr lang="pt-BR"/>
           </a:p>
@@ -1456,7 +1456,7 @@
     </p:spTree>
     <p:extLst>
       <p:ext uri="{BB962C8B-B14F-4D97-AF65-F5344CB8AC3E}">
-        <p14:creationId xmlns="" xmlns:p14="http://schemas.microsoft.com/office/powerpoint/2010/main" val="220780165"/>
+        <p14:creationId xmlns:p14="http://schemas.microsoft.com/office/powerpoint/2010/main" val="220780165"/>
       </p:ext>
     </p:extLst>
   </p:cSld>
@@ -1871,7 +1871,7 @@
             <a:fld id="{E650F5AF-5A7A-4DEE-952A-AB5DF242B9CD}" type="slidenum">
               <a:rPr lang="pt-BR" smtClean="0"/>
               <a:pPr/>
-              <a:t>‹nº›</a:t>
+              <a:t>‹#›</a:t>
             </a:fld>
             <a:endParaRPr lang="pt-BR"/>
           </a:p>
@@ -1880,7 +1880,7 @@
     </p:spTree>
     <p:extLst>
       <p:ext uri="{BB962C8B-B14F-4D97-AF65-F5344CB8AC3E}">
-        <p14:creationId xmlns="" xmlns:p14="http://schemas.microsoft.com/office/powerpoint/2010/main" val="3569403052"/>
+        <p14:creationId xmlns:p14="http://schemas.microsoft.com/office/powerpoint/2010/main" val="3569403052"/>
       </p:ext>
     </p:extLst>
   </p:cSld>
@@ -1991,7 +1991,7 @@
             <a:fld id="{E650F5AF-5A7A-4DEE-952A-AB5DF242B9CD}" type="slidenum">
               <a:rPr lang="pt-BR" smtClean="0"/>
               <a:pPr/>
-              <a:t>‹nº›</a:t>
+              <a:t>‹#›</a:t>
             </a:fld>
             <a:endParaRPr lang="pt-BR"/>
           </a:p>
@@ -2000,7 +2000,7 @@
     </p:spTree>
     <p:extLst>
       <p:ext uri="{BB962C8B-B14F-4D97-AF65-F5344CB8AC3E}">
-        <p14:creationId xmlns="" xmlns:p14="http://schemas.microsoft.com/office/powerpoint/2010/main" val="2359431751"/>
+        <p14:creationId xmlns:p14="http://schemas.microsoft.com/office/powerpoint/2010/main" val="2359431751"/>
       </p:ext>
     </p:extLst>
   </p:cSld>
@@ -2088,7 +2088,7 @@
             <a:fld id="{E650F5AF-5A7A-4DEE-952A-AB5DF242B9CD}" type="slidenum">
               <a:rPr lang="pt-BR" smtClean="0"/>
               <a:pPr/>
-              <a:t>‹nº›</a:t>
+              <a:t>‹#›</a:t>
             </a:fld>
             <a:endParaRPr lang="pt-BR"/>
           </a:p>
@@ -2097,7 +2097,7 @@
     </p:spTree>
     <p:extLst>
       <p:ext uri="{BB962C8B-B14F-4D97-AF65-F5344CB8AC3E}">
-        <p14:creationId xmlns="" xmlns:p14="http://schemas.microsoft.com/office/powerpoint/2010/main" val="487197514"/>
+        <p14:creationId xmlns:p14="http://schemas.microsoft.com/office/powerpoint/2010/main" val="487197514"/>
       </p:ext>
     </p:extLst>
   </p:cSld>
@@ -2367,7 +2367,7 @@
             <a:fld id="{E650F5AF-5A7A-4DEE-952A-AB5DF242B9CD}" type="slidenum">
               <a:rPr lang="pt-BR" smtClean="0"/>
               <a:pPr/>
-              <a:t>‹nº›</a:t>
+              <a:t>‹#›</a:t>
             </a:fld>
             <a:endParaRPr lang="pt-BR"/>
           </a:p>
@@ -2376,7 +2376,7 @@
     </p:spTree>
     <p:extLst>
       <p:ext uri="{BB962C8B-B14F-4D97-AF65-F5344CB8AC3E}">
-        <p14:creationId xmlns="" xmlns:p14="http://schemas.microsoft.com/office/powerpoint/2010/main" val="3436097000"/>
+        <p14:creationId xmlns:p14="http://schemas.microsoft.com/office/powerpoint/2010/main" val="3436097000"/>
       </p:ext>
     </p:extLst>
   </p:cSld>
@@ -2622,7 +2622,7 @@
             <a:fld id="{E650F5AF-5A7A-4DEE-952A-AB5DF242B9CD}" type="slidenum">
               <a:rPr lang="pt-BR" smtClean="0"/>
               <a:pPr/>
-              <a:t>‹nº›</a:t>
+              <a:t>‹#›</a:t>
             </a:fld>
             <a:endParaRPr lang="pt-BR"/>
           </a:p>
@@ -2631,7 +2631,7 @@
     </p:spTree>
     <p:extLst>
       <p:ext uri="{BB962C8B-B14F-4D97-AF65-F5344CB8AC3E}">
-        <p14:creationId xmlns="" xmlns:p14="http://schemas.microsoft.com/office/powerpoint/2010/main" val="524006705"/>
+        <p14:creationId xmlns:p14="http://schemas.microsoft.com/office/powerpoint/2010/main" val="524006705"/>
       </p:ext>
     </p:extLst>
   </p:cSld>
@@ -2873,7 +2873,7 @@
             <a:fld id="{E650F5AF-5A7A-4DEE-952A-AB5DF242B9CD}" type="slidenum">
               <a:rPr lang="pt-BR" smtClean="0"/>
               <a:pPr/>
-              <a:t>‹nº›</a:t>
+              <a:t>‹#›</a:t>
             </a:fld>
             <a:endParaRPr lang="pt-BR"/>
           </a:p>
@@ -2882,7 +2882,7 @@
     </p:spTree>
     <p:extLst>
       <p:ext uri="{BB962C8B-B14F-4D97-AF65-F5344CB8AC3E}">
-        <p14:creationId xmlns="" xmlns:p14="http://schemas.microsoft.com/office/powerpoint/2010/main" val="1043027552"/>
+        <p14:creationId xmlns:p14="http://schemas.microsoft.com/office/powerpoint/2010/main" val="1043027552"/>
       </p:ext>
     </p:extLst>
   </p:cSld>
@@ -3182,7 +3182,7 @@
           <a:blip r:embed="rId2" cstate="print">
             <a:extLst>
               <a:ext uri="{28A0092B-C50C-407E-A947-70E740481C1C}">
-                <a14:useLocalDpi xmlns="" xmlns:a14="http://schemas.microsoft.com/office/drawing/2010/main" val="0"/>
+                <a14:useLocalDpi xmlns:a14="http://schemas.microsoft.com/office/drawing/2010/main" val="0"/>
               </a:ext>
             </a:extLst>
           </a:blip>
@@ -3302,7 +3302,7 @@
           <a:blip r:embed="rId3" cstate="print">
             <a:extLst>
               <a:ext uri="{28A0092B-C50C-407E-A947-70E740481C1C}">
-                <a14:useLocalDpi xmlns="" xmlns:a14="http://schemas.microsoft.com/office/drawing/2010/main" val="0"/>
+                <a14:useLocalDpi xmlns:a14="http://schemas.microsoft.com/office/drawing/2010/main" val="0"/>
               </a:ext>
             </a:extLst>
           </a:blip>
@@ -3323,7 +3323,7 @@
     </p:spTree>
     <p:extLst>
       <p:ext uri="{BB962C8B-B14F-4D97-AF65-F5344CB8AC3E}">
-        <p14:creationId xmlns="" xmlns:p14="http://schemas.microsoft.com/office/powerpoint/2010/main" val="1124906220"/>
+        <p14:creationId xmlns:p14="http://schemas.microsoft.com/office/powerpoint/2010/main" val="1124906220"/>
       </p:ext>
     </p:extLst>
   </p:cSld>
@@ -3369,7 +3369,7 @@
           <a:blip r:embed="rId2" cstate="print">
             <a:extLst>
               <a:ext uri="{28A0092B-C50C-407E-A947-70E740481C1C}">
-                <a14:useLocalDpi xmlns="" xmlns:a14="http://schemas.microsoft.com/office/drawing/2010/main" val="0"/>
+                <a14:useLocalDpi xmlns:a14="http://schemas.microsoft.com/office/drawing/2010/main" val="0"/>
               </a:ext>
             </a:extLst>
           </a:blip>
@@ -3501,7 +3501,7 @@
           <a:blip r:embed="rId3" cstate="print">
             <a:extLst>
               <a:ext uri="{28A0092B-C50C-407E-A947-70E740481C1C}">
-                <a14:useLocalDpi xmlns="" xmlns:a14="http://schemas.microsoft.com/office/drawing/2010/main" val="0"/>
+                <a14:useLocalDpi xmlns:a14="http://schemas.microsoft.com/office/drawing/2010/main" val="0"/>
               </a:ext>
             </a:extLst>
           </a:blip>
@@ -3525,14 +3525,14 @@
           <a:effectLst/>
           <a:extLst>
             <a:ext uri="{909E8E84-426E-40DD-AFC4-6F175D3DCCD1}">
-              <a14:hiddenFill xmlns="" xmlns:a14="http://schemas.microsoft.com/office/drawing/2010/main">
+              <a14:hiddenFill xmlns:a14="http://schemas.microsoft.com/office/drawing/2010/main">
                 <a:solidFill>
                   <a:schemeClr val="accent1"/>
                 </a:solidFill>
               </a14:hiddenFill>
             </a:ext>
             <a:ext uri="{91240B29-F687-4F45-9708-019B960494DF}">
-              <a14:hiddenLine xmlns="" xmlns:a14="http://schemas.microsoft.com/office/drawing/2010/main" w="9525">
+              <a14:hiddenLine xmlns:a14="http://schemas.microsoft.com/office/drawing/2010/main" w="9525">
                 <a:solidFill>
                   <a:schemeClr val="tx1"/>
                 </a:solidFill>
@@ -3542,7 +3542,7 @@
               </a14:hiddenLine>
             </a:ext>
             <a:ext uri="{AF507438-7753-43E0-B8FC-AC1667EBCBE1}">
-              <a14:hiddenEffects xmlns="" xmlns:a14="http://schemas.microsoft.com/office/drawing/2010/main">
+              <a14:hiddenEffects xmlns:a14="http://schemas.microsoft.com/office/drawing/2010/main">
                 <a:effectLst>
                   <a:outerShdw dist="35921" dir="2700000" algn="ctr" rotWithShape="0">
                     <a:schemeClr val="bg2"/>
@@ -3565,7 +3565,7 @@
           <a:blip r:embed="rId4" cstate="print">
             <a:extLst>
               <a:ext uri="{28A0092B-C50C-407E-A947-70E740481C1C}">
-                <a14:useLocalDpi xmlns="" xmlns:a14="http://schemas.microsoft.com/office/drawing/2010/main" val="0"/>
+                <a14:useLocalDpi xmlns:a14="http://schemas.microsoft.com/office/drawing/2010/main" val="0"/>
               </a:ext>
             </a:extLst>
           </a:blip>
@@ -3589,14 +3589,14 @@
           <a:effectLst/>
           <a:extLst>
             <a:ext uri="{909E8E84-426E-40DD-AFC4-6F175D3DCCD1}">
-              <a14:hiddenFill xmlns="" xmlns:a14="http://schemas.microsoft.com/office/drawing/2010/main">
+              <a14:hiddenFill xmlns:a14="http://schemas.microsoft.com/office/drawing/2010/main">
                 <a:solidFill>
                   <a:schemeClr val="accent1"/>
                 </a:solidFill>
               </a14:hiddenFill>
             </a:ext>
             <a:ext uri="{91240B29-F687-4F45-9708-019B960494DF}">
-              <a14:hiddenLine xmlns="" xmlns:a14="http://schemas.microsoft.com/office/drawing/2010/main" w="9525">
+              <a14:hiddenLine xmlns:a14="http://schemas.microsoft.com/office/drawing/2010/main" w="9525">
                 <a:solidFill>
                   <a:schemeClr val="tx1"/>
                 </a:solidFill>
@@ -3606,7 +3606,7 @@
               </a14:hiddenLine>
             </a:ext>
             <a:ext uri="{AF507438-7753-43E0-B8FC-AC1667EBCBE1}">
-              <a14:hiddenEffects xmlns="" xmlns:a14="http://schemas.microsoft.com/office/drawing/2010/main">
+              <a14:hiddenEffects xmlns:a14="http://schemas.microsoft.com/office/drawing/2010/main">
                 <a:effectLst>
                   <a:outerShdw dist="35921" dir="2700000" algn="ctr" rotWithShape="0">
                     <a:schemeClr val="bg2"/>
@@ -3620,7 +3620,7 @@
     </p:spTree>
     <p:extLst>
       <p:ext uri="{BB962C8B-B14F-4D97-AF65-F5344CB8AC3E}">
-        <p14:creationId xmlns="" xmlns:p14="http://schemas.microsoft.com/office/powerpoint/2010/main" val="4060812770"/>
+        <p14:creationId xmlns:p14="http://schemas.microsoft.com/office/powerpoint/2010/main" val="4060812770"/>
       </p:ext>
     </p:extLst>
   </p:cSld>
@@ -3666,7 +3666,7 @@
           <a:blip r:embed="rId2" cstate="print">
             <a:extLst>
               <a:ext uri="{28A0092B-C50C-407E-A947-70E740481C1C}">
-                <a14:useLocalDpi xmlns="" xmlns:a14="http://schemas.microsoft.com/office/drawing/2010/main" val="0"/>
+                <a14:useLocalDpi xmlns:a14="http://schemas.microsoft.com/office/drawing/2010/main" val="0"/>
               </a:ext>
             </a:extLst>
           </a:blip>
@@ -3779,7 +3779,7 @@
     </p:spTree>
     <p:extLst>
       <p:ext uri="{BB962C8B-B14F-4D97-AF65-F5344CB8AC3E}">
-        <p14:creationId xmlns="" xmlns:p14="http://schemas.microsoft.com/office/powerpoint/2010/main" val="4060812770"/>
+        <p14:creationId xmlns:p14="http://schemas.microsoft.com/office/powerpoint/2010/main" val="4060812770"/>
       </p:ext>
     </p:extLst>
   </p:cSld>
@@ -3825,7 +3825,7 @@
           <a:blip r:embed="rId2" cstate="print">
             <a:extLst>
               <a:ext uri="{28A0092B-C50C-407E-A947-70E740481C1C}">
-                <a14:useLocalDpi xmlns="" xmlns:a14="http://schemas.microsoft.com/office/drawing/2010/main" val="0"/>
+                <a14:useLocalDpi xmlns:a14="http://schemas.microsoft.com/office/drawing/2010/main" val="0"/>
               </a:ext>
             </a:extLst>
           </a:blip>
@@ -4040,7 +4040,7 @@
     </p:spTree>
     <p:extLst>
       <p:ext uri="{BB962C8B-B14F-4D97-AF65-F5344CB8AC3E}">
-        <p14:creationId xmlns="" xmlns:p14="http://schemas.microsoft.com/office/powerpoint/2010/main" val="1236626834"/>
+        <p14:creationId xmlns:p14="http://schemas.microsoft.com/office/powerpoint/2010/main" val="1236626834"/>
       </p:ext>
     </p:extLst>
   </p:cSld>
@@ -4086,7 +4086,7 @@
           <a:blip r:embed="rId2" cstate="print">
             <a:extLst>
               <a:ext uri="{28A0092B-C50C-407E-A947-70E740481C1C}">
-                <a14:useLocalDpi xmlns="" xmlns:a14="http://schemas.microsoft.com/office/drawing/2010/main" val="0"/>
+                <a14:useLocalDpi xmlns:a14="http://schemas.microsoft.com/office/drawing/2010/main" val="0"/>
               </a:ext>
             </a:extLst>
           </a:blip>
@@ -4284,7 +4284,7 @@
     </p:spTree>
     <p:extLst>
       <p:ext uri="{BB962C8B-B14F-4D97-AF65-F5344CB8AC3E}">
-        <p14:creationId xmlns="" xmlns:p14="http://schemas.microsoft.com/office/powerpoint/2010/main" val="4060812770"/>
+        <p14:creationId xmlns:p14="http://schemas.microsoft.com/office/powerpoint/2010/main" val="4060812770"/>
       </p:ext>
     </p:extLst>
   </p:cSld>
@@ -4330,7 +4330,7 @@
           <a:blip r:embed="rId2" cstate="print">
             <a:extLst>
               <a:ext uri="{28A0092B-C50C-407E-A947-70E740481C1C}">
-                <a14:useLocalDpi xmlns="" xmlns:a14="http://schemas.microsoft.com/office/drawing/2010/main" val="0"/>
+                <a14:useLocalDpi xmlns:a14="http://schemas.microsoft.com/office/drawing/2010/main" val="0"/>
               </a:ext>
             </a:extLst>
           </a:blip>
@@ -4509,7 +4509,7 @@
     </p:spTree>
     <p:extLst>
       <p:ext uri="{BB962C8B-B14F-4D97-AF65-F5344CB8AC3E}">
-        <p14:creationId xmlns="" xmlns:p14="http://schemas.microsoft.com/office/powerpoint/2010/main" val="3308039092"/>
+        <p14:creationId xmlns:p14="http://schemas.microsoft.com/office/powerpoint/2010/main" val="3308039092"/>
       </p:ext>
     </p:extLst>
   </p:cSld>
@@ -4555,7 +4555,7 @@
           <a:blip r:embed="rId2" cstate="print">
             <a:extLst>
               <a:ext uri="{28A0092B-C50C-407E-A947-70E740481C1C}">
-                <a14:useLocalDpi xmlns="" xmlns:a14="http://schemas.microsoft.com/office/drawing/2010/main" val="0"/>
+                <a14:useLocalDpi xmlns:a14="http://schemas.microsoft.com/office/drawing/2010/main" val="0"/>
               </a:ext>
             </a:extLst>
           </a:blip>
@@ -4699,7 +4699,7 @@
     </p:spTree>
     <p:extLst>
       <p:ext uri="{BB962C8B-B14F-4D97-AF65-F5344CB8AC3E}">
-        <p14:creationId xmlns="" xmlns:p14="http://schemas.microsoft.com/office/powerpoint/2010/main" val="3308039092"/>
+        <p14:creationId xmlns:p14="http://schemas.microsoft.com/office/powerpoint/2010/main" val="3308039092"/>
       </p:ext>
     </p:extLst>
   </p:cSld>
@@ -4745,7 +4745,7 @@
           <a:blip r:embed="rId2" cstate="print">
             <a:extLst>
               <a:ext uri="{28A0092B-C50C-407E-A947-70E740481C1C}">
-                <a14:useLocalDpi xmlns="" xmlns:a14="http://schemas.microsoft.com/office/drawing/2010/main" val="0"/>
+                <a14:useLocalDpi xmlns:a14="http://schemas.microsoft.com/office/drawing/2010/main" val="0"/>
               </a:ext>
             </a:extLst>
           </a:blip>
@@ -4916,7 +4916,7 @@
     </p:spTree>
     <p:extLst>
       <p:ext uri="{BB962C8B-B14F-4D97-AF65-F5344CB8AC3E}">
-        <p14:creationId xmlns="" xmlns:p14="http://schemas.microsoft.com/office/powerpoint/2010/main" val="3345411651"/>
+        <p14:creationId xmlns:p14="http://schemas.microsoft.com/office/powerpoint/2010/main" val="3345411651"/>
       </p:ext>
     </p:extLst>
   </p:cSld>
@@ -4962,7 +4962,7 @@
           <a:blip r:embed="rId2" cstate="print">
             <a:extLst>
               <a:ext uri="{28A0092B-C50C-407E-A947-70E740481C1C}">
-                <a14:useLocalDpi xmlns="" xmlns:a14="http://schemas.microsoft.com/office/drawing/2010/main" val="0"/>
+                <a14:useLocalDpi xmlns:a14="http://schemas.microsoft.com/office/drawing/2010/main" val="0"/>
               </a:ext>
             </a:extLst>
           </a:blip>
@@ -5069,7 +5069,7 @@
           <a:blip r:embed="rId3" cstate="print">
             <a:extLst>
               <a:ext uri="{28A0092B-C50C-407E-A947-70E740481C1C}">
-                <a14:useLocalDpi xmlns="" xmlns:a14="http://schemas.microsoft.com/office/drawing/2010/main" val="0"/>
+                <a14:useLocalDpi xmlns:a14="http://schemas.microsoft.com/office/drawing/2010/main" val="0"/>
               </a:ext>
             </a:extLst>
           </a:blip>
@@ -5087,7 +5087,7 @@
     </p:spTree>
     <p:extLst>
       <p:ext uri="{BB962C8B-B14F-4D97-AF65-F5344CB8AC3E}">
-        <p14:creationId xmlns="" xmlns:p14="http://schemas.microsoft.com/office/powerpoint/2010/main" val="3308039092"/>
+        <p14:creationId xmlns:p14="http://schemas.microsoft.com/office/powerpoint/2010/main" val="3308039092"/>
       </p:ext>
     </p:extLst>
   </p:cSld>
@@ -5133,7 +5133,7 @@
           <a:blip r:embed="rId2" cstate="print">
             <a:extLst>
               <a:ext uri="{28A0092B-C50C-407E-A947-70E740481C1C}">
-                <a14:useLocalDpi xmlns="" xmlns:a14="http://schemas.microsoft.com/office/drawing/2010/main" val="0"/>
+                <a14:useLocalDpi xmlns:a14="http://schemas.microsoft.com/office/drawing/2010/main" val="0"/>
               </a:ext>
             </a:extLst>
           </a:blip>
@@ -5240,7 +5240,7 @@
           <a:blip r:embed="rId3" cstate="print">
             <a:extLst>
               <a:ext uri="{28A0092B-C50C-407E-A947-70E740481C1C}">
-                <a14:useLocalDpi xmlns="" xmlns:a14="http://schemas.microsoft.com/office/drawing/2010/main" val="0"/>
+                <a14:useLocalDpi xmlns:a14="http://schemas.microsoft.com/office/drawing/2010/main" val="0"/>
               </a:ext>
             </a:extLst>
           </a:blip>
@@ -5258,7 +5258,7 @@
     </p:spTree>
     <p:extLst>
       <p:ext uri="{BB962C8B-B14F-4D97-AF65-F5344CB8AC3E}">
-        <p14:creationId xmlns="" xmlns:p14="http://schemas.microsoft.com/office/powerpoint/2010/main" val="3308039092"/>
+        <p14:creationId xmlns:p14="http://schemas.microsoft.com/office/powerpoint/2010/main" val="3308039092"/>
       </p:ext>
     </p:extLst>
   </p:cSld>
@@ -5304,7 +5304,7 @@
           <a:blip r:embed="rId2" cstate="print">
             <a:extLst>
               <a:ext uri="{28A0092B-C50C-407E-A947-70E740481C1C}">
-                <a14:useLocalDpi xmlns="" xmlns:a14="http://schemas.microsoft.com/office/drawing/2010/main" val="0"/>
+                <a14:useLocalDpi xmlns:a14="http://schemas.microsoft.com/office/drawing/2010/main" val="0"/>
               </a:ext>
             </a:extLst>
           </a:blip>
@@ -5538,7 +5538,7 @@
     </p:spTree>
     <p:extLst>
       <p:ext uri="{BB962C8B-B14F-4D97-AF65-F5344CB8AC3E}">
-        <p14:creationId xmlns="" xmlns:p14="http://schemas.microsoft.com/office/powerpoint/2010/main" val="3308039092"/>
+        <p14:creationId xmlns:p14="http://schemas.microsoft.com/office/powerpoint/2010/main" val="3308039092"/>
       </p:ext>
     </p:extLst>
   </p:cSld>
@@ -5584,7 +5584,7 @@
           <a:blip r:embed="rId2" cstate="print">
             <a:extLst>
               <a:ext uri="{28A0092B-C50C-407E-A947-70E740481C1C}">
-                <a14:useLocalDpi xmlns="" xmlns:a14="http://schemas.microsoft.com/office/drawing/2010/main" val="0"/>
+                <a14:useLocalDpi xmlns:a14="http://schemas.microsoft.com/office/drawing/2010/main" val="0"/>
               </a:ext>
             </a:extLst>
           </a:blip>
@@ -5694,13 +5694,6 @@
               </a:rPr>
               <a:t>: </a:t>
             </a:r>
-            <a:endParaRPr lang="pt-BR" dirty="0" smtClean="0">
-              <a:solidFill>
-                <a:schemeClr val="bg1">
-                  <a:lumMod val="75000"/>
-                </a:schemeClr>
-              </a:solidFill>
-            </a:endParaRPr>
           </a:p>
           <a:p>
             <a:pPr lvl="1"/>
@@ -5712,17 +5705,7 @@
                   </a:schemeClr>
                 </a:solidFill>
               </a:rPr>
-              <a:t>https://</a:t>
-            </a:r>
-            <a:r>
-              <a:rPr lang="pt-BR" dirty="0" smtClean="0">
-                <a:solidFill>
-                  <a:schemeClr val="bg1">
-                    <a:lumMod val="75000"/>
-                  </a:schemeClr>
-                </a:solidFill>
-              </a:rPr>
-              <a:t>github.com/Frossard/HTML5-na-pratica</a:t>
+              <a:t>https://github.com/Frossard/HTML5-na-pratica</a:t>
             </a:r>
           </a:p>
           <a:p>
@@ -5759,7 +5742,7 @@
     </p:spTree>
     <p:extLst>
       <p:ext uri="{BB962C8B-B14F-4D97-AF65-F5344CB8AC3E}">
-        <p14:creationId xmlns="" xmlns:p14="http://schemas.microsoft.com/office/powerpoint/2010/main" val="1156373279"/>
+        <p14:creationId xmlns:p14="http://schemas.microsoft.com/office/powerpoint/2010/main" val="1156373279"/>
       </p:ext>
     </p:extLst>
   </p:cSld>
@@ -5805,7 +5788,7 @@
           <a:blip r:embed="rId2" cstate="print">
             <a:extLst>
               <a:ext uri="{28A0092B-C50C-407E-A947-70E740481C1C}">
-                <a14:useLocalDpi xmlns="" xmlns:a14="http://schemas.microsoft.com/office/drawing/2010/main" val="0"/>
+                <a14:useLocalDpi xmlns:a14="http://schemas.microsoft.com/office/drawing/2010/main" val="0"/>
               </a:ext>
             </a:extLst>
           </a:blip>
@@ -6013,7 +5996,7 @@
     </p:spTree>
     <p:extLst>
       <p:ext uri="{BB962C8B-B14F-4D97-AF65-F5344CB8AC3E}">
-        <p14:creationId xmlns="" xmlns:p14="http://schemas.microsoft.com/office/powerpoint/2010/main" val="3308039092"/>
+        <p14:creationId xmlns:p14="http://schemas.microsoft.com/office/powerpoint/2010/main" val="3308039092"/>
       </p:ext>
     </p:extLst>
   </p:cSld>
@@ -6059,7 +6042,7 @@
           <a:blip r:embed="rId2" cstate="print">
             <a:extLst>
               <a:ext uri="{28A0092B-C50C-407E-A947-70E740481C1C}">
-                <a14:useLocalDpi xmlns="" xmlns:a14="http://schemas.microsoft.com/office/drawing/2010/main" val="0"/>
+                <a14:useLocalDpi xmlns:a14="http://schemas.microsoft.com/office/drawing/2010/main" val="0"/>
               </a:ext>
             </a:extLst>
           </a:blip>
@@ -6245,7 +6228,7 @@
     </p:spTree>
     <p:extLst>
       <p:ext uri="{BB962C8B-B14F-4D97-AF65-F5344CB8AC3E}">
-        <p14:creationId xmlns="" xmlns:p14="http://schemas.microsoft.com/office/powerpoint/2010/main" val="3308039092"/>
+        <p14:creationId xmlns:p14="http://schemas.microsoft.com/office/powerpoint/2010/main" val="3308039092"/>
       </p:ext>
     </p:extLst>
   </p:cSld>
@@ -6291,7 +6274,7 @@
           <a:blip r:embed="rId2" cstate="print">
             <a:extLst>
               <a:ext uri="{28A0092B-C50C-407E-A947-70E740481C1C}">
-                <a14:useLocalDpi xmlns="" xmlns:a14="http://schemas.microsoft.com/office/drawing/2010/main" val="0"/>
+                <a14:useLocalDpi xmlns:a14="http://schemas.microsoft.com/office/drawing/2010/main" val="0"/>
               </a:ext>
             </a:extLst>
           </a:blip>
@@ -6522,7 +6505,7 @@
     </p:spTree>
     <p:extLst>
       <p:ext uri="{BB962C8B-B14F-4D97-AF65-F5344CB8AC3E}">
-        <p14:creationId xmlns="" xmlns:p14="http://schemas.microsoft.com/office/powerpoint/2010/main" val="3308039092"/>
+        <p14:creationId xmlns:p14="http://schemas.microsoft.com/office/powerpoint/2010/main" val="3308039092"/>
       </p:ext>
     </p:extLst>
   </p:cSld>
@@ -6568,7 +6551,7 @@
           <a:blip r:embed="rId2" cstate="print">
             <a:extLst>
               <a:ext uri="{28A0092B-C50C-407E-A947-70E740481C1C}">
-                <a14:useLocalDpi xmlns="" xmlns:a14="http://schemas.microsoft.com/office/drawing/2010/main" val="0"/>
+                <a14:useLocalDpi xmlns:a14="http://schemas.microsoft.com/office/drawing/2010/main" val="0"/>
               </a:ext>
             </a:extLst>
           </a:blip>
@@ -6758,7 +6741,7 @@
     </p:spTree>
     <p:extLst>
       <p:ext uri="{BB962C8B-B14F-4D97-AF65-F5344CB8AC3E}">
-        <p14:creationId xmlns="" xmlns:p14="http://schemas.microsoft.com/office/powerpoint/2010/main" val="3308039092"/>
+        <p14:creationId xmlns:p14="http://schemas.microsoft.com/office/powerpoint/2010/main" val="3308039092"/>
       </p:ext>
     </p:extLst>
   </p:cSld>
@@ -6804,7 +6787,7 @@
           <a:blip r:embed="rId2" cstate="print">
             <a:extLst>
               <a:ext uri="{28A0092B-C50C-407E-A947-70E740481C1C}">
-                <a14:useLocalDpi xmlns="" xmlns:a14="http://schemas.microsoft.com/office/drawing/2010/main" val="0"/>
+                <a14:useLocalDpi xmlns:a14="http://schemas.microsoft.com/office/drawing/2010/main" val="0"/>
               </a:ext>
             </a:extLst>
           </a:blip>
@@ -6965,7 +6948,7 @@
     </p:spTree>
     <p:extLst>
       <p:ext uri="{BB962C8B-B14F-4D97-AF65-F5344CB8AC3E}">
-        <p14:creationId xmlns="" xmlns:p14="http://schemas.microsoft.com/office/powerpoint/2010/main" val="3308039092"/>
+        <p14:creationId xmlns:p14="http://schemas.microsoft.com/office/powerpoint/2010/main" val="3308039092"/>
       </p:ext>
     </p:extLst>
   </p:cSld>
@@ -7011,7 +6994,7 @@
           <a:blip r:embed="rId2" cstate="print">
             <a:extLst>
               <a:ext uri="{28A0092B-C50C-407E-A947-70E740481C1C}">
-                <a14:useLocalDpi xmlns="" xmlns:a14="http://schemas.microsoft.com/office/drawing/2010/main" val="0"/>
+                <a14:useLocalDpi xmlns:a14="http://schemas.microsoft.com/office/drawing/2010/main" val="0"/>
               </a:ext>
             </a:extLst>
           </a:blip>
@@ -7186,7 +7169,7 @@
     </p:spTree>
     <p:extLst>
       <p:ext uri="{BB962C8B-B14F-4D97-AF65-F5344CB8AC3E}">
-        <p14:creationId xmlns="" xmlns:p14="http://schemas.microsoft.com/office/powerpoint/2010/main" val="3308039092"/>
+        <p14:creationId xmlns:p14="http://schemas.microsoft.com/office/powerpoint/2010/main" val="3308039092"/>
       </p:ext>
     </p:extLst>
   </p:cSld>
@@ -7232,7 +7215,7 @@
           <a:blip r:embed="rId2" cstate="print">
             <a:extLst>
               <a:ext uri="{28A0092B-C50C-407E-A947-70E740481C1C}">
-                <a14:useLocalDpi xmlns="" xmlns:a14="http://schemas.microsoft.com/office/drawing/2010/main" val="0"/>
+                <a14:useLocalDpi xmlns:a14="http://schemas.microsoft.com/office/drawing/2010/main" val="0"/>
               </a:ext>
             </a:extLst>
           </a:blip>
@@ -7364,7 +7347,7 @@
           <a:blip r:embed="rId3" cstate="print">
             <a:extLst>
               <a:ext uri="{28A0092B-C50C-407E-A947-70E740481C1C}">
-                <a14:useLocalDpi xmlns="" xmlns:a14="http://schemas.microsoft.com/office/drawing/2010/main" val="0"/>
+                <a14:useLocalDpi xmlns:a14="http://schemas.microsoft.com/office/drawing/2010/main" val="0"/>
               </a:ext>
             </a:extLst>
           </a:blip>
@@ -7388,14 +7371,14 @@
           <a:effectLst/>
           <a:extLst>
             <a:ext uri="{909E8E84-426E-40DD-AFC4-6F175D3DCCD1}">
-              <a14:hiddenFill xmlns="" xmlns:a14="http://schemas.microsoft.com/office/drawing/2010/main">
+              <a14:hiddenFill xmlns:a14="http://schemas.microsoft.com/office/drawing/2010/main">
                 <a:solidFill>
                   <a:schemeClr val="accent1"/>
                 </a:solidFill>
               </a14:hiddenFill>
             </a:ext>
             <a:ext uri="{91240B29-F687-4F45-9708-019B960494DF}">
-              <a14:hiddenLine xmlns="" xmlns:a14="http://schemas.microsoft.com/office/drawing/2010/main" w="9525">
+              <a14:hiddenLine xmlns:a14="http://schemas.microsoft.com/office/drawing/2010/main" w="9525">
                 <a:solidFill>
                   <a:schemeClr val="tx1"/>
                 </a:solidFill>
@@ -7405,7 +7388,7 @@
               </a14:hiddenLine>
             </a:ext>
             <a:ext uri="{AF507438-7753-43E0-B8FC-AC1667EBCBE1}">
-              <a14:hiddenEffects xmlns="" xmlns:a14="http://schemas.microsoft.com/office/drawing/2010/main">
+              <a14:hiddenEffects xmlns:a14="http://schemas.microsoft.com/office/drawing/2010/main">
                 <a:effectLst>
                   <a:outerShdw dist="35921" dir="2700000" algn="ctr" rotWithShape="0">
                     <a:schemeClr val="bg2"/>
@@ -7419,7 +7402,7 @@
     </p:spTree>
     <p:extLst>
       <p:ext uri="{BB962C8B-B14F-4D97-AF65-F5344CB8AC3E}">
-        <p14:creationId xmlns="" xmlns:p14="http://schemas.microsoft.com/office/powerpoint/2010/main" val="1156373279"/>
+        <p14:creationId xmlns:p14="http://schemas.microsoft.com/office/powerpoint/2010/main" val="1156373279"/>
       </p:ext>
     </p:extLst>
   </p:cSld>
@@ -7465,7 +7448,7 @@
           <a:blip r:embed="rId2" cstate="print">
             <a:extLst>
               <a:ext uri="{28A0092B-C50C-407E-A947-70E740481C1C}">
-                <a14:useLocalDpi xmlns="" xmlns:a14="http://schemas.microsoft.com/office/drawing/2010/main" val="0"/>
+                <a14:useLocalDpi xmlns:a14="http://schemas.microsoft.com/office/drawing/2010/main" val="0"/>
               </a:ext>
             </a:extLst>
           </a:blip>
@@ -7570,7 +7553,7 @@
           <a:blip r:embed="rId3" cstate="print">
             <a:extLst>
               <a:ext uri="{28A0092B-C50C-407E-A947-70E740481C1C}">
-                <a14:useLocalDpi xmlns="" xmlns:a14="http://schemas.microsoft.com/office/drawing/2010/main" val="0"/>
+                <a14:useLocalDpi xmlns:a14="http://schemas.microsoft.com/office/drawing/2010/main" val="0"/>
               </a:ext>
             </a:extLst>
           </a:blip>
@@ -7594,14 +7577,14 @@
           <a:effectLst/>
           <a:extLst>
             <a:ext uri="{909E8E84-426E-40DD-AFC4-6F175D3DCCD1}">
-              <a14:hiddenFill xmlns="" xmlns:a14="http://schemas.microsoft.com/office/drawing/2010/main">
+              <a14:hiddenFill xmlns:a14="http://schemas.microsoft.com/office/drawing/2010/main">
                 <a:solidFill>
                   <a:schemeClr val="accent1"/>
                 </a:solidFill>
               </a14:hiddenFill>
             </a:ext>
             <a:ext uri="{91240B29-F687-4F45-9708-019B960494DF}">
-              <a14:hiddenLine xmlns="" xmlns:a14="http://schemas.microsoft.com/office/drawing/2010/main" w="9525">
+              <a14:hiddenLine xmlns:a14="http://schemas.microsoft.com/office/drawing/2010/main" w="9525">
                 <a:solidFill>
                   <a:schemeClr val="tx1"/>
                 </a:solidFill>
@@ -7611,7 +7594,7 @@
               </a14:hiddenLine>
             </a:ext>
             <a:ext uri="{AF507438-7753-43E0-B8FC-AC1667EBCBE1}">
-              <a14:hiddenEffects xmlns="" xmlns:a14="http://schemas.microsoft.com/office/drawing/2010/main">
+              <a14:hiddenEffects xmlns:a14="http://schemas.microsoft.com/office/drawing/2010/main">
                 <a:effectLst>
                   <a:outerShdw dist="35921" dir="2700000" algn="ctr" rotWithShape="0">
                     <a:schemeClr val="bg2"/>
@@ -7625,7 +7608,7 @@
     </p:spTree>
     <p:extLst>
       <p:ext uri="{BB962C8B-B14F-4D97-AF65-F5344CB8AC3E}">
-        <p14:creationId xmlns="" xmlns:p14="http://schemas.microsoft.com/office/powerpoint/2010/main" val="1156373279"/>
+        <p14:creationId xmlns:p14="http://schemas.microsoft.com/office/powerpoint/2010/main" val="1156373279"/>
       </p:ext>
     </p:extLst>
   </p:cSld>
@@ -7671,7 +7654,7 @@
           <a:blip r:embed="rId2" cstate="print">
             <a:extLst>
               <a:ext uri="{28A0092B-C50C-407E-A947-70E740481C1C}">
-                <a14:useLocalDpi xmlns="" xmlns:a14="http://schemas.microsoft.com/office/drawing/2010/main" val="0"/>
+                <a14:useLocalDpi xmlns:a14="http://schemas.microsoft.com/office/drawing/2010/main" val="0"/>
               </a:ext>
             </a:extLst>
           </a:blip>
@@ -7840,7 +7823,7 @@
     </p:spTree>
     <p:extLst>
       <p:ext uri="{BB962C8B-B14F-4D97-AF65-F5344CB8AC3E}">
-        <p14:creationId xmlns="" xmlns:p14="http://schemas.microsoft.com/office/powerpoint/2010/main" val="1156373279"/>
+        <p14:creationId xmlns:p14="http://schemas.microsoft.com/office/powerpoint/2010/main" val="1156373279"/>
       </p:ext>
     </p:extLst>
   </p:cSld>
@@ -7886,7 +7869,7 @@
           <a:blip r:embed="rId2" cstate="print">
             <a:extLst>
               <a:ext uri="{28A0092B-C50C-407E-A947-70E740481C1C}">
-                <a14:useLocalDpi xmlns="" xmlns:a14="http://schemas.microsoft.com/office/drawing/2010/main" val="0"/>
+                <a14:useLocalDpi xmlns:a14="http://schemas.microsoft.com/office/drawing/2010/main" val="0"/>
               </a:ext>
             </a:extLst>
           </a:blip>
@@ -8100,7 +8083,7 @@
     </p:spTree>
     <p:extLst>
       <p:ext uri="{BB962C8B-B14F-4D97-AF65-F5344CB8AC3E}">
-        <p14:creationId xmlns="" xmlns:p14="http://schemas.microsoft.com/office/powerpoint/2010/main" val="1156373279"/>
+        <p14:creationId xmlns:p14="http://schemas.microsoft.com/office/powerpoint/2010/main" val="1156373279"/>
       </p:ext>
     </p:extLst>
   </p:cSld>
@@ -8146,7 +8129,7 @@
           <a:blip r:embed="rId2" cstate="print">
             <a:extLst>
               <a:ext uri="{28A0092B-C50C-407E-A947-70E740481C1C}">
-                <a14:useLocalDpi xmlns="" xmlns:a14="http://schemas.microsoft.com/office/drawing/2010/main" val="0"/>
+                <a14:useLocalDpi xmlns:a14="http://schemas.microsoft.com/office/drawing/2010/main" val="0"/>
               </a:ext>
             </a:extLst>
           </a:blip>
@@ -8293,7 +8276,7 @@
     </p:spTree>
     <p:extLst>
       <p:ext uri="{BB962C8B-B14F-4D97-AF65-F5344CB8AC3E}">
-        <p14:creationId xmlns="" xmlns:p14="http://schemas.microsoft.com/office/powerpoint/2010/main" val="4060812770"/>
+        <p14:creationId xmlns:p14="http://schemas.microsoft.com/office/powerpoint/2010/main" val="4060812770"/>
       </p:ext>
     </p:extLst>
   </p:cSld>
@@ -8339,7 +8322,7 @@
           <a:blip r:embed="rId2" cstate="print">
             <a:extLst>
               <a:ext uri="{28A0092B-C50C-407E-A947-70E740481C1C}">
-                <a14:useLocalDpi xmlns="" xmlns:a14="http://schemas.microsoft.com/office/drawing/2010/main" val="0"/>
+                <a14:useLocalDpi xmlns:a14="http://schemas.microsoft.com/office/drawing/2010/main" val="0"/>
               </a:ext>
             </a:extLst>
           </a:blip>
@@ -8469,7 +8452,7 @@
     </p:spTree>
     <p:extLst>
       <p:ext uri="{BB962C8B-B14F-4D97-AF65-F5344CB8AC3E}">
-        <p14:creationId xmlns="" xmlns:p14="http://schemas.microsoft.com/office/powerpoint/2010/main" val="1156373279"/>
+        <p14:creationId xmlns:p14="http://schemas.microsoft.com/office/powerpoint/2010/main" val="1156373279"/>
       </p:ext>
     </p:extLst>
   </p:cSld>
@@ -8515,7 +8498,7 @@
           <a:blip r:embed="rId2" cstate="print">
             <a:extLst>
               <a:ext uri="{28A0092B-C50C-407E-A947-70E740481C1C}">
-                <a14:useLocalDpi xmlns="" xmlns:a14="http://schemas.microsoft.com/office/drawing/2010/main" val="0"/>
+                <a14:useLocalDpi xmlns:a14="http://schemas.microsoft.com/office/drawing/2010/main" val="0"/>
               </a:ext>
             </a:extLst>
           </a:blip>
@@ -8722,7 +8705,7 @@
     </p:spTree>
     <p:extLst>
       <p:ext uri="{BB962C8B-B14F-4D97-AF65-F5344CB8AC3E}">
-        <p14:creationId xmlns="" xmlns:p14="http://schemas.microsoft.com/office/powerpoint/2010/main" val="1156373279"/>
+        <p14:creationId xmlns:p14="http://schemas.microsoft.com/office/powerpoint/2010/main" val="1156373279"/>
       </p:ext>
     </p:extLst>
   </p:cSld>
@@ -8768,7 +8751,7 @@
           <a:blip r:embed="rId2" cstate="print">
             <a:extLst>
               <a:ext uri="{28A0092B-C50C-407E-A947-70E740481C1C}">
-                <a14:useLocalDpi xmlns="" xmlns:a14="http://schemas.microsoft.com/office/drawing/2010/main" val="0"/>
+                <a14:useLocalDpi xmlns:a14="http://schemas.microsoft.com/office/drawing/2010/main" val="0"/>
               </a:ext>
             </a:extLst>
           </a:blip>
@@ -9001,7 +8984,7 @@
     </p:spTree>
     <p:extLst>
       <p:ext uri="{BB962C8B-B14F-4D97-AF65-F5344CB8AC3E}">
-        <p14:creationId xmlns="" xmlns:p14="http://schemas.microsoft.com/office/powerpoint/2010/main" val="1156373279"/>
+        <p14:creationId xmlns:p14="http://schemas.microsoft.com/office/powerpoint/2010/main" val="1156373279"/>
       </p:ext>
     </p:extLst>
   </p:cSld>
@@ -9047,7 +9030,7 @@
           <a:blip r:embed="rId2" cstate="print">
             <a:extLst>
               <a:ext uri="{28A0092B-C50C-407E-A947-70E740481C1C}">
-                <a14:useLocalDpi xmlns="" xmlns:a14="http://schemas.microsoft.com/office/drawing/2010/main" val="0"/>
+                <a14:useLocalDpi xmlns:a14="http://schemas.microsoft.com/office/drawing/2010/main" val="0"/>
               </a:ext>
             </a:extLst>
           </a:blip>
@@ -9269,7 +9252,7 @@
     </p:spTree>
     <p:extLst>
       <p:ext uri="{BB962C8B-B14F-4D97-AF65-F5344CB8AC3E}">
-        <p14:creationId xmlns="" xmlns:p14="http://schemas.microsoft.com/office/powerpoint/2010/main" val="1156373279"/>
+        <p14:creationId xmlns:p14="http://schemas.microsoft.com/office/powerpoint/2010/main" val="1156373279"/>
       </p:ext>
     </p:extLst>
   </p:cSld>
@@ -9315,7 +9298,7 @@
           <a:blip r:embed="rId2" cstate="print">
             <a:extLst>
               <a:ext uri="{28A0092B-C50C-407E-A947-70E740481C1C}">
-                <a14:useLocalDpi xmlns="" xmlns:a14="http://schemas.microsoft.com/office/drawing/2010/main" val="0"/>
+                <a14:useLocalDpi xmlns:a14="http://schemas.microsoft.com/office/drawing/2010/main" val="0"/>
               </a:ext>
             </a:extLst>
           </a:blip>
@@ -9450,13 +9433,6 @@
               </a:rPr>
               <a:t>Descrição:</a:t>
             </a:r>
-            <a:endParaRPr lang="pt-BR" dirty="0" smtClean="0">
-              <a:solidFill>
-                <a:schemeClr val="bg1">
-                  <a:lumMod val="75000"/>
-                </a:schemeClr>
-              </a:solidFill>
-            </a:endParaRPr>
           </a:p>
         </p:txBody>
       </p:sp>
@@ -9527,7 +9503,7 @@
     </p:spTree>
     <p:extLst>
       <p:ext uri="{BB962C8B-B14F-4D97-AF65-F5344CB8AC3E}">
-        <p14:creationId xmlns="" xmlns:p14="http://schemas.microsoft.com/office/powerpoint/2010/main" val="1156373279"/>
+        <p14:creationId xmlns:p14="http://schemas.microsoft.com/office/powerpoint/2010/main" val="1156373279"/>
       </p:ext>
     </p:extLst>
   </p:cSld>
@@ -9573,7 +9549,7 @@
           <a:blip r:embed="rId2" cstate="print">
             <a:extLst>
               <a:ext uri="{28A0092B-C50C-407E-A947-70E740481C1C}">
-                <a14:useLocalDpi xmlns="" xmlns:a14="http://schemas.microsoft.com/office/drawing/2010/main" val="0"/>
+                <a14:useLocalDpi xmlns:a14="http://schemas.microsoft.com/office/drawing/2010/main" val="0"/>
               </a:ext>
             </a:extLst>
           </a:blip>
@@ -9624,27 +9600,7 @@
                   </a:schemeClr>
                 </a:solidFill>
               </a:rPr>
-              <a:t> </a:t>
-            </a:r>
-            <a:r>
-              <a:rPr lang="pt-PT" dirty="0" smtClean="0">
-                <a:solidFill>
-                  <a:schemeClr val="bg1">
-                    <a:lumMod val="85000"/>
-                  </a:schemeClr>
-                </a:solidFill>
-              </a:rPr>
-              <a:t>de </a:t>
-            </a:r>
-            <a:r>
-              <a:rPr lang="pt-PT" dirty="0" smtClean="0">
-                <a:solidFill>
-                  <a:schemeClr val="bg1">
-                    <a:lumMod val="85000"/>
-                  </a:schemeClr>
-                </a:solidFill>
-              </a:rPr>
-              <a:t>informação</a:t>
+              <a:t> de informação</a:t>
             </a:r>
             <a:endParaRPr lang="pt-BR" dirty="0"/>
           </a:p>
@@ -9673,57 +9629,7 @@
                   </a:schemeClr>
                 </a:solidFill>
               </a:rPr>
-              <a:t>A categorização da </a:t>
-            </a:r>
-            <a:r>
-              <a:rPr lang="pt-BR" dirty="0" smtClean="0">
-                <a:solidFill>
-                  <a:schemeClr val="bg1">
-                    <a:lumMod val="75000"/>
-                  </a:schemeClr>
-                </a:solidFill>
-              </a:rPr>
-              <a:t>informação em </a:t>
-            </a:r>
-            <a:r>
-              <a:rPr lang="pt-BR" dirty="0" smtClean="0">
-                <a:solidFill>
-                  <a:schemeClr val="bg1">
-                    <a:lumMod val="75000"/>
-                  </a:schemeClr>
-                </a:solidFill>
-              </a:rPr>
-              <a:t>uma </a:t>
-            </a:r>
-            <a:r>
-              <a:rPr lang="pt-BR" dirty="0" smtClean="0">
-                <a:solidFill>
-                  <a:schemeClr val="bg1">
-                    <a:lumMod val="75000"/>
-                  </a:schemeClr>
-                </a:solidFill>
-              </a:rPr>
-              <a:t>estrutura </a:t>
-            </a:r>
-            <a:r>
-              <a:rPr lang="pt-BR" dirty="0" smtClean="0">
-                <a:solidFill>
-                  <a:schemeClr val="bg1">
-                    <a:lumMod val="75000"/>
-                  </a:schemeClr>
-                </a:solidFill>
-              </a:rPr>
-              <a:t>coerente </a:t>
-            </a:r>
-            <a:r>
-              <a:rPr lang="pt-BR" dirty="0" smtClean="0">
-                <a:solidFill>
-                  <a:schemeClr val="bg1">
-                    <a:lumMod val="75000"/>
-                  </a:schemeClr>
-                </a:solidFill>
-              </a:rPr>
-              <a:t>e compreensível.</a:t>
+              <a:t>A categorização da informação em uma estrutura coerente e compreensível.</a:t>
             </a:r>
           </a:p>
           <a:p>
@@ -9761,7 +9667,7 @@
     </p:spTree>
     <p:extLst>
       <p:ext uri="{BB962C8B-B14F-4D97-AF65-F5344CB8AC3E}">
-        <p14:creationId xmlns="" xmlns:p14="http://schemas.microsoft.com/office/powerpoint/2010/main" val="1156373279"/>
+        <p14:creationId xmlns:p14="http://schemas.microsoft.com/office/powerpoint/2010/main" val="1156373279"/>
       </p:ext>
     </p:extLst>
   </p:cSld>
@@ -9807,7 +9713,7 @@
           <a:blip r:embed="rId2" cstate="print">
             <a:extLst>
               <a:ext uri="{28A0092B-C50C-407E-A947-70E740481C1C}">
-                <a14:useLocalDpi xmlns="" xmlns:a14="http://schemas.microsoft.com/office/drawing/2010/main" val="0"/>
+                <a14:useLocalDpi xmlns:a14="http://schemas.microsoft.com/office/drawing/2010/main" val="0"/>
               </a:ext>
             </a:extLst>
           </a:blip>
@@ -9928,7 +9834,7 @@
     </p:spTree>
     <p:extLst>
       <p:ext uri="{BB962C8B-B14F-4D97-AF65-F5344CB8AC3E}">
-        <p14:creationId xmlns="" xmlns:p14="http://schemas.microsoft.com/office/powerpoint/2010/main" val="1156373279"/>
+        <p14:creationId xmlns:p14="http://schemas.microsoft.com/office/powerpoint/2010/main" val="1156373279"/>
       </p:ext>
     </p:extLst>
   </p:cSld>
@@ -9974,7 +9880,7 @@
           <a:blip r:embed="rId2" cstate="print">
             <a:extLst>
               <a:ext uri="{28A0092B-C50C-407E-A947-70E740481C1C}">
-                <a14:useLocalDpi xmlns="" xmlns:a14="http://schemas.microsoft.com/office/drawing/2010/main" val="0"/>
+                <a14:useLocalDpi xmlns:a14="http://schemas.microsoft.com/office/drawing/2010/main" val="0"/>
               </a:ext>
             </a:extLst>
           </a:blip>
@@ -10054,17 +9960,7 @@
                   </a:schemeClr>
                 </a:solidFill>
               </a:rPr>
-              <a:t> </a:t>
-            </a:r>
-            <a:r>
-              <a:rPr lang="pt-BR" dirty="0" smtClean="0">
-                <a:solidFill>
-                  <a:schemeClr val="bg1">
-                    <a:lumMod val="75000"/>
-                  </a:schemeClr>
-                </a:solidFill>
-              </a:rPr>
-              <a:t>Fluidos</a:t>
+              <a:t> Fluidos</a:t>
             </a:r>
           </a:p>
           <a:p>
@@ -10085,17 +9981,7 @@
                   </a:schemeClr>
                 </a:solidFill>
               </a:rPr>
-              <a:t>Design </a:t>
-            </a:r>
-            <a:r>
-              <a:rPr lang="pt-BR" dirty="0" smtClean="0">
-                <a:solidFill>
-                  <a:schemeClr val="bg1">
-                    <a:lumMod val="75000"/>
-                  </a:schemeClr>
-                </a:solidFill>
-              </a:rPr>
-              <a:t>Adaptativo</a:t>
+              <a:t>Design Adaptativo</a:t>
             </a:r>
           </a:p>
           <a:p>
@@ -10116,17 +10002,7 @@
                   </a:schemeClr>
                 </a:solidFill>
               </a:rPr>
-              <a:t>Conteúdo </a:t>
-            </a:r>
-            <a:r>
-              <a:rPr lang="pt-BR" dirty="0" smtClean="0">
-                <a:solidFill>
-                  <a:schemeClr val="bg1">
-                    <a:lumMod val="75000"/>
-                  </a:schemeClr>
-                </a:solidFill>
-              </a:rPr>
-              <a:t>Flexível</a:t>
+              <a:t>Conteúdo Flexível</a:t>
             </a:r>
           </a:p>
           <a:p>
@@ -10162,7 +10038,7 @@
     </p:spTree>
     <p:extLst>
       <p:ext uri="{BB962C8B-B14F-4D97-AF65-F5344CB8AC3E}">
-        <p14:creationId xmlns="" xmlns:p14="http://schemas.microsoft.com/office/powerpoint/2010/main" val="1156373279"/>
+        <p14:creationId xmlns:p14="http://schemas.microsoft.com/office/powerpoint/2010/main" val="1156373279"/>
       </p:ext>
     </p:extLst>
   </p:cSld>
@@ -10208,7 +10084,7 @@
           <a:blip r:embed="rId2" cstate="print">
             <a:extLst>
               <a:ext uri="{28A0092B-C50C-407E-A947-70E740481C1C}">
-                <a14:useLocalDpi xmlns="" xmlns:a14="http://schemas.microsoft.com/office/drawing/2010/main" val="0"/>
+                <a14:useLocalDpi xmlns:a14="http://schemas.microsoft.com/office/drawing/2010/main" val="0"/>
               </a:ext>
             </a:extLst>
           </a:blip>
@@ -10288,7 +10164,7 @@
     </p:spTree>
     <p:extLst>
       <p:ext uri="{BB962C8B-B14F-4D97-AF65-F5344CB8AC3E}">
-        <p14:creationId xmlns="" xmlns:p14="http://schemas.microsoft.com/office/powerpoint/2010/main" val="1156373279"/>
+        <p14:creationId xmlns:p14="http://schemas.microsoft.com/office/powerpoint/2010/main" val="1156373279"/>
       </p:ext>
     </p:extLst>
   </p:cSld>
@@ -10334,7 +10210,7 @@
           <a:blip r:embed="rId2" cstate="print">
             <a:extLst>
               <a:ext uri="{28A0092B-C50C-407E-A947-70E740481C1C}">
-                <a14:useLocalDpi xmlns="" xmlns:a14="http://schemas.microsoft.com/office/drawing/2010/main" val="0"/>
+                <a14:useLocalDpi xmlns:a14="http://schemas.microsoft.com/office/drawing/2010/main" val="0"/>
               </a:ext>
             </a:extLst>
           </a:blip>
@@ -10414,7 +10290,7 @@
     </p:spTree>
     <p:extLst>
       <p:ext uri="{BB962C8B-B14F-4D97-AF65-F5344CB8AC3E}">
-        <p14:creationId xmlns="" xmlns:p14="http://schemas.microsoft.com/office/powerpoint/2010/main" val="1156373279"/>
+        <p14:creationId xmlns:p14="http://schemas.microsoft.com/office/powerpoint/2010/main" val="1156373279"/>
       </p:ext>
     </p:extLst>
   </p:cSld>
@@ -10460,7 +10336,7 @@
           <a:blip r:embed="rId2" cstate="print">
             <a:extLst>
               <a:ext uri="{28A0092B-C50C-407E-A947-70E740481C1C}">
-                <a14:useLocalDpi xmlns="" xmlns:a14="http://schemas.microsoft.com/office/drawing/2010/main" val="0"/>
+                <a14:useLocalDpi xmlns:a14="http://schemas.microsoft.com/office/drawing/2010/main" val="0"/>
               </a:ext>
             </a:extLst>
           </a:blip>
@@ -10580,7 +10456,7 @@
           <a:blip r:embed="rId3" cstate="print">
             <a:extLst>
               <a:ext uri="{28A0092B-C50C-407E-A947-70E740481C1C}">
-                <a14:useLocalDpi xmlns="" xmlns:a14="http://schemas.microsoft.com/office/drawing/2010/main" val="0"/>
+                <a14:useLocalDpi xmlns:a14="http://schemas.microsoft.com/office/drawing/2010/main" val="0"/>
               </a:ext>
             </a:extLst>
           </a:blip>
@@ -10601,7 +10477,7 @@
     </p:spTree>
     <p:extLst>
       <p:ext uri="{BB962C8B-B14F-4D97-AF65-F5344CB8AC3E}">
-        <p14:creationId xmlns="" xmlns:p14="http://schemas.microsoft.com/office/powerpoint/2010/main" val="4060812770"/>
+        <p14:creationId xmlns:p14="http://schemas.microsoft.com/office/powerpoint/2010/main" val="4060812770"/>
       </p:ext>
     </p:extLst>
   </p:cSld>
@@ -10647,7 +10523,7 @@
           <a:blip r:embed="rId2" cstate="print">
             <a:extLst>
               <a:ext uri="{28A0092B-C50C-407E-A947-70E740481C1C}">
-                <a14:useLocalDpi xmlns="" xmlns:a14="http://schemas.microsoft.com/office/drawing/2010/main" val="0"/>
+                <a14:useLocalDpi xmlns:a14="http://schemas.microsoft.com/office/drawing/2010/main" val="0"/>
               </a:ext>
             </a:extLst>
           </a:blip>
@@ -10727,7 +10603,7 @@
     </p:spTree>
     <p:extLst>
       <p:ext uri="{BB962C8B-B14F-4D97-AF65-F5344CB8AC3E}">
-        <p14:creationId xmlns="" xmlns:p14="http://schemas.microsoft.com/office/powerpoint/2010/main" val="1156373279"/>
+        <p14:creationId xmlns:p14="http://schemas.microsoft.com/office/powerpoint/2010/main" val="1156373279"/>
       </p:ext>
     </p:extLst>
   </p:cSld>
@@ -10773,7 +10649,7 @@
           <a:blip r:embed="rId2" cstate="print">
             <a:extLst>
               <a:ext uri="{28A0092B-C50C-407E-A947-70E740481C1C}">
-                <a14:useLocalDpi xmlns="" xmlns:a14="http://schemas.microsoft.com/office/drawing/2010/main" val="0"/>
+                <a14:useLocalDpi xmlns:a14="http://schemas.microsoft.com/office/drawing/2010/main" val="0"/>
               </a:ext>
             </a:extLst>
           </a:blip>
@@ -10851,37 +10727,7 @@
                   </a:schemeClr>
                 </a:solidFill>
               </a:rPr>
-              <a:t>O Google </a:t>
-            </a:r>
-            <a:r>
-              <a:rPr lang="pt-BR" dirty="0" smtClean="0">
-                <a:solidFill>
-                  <a:schemeClr val="bg1">
-                    <a:lumMod val="75000"/>
-                  </a:schemeClr>
-                </a:solidFill>
-              </a:rPr>
-              <a:t>recomenda, e </a:t>
-            </a:r>
-            <a:r>
-              <a:rPr lang="pt-BR" dirty="0" smtClean="0">
-                <a:solidFill>
-                  <a:schemeClr val="bg1">
-                    <a:lumMod val="75000"/>
-                  </a:schemeClr>
-                </a:solidFill>
-              </a:rPr>
-              <a:t>também te recompensa</a:t>
-            </a:r>
-            <a:r>
-              <a:rPr lang="pt-BR" dirty="0" smtClean="0">
-                <a:solidFill>
-                  <a:schemeClr val="bg1">
-                    <a:lumMod val="75000"/>
-                  </a:schemeClr>
-                </a:solidFill>
-              </a:rPr>
-              <a:t>.</a:t>
+              <a:t>O Google recomenda, e também te recompensa.</a:t>
             </a:r>
           </a:p>
           <a:p>
@@ -10908,7 +10754,17 @@
                   </a:schemeClr>
                 </a:solidFill>
               </a:rPr>
-              <a:t>“Sites que usam Web Design Responsivo, isto é, sites </a:t>
+              <a:t>“Sites que usam Web Design Responsivo, isto é, sites que funcionam em todos os dispositivos com o mesmo conjunto de </a:t>
+            </a:r>
+            <a:r>
+              <a:rPr lang="pt-BR" dirty="0" err="1" smtClean="0">
+                <a:solidFill>
+                  <a:schemeClr val="bg1">
+                    <a:lumMod val="75000"/>
+                  </a:schemeClr>
+                </a:solidFill>
+              </a:rPr>
+              <a:t>URLs</a:t>
             </a:r>
             <a:r>
               <a:rPr lang="pt-BR" dirty="0" smtClean="0">
@@ -10918,117 +10774,7 @@
                   </a:schemeClr>
                 </a:solidFill>
               </a:rPr>
-              <a:t>que funcionam </a:t>
-            </a:r>
-            <a:r>
-              <a:rPr lang="pt-BR" dirty="0" smtClean="0">
-                <a:solidFill>
-                  <a:schemeClr val="bg1">
-                    <a:lumMod val="75000"/>
-                  </a:schemeClr>
-                </a:solidFill>
-              </a:rPr>
-              <a:t>em todos os dispositivos com o </a:t>
-            </a:r>
-            <a:r>
-              <a:rPr lang="pt-BR" dirty="0" smtClean="0">
-                <a:solidFill>
-                  <a:schemeClr val="bg1">
-                    <a:lumMod val="75000"/>
-                  </a:schemeClr>
-                </a:solidFill>
-              </a:rPr>
-              <a:t>mesmo conjunto de </a:t>
-            </a:r>
-            <a:r>
-              <a:rPr lang="pt-BR" dirty="0" err="1" smtClean="0">
-                <a:solidFill>
-                  <a:schemeClr val="bg1">
-                    <a:lumMod val="75000"/>
-                  </a:schemeClr>
-                </a:solidFill>
-              </a:rPr>
-              <a:t>URLs</a:t>
-            </a:r>
-            <a:r>
-              <a:rPr lang="pt-BR" dirty="0" smtClean="0">
-                <a:solidFill>
-                  <a:schemeClr val="bg1">
-                    <a:lumMod val="75000"/>
-                  </a:schemeClr>
-                </a:solidFill>
-              </a:rPr>
-              <a:t>, com cada URL fornecendo o mesmo HTML a </a:t>
-            </a:r>
-            <a:r>
-              <a:rPr lang="pt-BR" dirty="0" smtClean="0">
-                <a:solidFill>
-                  <a:schemeClr val="bg1">
-                    <a:lumMod val="75000"/>
-                  </a:schemeClr>
-                </a:solidFill>
-              </a:rPr>
-              <a:t>todos os dispositivos </a:t>
-            </a:r>
-            <a:r>
-              <a:rPr lang="pt-BR" dirty="0" smtClean="0">
-                <a:solidFill>
-                  <a:schemeClr val="bg1">
-                    <a:lumMod val="75000"/>
-                  </a:schemeClr>
-                </a:solidFill>
-              </a:rPr>
-              <a:t>e usando apenas CSS para alterar como </a:t>
-            </a:r>
-            <a:r>
-              <a:rPr lang="pt-BR" dirty="0" smtClean="0">
-                <a:solidFill>
-                  <a:schemeClr val="bg1">
-                    <a:lumMod val="75000"/>
-                  </a:schemeClr>
-                </a:solidFill>
-              </a:rPr>
-              <a:t>a página </a:t>
-            </a:r>
-            <a:r>
-              <a:rPr lang="pt-BR" dirty="0" smtClean="0">
-                <a:solidFill>
-                  <a:schemeClr val="bg1">
-                    <a:lumMod val="75000"/>
-                  </a:schemeClr>
-                </a:solidFill>
-              </a:rPr>
-              <a:t>é processada no dispositivo. Essa é a </a:t>
-            </a:r>
-            <a:r>
-              <a:rPr lang="pt-BR" dirty="0" smtClean="0">
-                <a:solidFill>
-                  <a:schemeClr val="bg1">
-                    <a:lumMod val="75000"/>
-                  </a:schemeClr>
-                </a:solidFill>
-              </a:rPr>
-              <a:t>configuração recomendada </a:t>
-            </a:r>
-            <a:r>
-              <a:rPr lang="pt-BR" dirty="0" smtClean="0">
-                <a:solidFill>
-                  <a:schemeClr val="bg1">
-                    <a:lumMod val="75000"/>
-                  </a:schemeClr>
-                </a:solidFill>
-              </a:rPr>
-              <a:t>pelo Google</a:t>
-            </a:r>
-            <a:r>
-              <a:rPr lang="pt-BR" dirty="0" smtClean="0">
-                <a:solidFill>
-                  <a:schemeClr val="bg1">
-                    <a:lumMod val="75000"/>
-                  </a:schemeClr>
-                </a:solidFill>
-              </a:rPr>
-              <a:t>.”</a:t>
+              <a:t>, com cada URL fornecendo o mesmo HTML a todos os dispositivos e usando apenas CSS para alterar como a página é processada no dispositivo. Essa é a configuração recomendada pelo Google.”</a:t>
             </a:r>
           </a:p>
           <a:p>
@@ -11053,17 +10799,7 @@
                   </a:schemeClr>
                 </a:solidFill>
               </a:rPr>
-              <a:t> </a:t>
-            </a:r>
-            <a:r>
-              <a:rPr lang="pt-BR" sz="2200" dirty="0" smtClean="0">
-                <a:solidFill>
-                  <a:schemeClr val="bg1">
-                    <a:lumMod val="75000"/>
-                  </a:schemeClr>
-                </a:solidFill>
-              </a:rPr>
-              <a:t>https://developers.google.com/webmasters/smartphone-sites/details</a:t>
+              <a:t> https://developers.google.com/webmasters/smartphone-sites/details</a:t>
             </a:r>
             <a:endParaRPr lang="pt-BR" sz="2200" dirty="0">
               <a:solidFill>
@@ -11078,7 +10814,7 @@
     </p:spTree>
     <p:extLst>
       <p:ext uri="{BB962C8B-B14F-4D97-AF65-F5344CB8AC3E}">
-        <p14:creationId xmlns="" xmlns:p14="http://schemas.microsoft.com/office/powerpoint/2010/main" val="1156373279"/>
+        <p14:creationId xmlns:p14="http://schemas.microsoft.com/office/powerpoint/2010/main" val="1156373279"/>
       </p:ext>
     </p:extLst>
   </p:cSld>
@@ -11124,7 +10860,7 @@
           <a:blip r:embed="rId2" cstate="print">
             <a:extLst>
               <a:ext uri="{28A0092B-C50C-407E-A947-70E740481C1C}">
-                <a14:useLocalDpi xmlns="" xmlns:a14="http://schemas.microsoft.com/office/drawing/2010/main" val="0"/>
+                <a14:useLocalDpi xmlns:a14="http://schemas.microsoft.com/office/drawing/2010/main" val="0"/>
               </a:ext>
             </a:extLst>
           </a:blip>
@@ -11216,37 +10952,7 @@
                   </a:schemeClr>
                 </a:solidFill>
               </a:rPr>
-              <a:t>&lt;header&gt; é usado para definir o cabeçalho de uma página ou </a:t>
-            </a:r>
-            <a:r>
-              <a:rPr lang="pt-BR" dirty="0" smtClean="0">
-                <a:solidFill>
-                  <a:schemeClr val="bg1">
-                    <a:lumMod val="75000"/>
-                  </a:schemeClr>
-                </a:solidFill>
-              </a:rPr>
-              <a:t>sessão, e </a:t>
-            </a:r>
-            <a:r>
-              <a:rPr lang="pt-BR" dirty="0" smtClean="0">
-                <a:solidFill>
-                  <a:schemeClr val="bg1">
-                    <a:lumMod val="75000"/>
-                  </a:schemeClr>
-                </a:solidFill>
-              </a:rPr>
-              <a:t>pode conter logo, títulos, menu de navegação, campo de </a:t>
-            </a:r>
-            <a:r>
-              <a:rPr lang="pt-BR" dirty="0" smtClean="0">
-                <a:solidFill>
-                  <a:schemeClr val="bg1">
-                    <a:lumMod val="75000"/>
-                  </a:schemeClr>
-                </a:solidFill>
-              </a:rPr>
-              <a:t>busca, etc.</a:t>
+              <a:t>&lt;header&gt; é usado para definir o cabeçalho de uma página ou sessão, e pode conter logo, títulos, menu de navegação, campo de busca, etc.</a:t>
             </a:r>
           </a:p>
           <a:p>
@@ -11287,67 +10993,7 @@
                   </a:schemeClr>
                 </a:solidFill>
               </a:rPr>
-              <a:t>&gt; serve para agrupar uma lista de links para outras partes do </a:t>
-            </a:r>
-            <a:r>
-              <a:rPr lang="pt-BR" dirty="0" smtClean="0">
-                <a:solidFill>
-                  <a:schemeClr val="bg1">
-                    <a:lumMod val="75000"/>
-                  </a:schemeClr>
-                </a:solidFill>
-              </a:rPr>
-              <a:t>site, seja </a:t>
-            </a:r>
-            <a:r>
-              <a:rPr lang="pt-BR" dirty="0" smtClean="0">
-                <a:solidFill>
-                  <a:schemeClr val="bg1">
-                    <a:lumMod val="75000"/>
-                  </a:schemeClr>
-                </a:solidFill>
-              </a:rPr>
-              <a:t>essa lista de navegação local ou global. Esses blocos de links </a:t>
-            </a:r>
-            <a:r>
-              <a:rPr lang="pt-BR" dirty="0" smtClean="0">
-                <a:solidFill>
-                  <a:schemeClr val="bg1">
-                    <a:lumMod val="75000"/>
-                  </a:schemeClr>
-                </a:solidFill>
-              </a:rPr>
-              <a:t>podem estar </a:t>
-            </a:r>
-            <a:r>
-              <a:rPr lang="pt-BR" dirty="0" smtClean="0">
-                <a:solidFill>
-                  <a:schemeClr val="bg1">
-                    <a:lumMod val="75000"/>
-                  </a:schemeClr>
-                </a:solidFill>
-              </a:rPr>
-              <a:t>em diferentes partes do layout, como no </a:t>
-            </a:r>
-            <a:r>
-              <a:rPr lang="pt-BR" dirty="0" smtClean="0">
-                <a:solidFill>
-                  <a:schemeClr val="bg1">
-                    <a:lumMod val="75000"/>
-                  </a:schemeClr>
-                </a:solidFill>
-              </a:rPr>
-              <a:t>cabeçalho </a:t>
-            </a:r>
-            <a:r>
-              <a:rPr lang="pt-BR" dirty="0" smtClean="0">
-                <a:solidFill>
-                  <a:schemeClr val="bg1">
-                    <a:lumMod val="75000"/>
-                  </a:schemeClr>
-                </a:solidFill>
-              </a:rPr>
-              <a:t>ou no rodapé.</a:t>
+              <a:t>&gt; serve para agrupar uma lista de links para outras partes do site, seja essa lista de navegação local ou global. Esses blocos de links podem estar em diferentes partes do layout, como no cabeçalho ou no rodapé.</a:t>
             </a:r>
             <a:endParaRPr lang="pt-BR" dirty="0">
               <a:solidFill>
@@ -11362,7 +11008,7 @@
     </p:spTree>
     <p:extLst>
       <p:ext uri="{BB962C8B-B14F-4D97-AF65-F5344CB8AC3E}">
-        <p14:creationId xmlns="" xmlns:p14="http://schemas.microsoft.com/office/powerpoint/2010/main" val="1156373279"/>
+        <p14:creationId xmlns:p14="http://schemas.microsoft.com/office/powerpoint/2010/main" val="1156373279"/>
       </p:ext>
     </p:extLst>
   </p:cSld>
@@ -11408,7 +11054,7 @@
           <a:blip r:embed="rId2" cstate="print">
             <a:extLst>
               <a:ext uri="{28A0092B-C50C-407E-A947-70E740481C1C}">
-                <a14:useLocalDpi xmlns="" xmlns:a14="http://schemas.microsoft.com/office/drawing/2010/main" val="0"/>
+                <a14:useLocalDpi xmlns:a14="http://schemas.microsoft.com/office/drawing/2010/main" val="0"/>
               </a:ext>
             </a:extLst>
           </a:blip>
@@ -11515,7 +11161,17 @@
                   </a:schemeClr>
                 </a:solidFill>
               </a:rPr>
-              <a:t>&gt; é o menos </a:t>
+              <a:t>&gt; é o menos específico entre as novas </a:t>
+            </a:r>
+            <a:r>
+              <a:rPr lang="pt-BR" dirty="0" err="1" smtClean="0">
+                <a:solidFill>
+                  <a:schemeClr val="bg1">
+                    <a:lumMod val="75000"/>
+                  </a:schemeClr>
+                </a:solidFill>
+              </a:rPr>
+              <a:t>tags</a:t>
             </a:r>
             <a:r>
               <a:rPr lang="pt-BR" dirty="0" smtClean="0">
@@ -11525,7 +11181,17 @@
                   </a:schemeClr>
                 </a:solidFill>
               </a:rPr>
-              <a:t>específico </a:t>
+              <a:t> do HTML5. A diferença do &lt;</a:t>
+            </a:r>
+            <a:r>
+              <a:rPr lang="pt-BR" dirty="0" err="1" smtClean="0">
+                <a:solidFill>
+                  <a:schemeClr val="bg1">
+                    <a:lumMod val="75000"/>
+                  </a:schemeClr>
+                </a:solidFill>
+              </a:rPr>
+              <a:t>section</a:t>
             </a:r>
             <a:r>
               <a:rPr lang="pt-BR" dirty="0" smtClean="0">
@@ -11535,7 +11201,7 @@
                   </a:schemeClr>
                 </a:solidFill>
               </a:rPr>
-              <a:t>entre as novas </a:t>
+              <a:t>&gt; para um &lt;div&gt; é que o primeiro serve para dividir o conteúdo em diferentes sessões, que podem conter elementos como &lt;header&gt; ou &lt;</a:t>
             </a:r>
             <a:r>
               <a:rPr lang="pt-BR" dirty="0" err="1" smtClean="0">
@@ -11545,7 +11211,7 @@
                   </a:schemeClr>
                 </a:solidFill>
               </a:rPr>
-              <a:t>tags</a:t>
+              <a:t>article</a:t>
             </a:r>
             <a:r>
               <a:rPr lang="pt-BR" dirty="0" smtClean="0">
@@ -11555,127 +11221,7 @@
                   </a:schemeClr>
                 </a:solidFill>
               </a:rPr>
-              <a:t> do HTML5. </a:t>
-            </a:r>
-            <a:r>
-              <a:rPr lang="pt-BR" dirty="0" smtClean="0">
-                <a:solidFill>
-                  <a:schemeClr val="bg1">
-                    <a:lumMod val="75000"/>
-                  </a:schemeClr>
-                </a:solidFill>
-              </a:rPr>
-              <a:t>A diferença </a:t>
-            </a:r>
-            <a:r>
-              <a:rPr lang="pt-BR" dirty="0" smtClean="0">
-                <a:solidFill>
-                  <a:schemeClr val="bg1">
-                    <a:lumMod val="75000"/>
-                  </a:schemeClr>
-                </a:solidFill>
-              </a:rPr>
-              <a:t>do &lt;</a:t>
-            </a:r>
-            <a:r>
-              <a:rPr lang="pt-BR" dirty="0" err="1" smtClean="0">
-                <a:solidFill>
-                  <a:schemeClr val="bg1">
-                    <a:lumMod val="75000"/>
-                  </a:schemeClr>
-                </a:solidFill>
-              </a:rPr>
-              <a:t>section</a:t>
-            </a:r>
-            <a:r>
-              <a:rPr lang="pt-BR" dirty="0" smtClean="0">
-                <a:solidFill>
-                  <a:schemeClr val="bg1">
-                    <a:lumMod val="75000"/>
-                  </a:schemeClr>
-                </a:solidFill>
-              </a:rPr>
-              <a:t>&gt; para um &lt;div&gt; é que o primeiro serve para </a:t>
-            </a:r>
-            <a:r>
-              <a:rPr lang="pt-BR" dirty="0" smtClean="0">
-                <a:solidFill>
-                  <a:schemeClr val="bg1">
-                    <a:lumMod val="75000"/>
-                  </a:schemeClr>
-                </a:solidFill>
-              </a:rPr>
-              <a:t>dividir o </a:t>
-            </a:r>
-            <a:r>
-              <a:rPr lang="pt-BR" dirty="0" smtClean="0">
-                <a:solidFill>
-                  <a:schemeClr val="bg1">
-                    <a:lumMod val="75000"/>
-                  </a:schemeClr>
-                </a:solidFill>
-              </a:rPr>
-              <a:t>conteúdo em diferentes sessões, que podem conter elementos </a:t>
-            </a:r>
-            <a:r>
-              <a:rPr lang="pt-BR" dirty="0" smtClean="0">
-                <a:solidFill>
-                  <a:schemeClr val="bg1">
-                    <a:lumMod val="75000"/>
-                  </a:schemeClr>
-                </a:solidFill>
-              </a:rPr>
-              <a:t>como &lt;header</a:t>
-            </a:r>
-            <a:r>
-              <a:rPr lang="pt-BR" dirty="0" smtClean="0">
-                <a:solidFill>
-                  <a:schemeClr val="bg1">
-                    <a:lumMod val="75000"/>
-                  </a:schemeClr>
-                </a:solidFill>
-              </a:rPr>
-              <a:t>&gt; ou &lt;</a:t>
-            </a:r>
-            <a:r>
-              <a:rPr lang="pt-BR" dirty="0" err="1" smtClean="0">
-                <a:solidFill>
-                  <a:schemeClr val="bg1">
-                    <a:lumMod val="75000"/>
-                  </a:schemeClr>
-                </a:solidFill>
-              </a:rPr>
-              <a:t>article</a:t>
-            </a:r>
-            <a:r>
-              <a:rPr lang="pt-BR" dirty="0" smtClean="0">
-                <a:solidFill>
-                  <a:schemeClr val="bg1">
-                    <a:lumMod val="75000"/>
-                  </a:schemeClr>
-                </a:solidFill>
-              </a:rPr>
-              <a:t>&gt;, enquanto o segundo divide qualquer </a:t>
-            </a:r>
-            <a:r>
-              <a:rPr lang="pt-BR" dirty="0" smtClean="0">
-                <a:solidFill>
-                  <a:schemeClr val="bg1">
-                    <a:lumMod val="75000"/>
-                  </a:schemeClr>
-                </a:solidFill>
-              </a:rPr>
-              <a:t>conteúdo, sem </a:t>
-            </a:r>
-            <a:r>
-              <a:rPr lang="pt-BR" dirty="0" smtClean="0">
-                <a:solidFill>
-                  <a:schemeClr val="bg1">
-                    <a:lumMod val="75000"/>
-                  </a:schemeClr>
-                </a:solidFill>
-              </a:rPr>
-              <a:t>uma finalidade específica.</a:t>
+              <a:t>&gt;, enquanto o segundo divide qualquer conteúdo, sem uma finalidade específica.</a:t>
             </a:r>
             <a:endParaRPr lang="pt-BR" dirty="0">
               <a:solidFill>
@@ -11690,7 +11236,7 @@
     </p:spTree>
     <p:extLst>
       <p:ext uri="{BB962C8B-B14F-4D97-AF65-F5344CB8AC3E}">
-        <p14:creationId xmlns="" xmlns:p14="http://schemas.microsoft.com/office/powerpoint/2010/main" val="1156373279"/>
+        <p14:creationId xmlns:p14="http://schemas.microsoft.com/office/powerpoint/2010/main" val="1156373279"/>
       </p:ext>
     </p:extLst>
   </p:cSld>
@@ -11736,7 +11282,7 @@
           <a:blip r:embed="rId2" cstate="print">
             <a:extLst>
               <a:ext uri="{28A0092B-C50C-407E-A947-70E740481C1C}">
-                <a14:useLocalDpi xmlns="" xmlns:a14="http://schemas.microsoft.com/office/drawing/2010/main" val="0"/>
+                <a14:useLocalDpi xmlns:a14="http://schemas.microsoft.com/office/drawing/2010/main" val="0"/>
               </a:ext>
             </a:extLst>
           </a:blip>
@@ -11840,7 +11386,17 @@
                   </a:schemeClr>
                 </a:solidFill>
               </a:rPr>
-              <a:t>&gt; serve para identificar um conteúdo independente e de </a:t>
+              <a:t>&gt; serve para identificar um conteúdo independente e de maior relevância dentro da página, que pode ser </a:t>
+            </a:r>
+            <a:r>
+              <a:rPr lang="pt-BR" dirty="0" err="1" smtClean="0">
+                <a:solidFill>
+                  <a:schemeClr val="bg1">
+                    <a:lumMod val="75000"/>
+                  </a:schemeClr>
+                </a:solidFill>
+              </a:rPr>
+              <a:t>distribuido</a:t>
             </a:r>
             <a:r>
               <a:rPr lang="pt-BR" dirty="0" smtClean="0">
@@ -11850,7 +11406,17 @@
                   </a:schemeClr>
                 </a:solidFill>
               </a:rPr>
-              <a:t>maior relevância </a:t>
+              <a:t> via </a:t>
+            </a:r>
+            <a:r>
+              <a:rPr lang="pt-BR" dirty="0" err="1" smtClean="0">
+                <a:solidFill>
+                  <a:schemeClr val="bg1">
+                    <a:lumMod val="75000"/>
+                  </a:schemeClr>
+                </a:solidFill>
+              </a:rPr>
+              <a:t>feed</a:t>
             </a:r>
             <a:r>
               <a:rPr lang="pt-BR" dirty="0" smtClean="0">
@@ -11860,7 +11426,7 @@
                   </a:schemeClr>
                 </a:solidFill>
               </a:rPr>
-              <a:t>dentro da página, que pode ser </a:t>
+              <a:t>, como um </a:t>
             </a:r>
             <a:r>
               <a:rPr lang="pt-BR" dirty="0" err="1" smtClean="0">
@@ -11870,7 +11436,7 @@
                   </a:schemeClr>
                 </a:solidFill>
               </a:rPr>
-              <a:t>distribuido</a:t>
+              <a:t>post</a:t>
             </a:r>
             <a:r>
               <a:rPr lang="pt-BR" dirty="0" smtClean="0">
@@ -11880,7 +11446,7 @@
                   </a:schemeClr>
                 </a:solidFill>
               </a:rPr>
-              <a:t> via </a:t>
+              <a:t>, artigo ou bloco de comentários. O elemento &lt;</a:t>
             </a:r>
             <a:r>
               <a:rPr lang="pt-BR" dirty="0" err="1" smtClean="0">
@@ -11890,7 +11456,7 @@
                   </a:schemeClr>
                 </a:solidFill>
               </a:rPr>
-              <a:t>feed</a:t>
+              <a:t>article</a:t>
             </a:r>
             <a:r>
               <a:rPr lang="pt-BR" dirty="0" smtClean="0">
@@ -11900,97 +11466,7 @@
                   </a:schemeClr>
                 </a:solidFill>
               </a:rPr>
-              <a:t>, </a:t>
-            </a:r>
-            <a:r>
-              <a:rPr lang="pt-BR" dirty="0" smtClean="0">
-                <a:solidFill>
-                  <a:schemeClr val="bg1">
-                    <a:lumMod val="75000"/>
-                  </a:schemeClr>
-                </a:solidFill>
-              </a:rPr>
-              <a:t>como um </a:t>
-            </a:r>
-            <a:r>
-              <a:rPr lang="pt-BR" dirty="0" err="1" smtClean="0">
-                <a:solidFill>
-                  <a:schemeClr val="bg1">
-                    <a:lumMod val="75000"/>
-                  </a:schemeClr>
-                </a:solidFill>
-              </a:rPr>
-              <a:t>post</a:t>
-            </a:r>
-            <a:r>
-              <a:rPr lang="pt-BR" dirty="0" smtClean="0">
-                <a:solidFill>
-                  <a:schemeClr val="bg1">
-                    <a:lumMod val="75000"/>
-                  </a:schemeClr>
-                </a:solidFill>
-              </a:rPr>
-              <a:t>, artigo ou bloco de </a:t>
-            </a:r>
-            <a:r>
-              <a:rPr lang="pt-BR" dirty="0" smtClean="0">
-                <a:solidFill>
-                  <a:schemeClr val="bg1">
-                    <a:lumMod val="75000"/>
-                  </a:schemeClr>
-                </a:solidFill>
-              </a:rPr>
-              <a:t>comentários</a:t>
-            </a:r>
-            <a:r>
-              <a:rPr lang="pt-BR" dirty="0" smtClean="0">
-                <a:solidFill>
-                  <a:schemeClr val="bg1">
-                    <a:lumMod val="75000"/>
-                  </a:schemeClr>
-                </a:solidFill>
-              </a:rPr>
-              <a:t>. O elemento &lt;</a:t>
-            </a:r>
-            <a:r>
-              <a:rPr lang="pt-BR" dirty="0" err="1" smtClean="0">
-                <a:solidFill>
-                  <a:schemeClr val="bg1">
-                    <a:lumMod val="75000"/>
-                  </a:schemeClr>
-                </a:solidFill>
-              </a:rPr>
-              <a:t>article</a:t>
-            </a:r>
-            <a:r>
-              <a:rPr lang="pt-BR" dirty="0" smtClean="0">
-                <a:solidFill>
-                  <a:schemeClr val="bg1">
-                    <a:lumMod val="75000"/>
-                  </a:schemeClr>
-                </a:solidFill>
-              </a:rPr>
-              <a:t>&gt; pode </a:t>
-            </a:r>
-            <a:r>
-              <a:rPr lang="pt-BR" dirty="0" smtClean="0">
-                <a:solidFill>
-                  <a:schemeClr val="bg1">
-                    <a:lumMod val="75000"/>
-                  </a:schemeClr>
-                </a:solidFill>
-              </a:rPr>
-              <a:t>conter outros </a:t>
-            </a:r>
-            <a:r>
-              <a:rPr lang="pt-BR" dirty="0" smtClean="0">
-                <a:solidFill>
-                  <a:schemeClr val="bg1">
-                    <a:lumMod val="75000"/>
-                  </a:schemeClr>
-                </a:solidFill>
-              </a:rPr>
-              <a:t>elementos como &lt;header&gt; ou &lt;</a:t>
+              <a:t>&gt; pode conter outros elementos como &lt;header&gt; ou &lt;</a:t>
             </a:r>
             <a:r>
               <a:rPr lang="pt-BR" dirty="0" err="1" smtClean="0">
@@ -12025,7 +11501,7 @@
     </p:spTree>
     <p:extLst>
       <p:ext uri="{BB962C8B-B14F-4D97-AF65-F5344CB8AC3E}">
-        <p14:creationId xmlns="" xmlns:p14="http://schemas.microsoft.com/office/powerpoint/2010/main" val="1156373279"/>
+        <p14:creationId xmlns:p14="http://schemas.microsoft.com/office/powerpoint/2010/main" val="1156373279"/>
       </p:ext>
     </p:extLst>
   </p:cSld>
@@ -12071,7 +11547,7 @@
           <a:blip r:embed="rId2" cstate="print">
             <a:extLst>
               <a:ext uri="{28A0092B-C50C-407E-A947-70E740481C1C}">
-                <a14:useLocalDpi xmlns="" xmlns:a14="http://schemas.microsoft.com/office/drawing/2010/main" val="0"/>
+                <a14:useLocalDpi xmlns:a14="http://schemas.microsoft.com/office/drawing/2010/main" val="0"/>
               </a:ext>
             </a:extLst>
           </a:blip>
@@ -12175,47 +11651,7 @@
                   </a:schemeClr>
                 </a:solidFill>
               </a:rPr>
-              <a:t>&gt; serve para mostrar conteúdos que fazem referência </a:t>
-            </a:r>
-            <a:r>
-              <a:rPr lang="pt-BR" dirty="0" smtClean="0">
-                <a:solidFill>
-                  <a:schemeClr val="bg1">
-                    <a:lumMod val="75000"/>
-                  </a:schemeClr>
-                </a:solidFill>
-              </a:rPr>
-              <a:t>ao conteúdo </a:t>
-            </a:r>
-            <a:r>
-              <a:rPr lang="pt-BR" dirty="0" smtClean="0">
-                <a:solidFill>
-                  <a:schemeClr val="bg1">
-                    <a:lumMod val="75000"/>
-                  </a:schemeClr>
-                </a:solidFill>
-              </a:rPr>
-              <a:t>principal à sua volta, como informações, blocos </a:t>
-            </a:r>
-            <a:r>
-              <a:rPr lang="pt-BR" dirty="0" smtClean="0">
-                <a:solidFill>
-                  <a:schemeClr val="bg1">
-                    <a:lumMod val="75000"/>
-                  </a:schemeClr>
-                </a:solidFill>
-              </a:rPr>
-              <a:t>de navegação </a:t>
-            </a:r>
-            <a:r>
-              <a:rPr lang="pt-BR" dirty="0" smtClean="0">
-                <a:solidFill>
-                  <a:schemeClr val="bg1">
-                    <a:lumMod val="75000"/>
-                  </a:schemeClr>
-                </a:solidFill>
-              </a:rPr>
-              <a:t>ou até mesmo publicidade.</a:t>
+              <a:t>&gt; serve para mostrar conteúdos que fazem referência ao conteúdo principal à sua volta, como informações, blocos de navegação ou até mesmo publicidade.</a:t>
             </a:r>
             <a:endParaRPr lang="pt-BR" dirty="0">
               <a:solidFill>
@@ -12230,7 +11666,7 @@
     </p:spTree>
     <p:extLst>
       <p:ext uri="{BB962C8B-B14F-4D97-AF65-F5344CB8AC3E}">
-        <p14:creationId xmlns="" xmlns:p14="http://schemas.microsoft.com/office/powerpoint/2010/main" val="1156373279"/>
+        <p14:creationId xmlns:p14="http://schemas.microsoft.com/office/powerpoint/2010/main" val="1156373279"/>
       </p:ext>
     </p:extLst>
   </p:cSld>
@@ -12276,7 +11712,7 @@
           <a:blip r:embed="rId2" cstate="print">
             <a:extLst>
               <a:ext uri="{28A0092B-C50C-407E-A947-70E740481C1C}">
-                <a14:useLocalDpi xmlns="" xmlns:a14="http://schemas.microsoft.com/office/drawing/2010/main" val="0"/>
+                <a14:useLocalDpi xmlns:a14="http://schemas.microsoft.com/office/drawing/2010/main" val="0"/>
               </a:ext>
             </a:extLst>
           </a:blip>
@@ -12380,47 +11816,7 @@
                   </a:schemeClr>
                 </a:solidFill>
               </a:rPr>
-              <a:t>&gt; representa o rodapé de um documento ou de uma </a:t>
-            </a:r>
-            <a:r>
-              <a:rPr lang="pt-BR" dirty="0" smtClean="0">
-                <a:solidFill>
-                  <a:schemeClr val="bg1">
-                    <a:lumMod val="75000"/>
-                  </a:schemeClr>
-                </a:solidFill>
-              </a:rPr>
-              <a:t>sessão específica </a:t>
-            </a:r>
-            <a:r>
-              <a:rPr lang="pt-BR" dirty="0" smtClean="0">
-                <a:solidFill>
-                  <a:schemeClr val="bg1">
-                    <a:lumMod val="75000"/>
-                  </a:schemeClr>
-                </a:solidFill>
-              </a:rPr>
-              <a:t>do mesmo, podendo conter informações relacionadas </a:t>
-            </a:r>
-            <a:r>
-              <a:rPr lang="pt-BR" dirty="0" smtClean="0">
-                <a:solidFill>
-                  <a:schemeClr val="bg1">
-                    <a:lumMod val="75000"/>
-                  </a:schemeClr>
-                </a:solidFill>
-              </a:rPr>
-              <a:t>ao autor </a:t>
-            </a:r>
-            <a:r>
-              <a:rPr lang="pt-BR" dirty="0" smtClean="0">
-                <a:solidFill>
-                  <a:schemeClr val="bg1">
-                    <a:lumMod val="75000"/>
-                  </a:schemeClr>
-                </a:solidFill>
-              </a:rPr>
-              <a:t>e ao copyright, blocos de navegação ou links relacionados.</a:t>
+              <a:t>&gt; representa o rodapé de um documento ou de uma sessão específica do mesmo, podendo conter informações relacionadas ao autor e ao copyright, blocos de navegação ou links relacionados.</a:t>
             </a:r>
             <a:endParaRPr lang="pt-BR" dirty="0">
               <a:solidFill>
@@ -12435,7 +11831,7 @@
     </p:spTree>
     <p:extLst>
       <p:ext uri="{BB962C8B-B14F-4D97-AF65-F5344CB8AC3E}">
-        <p14:creationId xmlns="" xmlns:p14="http://schemas.microsoft.com/office/powerpoint/2010/main" val="1156373279"/>
+        <p14:creationId xmlns:p14="http://schemas.microsoft.com/office/powerpoint/2010/main" val="1156373279"/>
       </p:ext>
     </p:extLst>
   </p:cSld>
@@ -12481,7 +11877,7 @@
           <a:blip r:embed="rId2" cstate="print">
             <a:extLst>
               <a:ext uri="{28A0092B-C50C-407E-A947-70E740481C1C}">
-                <a14:useLocalDpi xmlns="" xmlns:a14="http://schemas.microsoft.com/office/drawing/2010/main" val="0"/>
+                <a14:useLocalDpi xmlns:a14="http://schemas.microsoft.com/office/drawing/2010/main" val="0"/>
               </a:ext>
             </a:extLst>
           </a:blip>
@@ -12520,23 +11916,7 @@
                   <a:srgbClr val="AEC908"/>
                 </a:solidFill>
               </a:rPr>
-              <a:t>HTML4</a:t>
-            </a:r>
-            <a:r>
-              <a:rPr lang="pt-BR" dirty="0" smtClean="0">
-                <a:solidFill>
-                  <a:srgbClr val="AEC908"/>
-                </a:solidFill>
-              </a:rPr>
-              <a:t> </a:t>
-            </a:r>
-            <a:r>
-              <a:rPr lang="pt-BR" dirty="0" smtClean="0">
-                <a:solidFill>
-                  <a:srgbClr val="AEC908"/>
-                </a:solidFill>
-              </a:rPr>
-              <a:t>- velha estrutura</a:t>
+              <a:t>HTML4 - velha estrutura</a:t>
             </a:r>
             <a:endParaRPr lang="pt-BR" dirty="0"/>
           </a:p>
@@ -12577,7 +11957,7 @@
     </p:spTree>
     <p:extLst>
       <p:ext uri="{BB962C8B-B14F-4D97-AF65-F5344CB8AC3E}">
-        <p14:creationId xmlns="" xmlns:p14="http://schemas.microsoft.com/office/powerpoint/2010/main" val="1156373279"/>
+        <p14:creationId xmlns:p14="http://schemas.microsoft.com/office/powerpoint/2010/main" val="1156373279"/>
       </p:ext>
     </p:extLst>
   </p:cSld>
@@ -12623,7 +12003,7 @@
           <a:blip r:embed="rId2" cstate="print">
             <a:extLst>
               <a:ext uri="{28A0092B-C50C-407E-A947-70E740481C1C}">
-                <a14:useLocalDpi xmlns="" xmlns:a14="http://schemas.microsoft.com/office/drawing/2010/main" val="0"/>
+                <a14:useLocalDpi xmlns:a14="http://schemas.microsoft.com/office/drawing/2010/main" val="0"/>
               </a:ext>
             </a:extLst>
           </a:blip>
@@ -12703,7 +12083,7 @@
     </p:spTree>
     <p:extLst>
       <p:ext uri="{BB962C8B-B14F-4D97-AF65-F5344CB8AC3E}">
-        <p14:creationId xmlns="" xmlns:p14="http://schemas.microsoft.com/office/powerpoint/2010/main" val="1156373279"/>
+        <p14:creationId xmlns:p14="http://schemas.microsoft.com/office/powerpoint/2010/main" val="1156373279"/>
       </p:ext>
     </p:extLst>
   </p:cSld>
@@ -12749,7 +12129,7 @@
           <a:blip r:embed="rId2" cstate="print">
             <a:extLst>
               <a:ext uri="{28A0092B-C50C-407E-A947-70E740481C1C}">
-                <a14:useLocalDpi xmlns="" xmlns:a14="http://schemas.microsoft.com/office/drawing/2010/main" val="0"/>
+                <a14:useLocalDpi xmlns:a14="http://schemas.microsoft.com/office/drawing/2010/main" val="0"/>
               </a:ext>
             </a:extLst>
           </a:blip>
@@ -12835,17 +12215,7 @@
                   </a:schemeClr>
                 </a:solidFill>
               </a:rPr>
-              <a:t>N</a:t>
-            </a:r>
-            <a:r>
-              <a:rPr lang="pt-BR" dirty="0" err="1" smtClean="0">
-                <a:solidFill>
-                  <a:schemeClr val="bg1">
-                    <a:lumMod val="75000"/>
-                  </a:schemeClr>
-                </a:solidFill>
-              </a:rPr>
-              <a:t>etbeans</a:t>
+              <a:t>Netbeans</a:t>
             </a:r>
             <a:r>
               <a:rPr lang="pt-BR" dirty="0" smtClean="0">
@@ -12875,7 +12245,7 @@
     </p:spTree>
     <p:extLst>
       <p:ext uri="{BB962C8B-B14F-4D97-AF65-F5344CB8AC3E}">
-        <p14:creationId xmlns="" xmlns:p14="http://schemas.microsoft.com/office/powerpoint/2010/main" val="1156373279"/>
+        <p14:creationId xmlns:p14="http://schemas.microsoft.com/office/powerpoint/2010/main" val="1156373279"/>
       </p:ext>
     </p:extLst>
   </p:cSld>
@@ -12921,7 +12291,7 @@
           <a:blip r:embed="rId2" cstate="print">
             <a:extLst>
               <a:ext uri="{28A0092B-C50C-407E-A947-70E740481C1C}">
-                <a14:useLocalDpi xmlns="" xmlns:a14="http://schemas.microsoft.com/office/drawing/2010/main" val="0"/>
+                <a14:useLocalDpi xmlns:a14="http://schemas.microsoft.com/office/drawing/2010/main" val="0"/>
               </a:ext>
             </a:extLst>
           </a:blip>
@@ -13025,7 +12395,7 @@
           <a:blip r:embed="rId3" cstate="print">
             <a:extLst>
               <a:ext uri="{28A0092B-C50C-407E-A947-70E740481C1C}">
-                <a14:useLocalDpi xmlns="" xmlns:a14="http://schemas.microsoft.com/office/drawing/2010/main" val="0"/>
+                <a14:useLocalDpi xmlns:a14="http://schemas.microsoft.com/office/drawing/2010/main" val="0"/>
               </a:ext>
             </a:extLst>
           </a:blip>
@@ -13036,8 +12406,8 @@
         </p:blipFill>
         <p:spPr bwMode="auto">
           <a:xfrm>
-            <a:off x="1259632" y="2852936"/>
-            <a:ext cx="7021323" cy="1892424"/>
+            <a:off x="716347" y="2852936"/>
+            <a:ext cx="7747815" cy="2088232"/>
           </a:xfrm>
           <a:prstGeom prst="rect">
             <a:avLst/>
@@ -13049,14 +12419,14 @@
           <a:effectLst/>
           <a:extLst>
             <a:ext uri="{909E8E84-426E-40DD-AFC4-6F175D3DCCD1}">
-              <a14:hiddenFill xmlns="" xmlns:a14="http://schemas.microsoft.com/office/drawing/2010/main">
+              <a14:hiddenFill xmlns:a14="http://schemas.microsoft.com/office/drawing/2010/main">
                 <a:solidFill>
                   <a:schemeClr val="accent1"/>
                 </a:solidFill>
               </a14:hiddenFill>
             </a:ext>
             <a:ext uri="{91240B29-F687-4F45-9708-019B960494DF}">
-              <a14:hiddenLine xmlns="" xmlns:a14="http://schemas.microsoft.com/office/drawing/2010/main" w="9525">
+              <a14:hiddenLine xmlns:a14="http://schemas.microsoft.com/office/drawing/2010/main" w="9525">
                 <a:solidFill>
                   <a:schemeClr val="tx1"/>
                 </a:solidFill>
@@ -13066,7 +12436,7 @@
               </a14:hiddenLine>
             </a:ext>
             <a:ext uri="{AF507438-7753-43E0-B8FC-AC1667EBCBE1}">
-              <a14:hiddenEffects xmlns="" xmlns:a14="http://schemas.microsoft.com/office/drawing/2010/main">
+              <a14:hiddenEffects xmlns:a14="http://schemas.microsoft.com/office/drawing/2010/main">
                 <a:effectLst>
                   <a:outerShdw dist="35921" dir="2700000" algn="ctr" rotWithShape="0">
                     <a:schemeClr val="bg2"/>
@@ -13080,7 +12450,7 @@
     </p:spTree>
     <p:extLst>
       <p:ext uri="{BB962C8B-B14F-4D97-AF65-F5344CB8AC3E}">
-        <p14:creationId xmlns="" xmlns:p14="http://schemas.microsoft.com/office/powerpoint/2010/main" val="4060812770"/>
+        <p14:creationId xmlns:p14="http://schemas.microsoft.com/office/powerpoint/2010/main" val="4060812770"/>
       </p:ext>
     </p:extLst>
   </p:cSld>
@@ -13126,7 +12496,7 @@
           <a:blip r:embed="rId2" cstate="print">
             <a:extLst>
               <a:ext uri="{28A0092B-C50C-407E-A947-70E740481C1C}">
-                <a14:useLocalDpi xmlns="" xmlns:a14="http://schemas.microsoft.com/office/drawing/2010/main" val="0"/>
+                <a14:useLocalDpi xmlns:a14="http://schemas.microsoft.com/office/drawing/2010/main" val="0"/>
               </a:ext>
             </a:extLst>
           </a:blip>
@@ -13343,7 +12713,7 @@
     </p:spTree>
     <p:extLst>
       <p:ext uri="{BB962C8B-B14F-4D97-AF65-F5344CB8AC3E}">
-        <p14:creationId xmlns="" xmlns:p14="http://schemas.microsoft.com/office/powerpoint/2010/main" val="1156373279"/>
+        <p14:creationId xmlns:p14="http://schemas.microsoft.com/office/powerpoint/2010/main" val="1156373279"/>
       </p:ext>
     </p:extLst>
   </p:cSld>
@@ -13389,7 +12759,7 @@
           <a:blip r:embed="rId2" cstate="print">
             <a:extLst>
               <a:ext uri="{28A0092B-C50C-407E-A947-70E740481C1C}">
-                <a14:useLocalDpi xmlns="" xmlns:a14="http://schemas.microsoft.com/office/drawing/2010/main" val="0"/>
+                <a14:useLocalDpi xmlns:a14="http://schemas.microsoft.com/office/drawing/2010/main" val="0"/>
               </a:ext>
             </a:extLst>
           </a:blip>
@@ -13455,7 +12825,7 @@
         <p:spPr/>
         <p:txBody>
           <a:bodyPr>
-            <a:normAutofit fontScale="92500" lnSpcReduction="20000"/>
+            <a:normAutofit fontScale="77500" lnSpcReduction="20000"/>
           </a:bodyPr>
           <a:lstStyle/>
           <a:p>
@@ -13467,7 +12837,48 @@
                   </a:schemeClr>
                 </a:solidFill>
               </a:rPr>
-              <a:t>http://</a:t>
+              <a:t>http://thejakegroup.com/blog/search-engine-optimization</a:t>
+            </a:r>
+            <a:r>
+              <a:rPr lang="pt-BR" dirty="0" smtClean="0">
+                <a:solidFill>
+                  <a:schemeClr val="bg1">
+                    <a:lumMod val="85000"/>
+                  </a:schemeClr>
+                </a:solidFill>
+              </a:rPr>
+              <a:t>/</a:t>
+            </a:r>
+          </a:p>
+          <a:p>
+            <a:endParaRPr lang="pt-BR" dirty="0">
+              <a:solidFill>
+                <a:schemeClr val="bg1">
+                  <a:lumMod val="85000"/>
+                </a:schemeClr>
+              </a:solidFill>
+            </a:endParaRPr>
+          </a:p>
+          <a:p>
+            <a:r>
+              <a:rPr lang="pt-BR" dirty="0" smtClean="0">
+                <a:solidFill>
+                  <a:schemeClr val="bg1">
+                    <a:lumMod val="85000"/>
+                  </a:schemeClr>
+                </a:solidFill>
+              </a:rPr>
+              <a:t>http</a:t>
+            </a:r>
+            <a:r>
+              <a:rPr lang="pt-BR" dirty="0">
+                <a:solidFill>
+                  <a:schemeClr val="bg1">
+                    <a:lumMod val="85000"/>
+                  </a:schemeClr>
+                </a:solidFill>
+              </a:rPr>
+              <a:t>://</a:t>
             </a:r>
             <a:r>
               <a:rPr lang="pt-BR" dirty="0" smtClean="0">
@@ -13498,17 +12909,7 @@
                   </a:schemeClr>
                 </a:solidFill>
               </a:rPr>
-              <a:t>http://tableless.com.br/afinal-o-que-muda-com-o-html-5</a:t>
-            </a:r>
-            <a:r>
-              <a:rPr lang="pt-BR" dirty="0" smtClean="0">
-                <a:solidFill>
-                  <a:schemeClr val="bg1">
-                    <a:lumMod val="85000"/>
-                  </a:schemeClr>
-                </a:solidFill>
-              </a:rPr>
-              <a:t>/</a:t>
+              <a:t>http://tableless.com.br/afinal-o-que-muda-com-o-html-5/</a:t>
             </a:r>
           </a:p>
           <a:p>
@@ -13529,17 +12930,7 @@
                   </a:schemeClr>
                 </a:solidFill>
               </a:rPr>
-              <a:t>http://www.uxdesign.blog.br/arquitetura-de-informacao/html-outline</a:t>
-            </a:r>
-            <a:r>
-              <a:rPr lang="pt-BR" dirty="0" smtClean="0">
-                <a:solidFill>
-                  <a:schemeClr val="bg1">
-                    <a:lumMod val="85000"/>
-                  </a:schemeClr>
-                </a:solidFill>
-              </a:rPr>
-              <a:t>/</a:t>
+              <a:t>http://www.uxdesign.blog.br/arquitetura-de-informacao/html-outline/</a:t>
             </a:r>
           </a:p>
           <a:p>
@@ -13575,7 +12966,7 @@
     </p:spTree>
     <p:extLst>
       <p:ext uri="{BB962C8B-B14F-4D97-AF65-F5344CB8AC3E}">
-        <p14:creationId xmlns="" xmlns:p14="http://schemas.microsoft.com/office/powerpoint/2010/main" val="1981461259"/>
+        <p14:creationId xmlns:p14="http://schemas.microsoft.com/office/powerpoint/2010/main" val="1981461259"/>
       </p:ext>
     </p:extLst>
   </p:cSld>
@@ -13621,7 +13012,7 @@
           <a:blip r:embed="rId2" cstate="print">
             <a:extLst>
               <a:ext uri="{28A0092B-C50C-407E-A947-70E740481C1C}">
-                <a14:useLocalDpi xmlns="" xmlns:a14="http://schemas.microsoft.com/office/drawing/2010/main" val="0"/>
+                <a14:useLocalDpi xmlns:a14="http://schemas.microsoft.com/office/drawing/2010/main" val="0"/>
               </a:ext>
             </a:extLst>
           </a:blip>
@@ -13789,7 +13180,7 @@
     </p:spTree>
     <p:extLst>
       <p:ext uri="{BB962C8B-B14F-4D97-AF65-F5344CB8AC3E}">
-        <p14:creationId xmlns="" xmlns:p14="http://schemas.microsoft.com/office/powerpoint/2010/main" val="1156373279"/>
+        <p14:creationId xmlns:p14="http://schemas.microsoft.com/office/powerpoint/2010/main" val="1156373279"/>
       </p:ext>
     </p:extLst>
   </p:cSld>
@@ -13835,7 +13226,7 @@
           <a:blip r:embed="rId2" cstate="print">
             <a:extLst>
               <a:ext uri="{28A0092B-C50C-407E-A947-70E740481C1C}">
-                <a14:useLocalDpi xmlns="" xmlns:a14="http://schemas.microsoft.com/office/drawing/2010/main" val="0"/>
+                <a14:useLocalDpi xmlns:a14="http://schemas.microsoft.com/office/drawing/2010/main" val="0"/>
               </a:ext>
             </a:extLst>
           </a:blip>
@@ -13975,7 +13366,7 @@
     </p:spTree>
     <p:extLst>
       <p:ext uri="{BB962C8B-B14F-4D97-AF65-F5344CB8AC3E}">
-        <p14:creationId xmlns="" xmlns:p14="http://schemas.microsoft.com/office/powerpoint/2010/main" val="4060812770"/>
+        <p14:creationId xmlns:p14="http://schemas.microsoft.com/office/powerpoint/2010/main" val="4060812770"/>
       </p:ext>
     </p:extLst>
   </p:cSld>
@@ -14021,7 +13412,7 @@
           <a:blip r:embed="rId2" cstate="print">
             <a:extLst>
               <a:ext uri="{28A0092B-C50C-407E-A947-70E740481C1C}">
-                <a14:useLocalDpi xmlns="" xmlns:a14="http://schemas.microsoft.com/office/drawing/2010/main" val="0"/>
+                <a14:useLocalDpi xmlns:a14="http://schemas.microsoft.com/office/drawing/2010/main" val="0"/>
               </a:ext>
             </a:extLst>
           </a:blip>
@@ -14159,7 +13550,7 @@
     </p:spTree>
     <p:extLst>
       <p:ext uri="{BB962C8B-B14F-4D97-AF65-F5344CB8AC3E}">
-        <p14:creationId xmlns="" xmlns:p14="http://schemas.microsoft.com/office/powerpoint/2010/main" val="4060812770"/>
+        <p14:creationId xmlns:p14="http://schemas.microsoft.com/office/powerpoint/2010/main" val="4060812770"/>
       </p:ext>
     </p:extLst>
   </p:cSld>
@@ -14205,7 +13596,7 @@
           <a:blip r:embed="rId2" cstate="print">
             <a:extLst>
               <a:ext uri="{28A0092B-C50C-407E-A947-70E740481C1C}">
-                <a14:useLocalDpi xmlns="" xmlns:a14="http://schemas.microsoft.com/office/drawing/2010/main" val="0"/>
+                <a14:useLocalDpi xmlns:a14="http://schemas.microsoft.com/office/drawing/2010/main" val="0"/>
               </a:ext>
             </a:extLst>
           </a:blip>
@@ -14339,7 +13730,7 @@
           <a:blip r:embed="rId3" cstate="print">
             <a:extLst>
               <a:ext uri="{28A0092B-C50C-407E-A947-70E740481C1C}">
-                <a14:useLocalDpi xmlns="" xmlns:a14="http://schemas.microsoft.com/office/drawing/2010/main" val="0"/>
+                <a14:useLocalDpi xmlns:a14="http://schemas.microsoft.com/office/drawing/2010/main" val="0"/>
               </a:ext>
             </a:extLst>
           </a:blip>
@@ -14363,14 +13754,14 @@
           <a:effectLst/>
           <a:extLst>
             <a:ext uri="{909E8E84-426E-40DD-AFC4-6F175D3DCCD1}">
-              <a14:hiddenFill xmlns="" xmlns:a14="http://schemas.microsoft.com/office/drawing/2010/main">
+              <a14:hiddenFill xmlns:a14="http://schemas.microsoft.com/office/drawing/2010/main">
                 <a:solidFill>
                   <a:schemeClr val="accent1"/>
                 </a:solidFill>
               </a14:hiddenFill>
             </a:ext>
             <a:ext uri="{91240B29-F687-4F45-9708-019B960494DF}">
-              <a14:hiddenLine xmlns="" xmlns:a14="http://schemas.microsoft.com/office/drawing/2010/main" w="9525">
+              <a14:hiddenLine xmlns:a14="http://schemas.microsoft.com/office/drawing/2010/main" w="9525">
                 <a:solidFill>
                   <a:schemeClr val="tx1"/>
                 </a:solidFill>
@@ -14380,7 +13771,7 @@
               </a14:hiddenLine>
             </a:ext>
             <a:ext uri="{AF507438-7753-43E0-B8FC-AC1667EBCBE1}">
-              <a14:hiddenEffects xmlns="" xmlns:a14="http://schemas.microsoft.com/office/drawing/2010/main">
+              <a14:hiddenEffects xmlns:a14="http://schemas.microsoft.com/office/drawing/2010/main">
                 <a:effectLst>
                   <a:outerShdw dist="35921" dir="2700000" algn="ctr" rotWithShape="0">
                     <a:schemeClr val="bg2"/>
@@ -14403,7 +13794,7 @@
           <a:blip r:embed="rId4" cstate="print">
             <a:extLst>
               <a:ext uri="{28A0092B-C50C-407E-A947-70E740481C1C}">
-                <a14:useLocalDpi xmlns="" xmlns:a14="http://schemas.microsoft.com/office/drawing/2010/main" val="0"/>
+                <a14:useLocalDpi xmlns:a14="http://schemas.microsoft.com/office/drawing/2010/main" val="0"/>
               </a:ext>
             </a:extLst>
           </a:blip>
@@ -14427,14 +13818,14 @@
           <a:effectLst/>
           <a:extLst>
             <a:ext uri="{909E8E84-426E-40DD-AFC4-6F175D3DCCD1}">
-              <a14:hiddenFill xmlns="" xmlns:a14="http://schemas.microsoft.com/office/drawing/2010/main">
+              <a14:hiddenFill xmlns:a14="http://schemas.microsoft.com/office/drawing/2010/main">
                 <a:solidFill>
                   <a:schemeClr val="accent1"/>
                 </a:solidFill>
               </a14:hiddenFill>
             </a:ext>
             <a:ext uri="{91240B29-F687-4F45-9708-019B960494DF}">
-              <a14:hiddenLine xmlns="" xmlns:a14="http://schemas.microsoft.com/office/drawing/2010/main" w="9525">
+              <a14:hiddenLine xmlns:a14="http://schemas.microsoft.com/office/drawing/2010/main" w="9525">
                 <a:solidFill>
                   <a:schemeClr val="tx1"/>
                 </a:solidFill>
@@ -14444,7 +13835,7 @@
               </a14:hiddenLine>
             </a:ext>
             <a:ext uri="{AF507438-7753-43E0-B8FC-AC1667EBCBE1}">
-              <a14:hiddenEffects xmlns="" xmlns:a14="http://schemas.microsoft.com/office/drawing/2010/main">
+              <a14:hiddenEffects xmlns:a14="http://schemas.microsoft.com/office/drawing/2010/main">
                 <a:effectLst>
                   <a:outerShdw dist="35921" dir="2700000" algn="ctr" rotWithShape="0">
                     <a:schemeClr val="bg2"/>
@@ -14458,7 +13849,7 @@
     </p:spTree>
     <p:extLst>
       <p:ext uri="{BB962C8B-B14F-4D97-AF65-F5344CB8AC3E}">
-        <p14:creationId xmlns="" xmlns:p14="http://schemas.microsoft.com/office/powerpoint/2010/main" val="4060812770"/>
+        <p14:creationId xmlns:p14="http://schemas.microsoft.com/office/powerpoint/2010/main" val="4060812770"/>
       </p:ext>
     </p:extLst>
   </p:cSld>
@@ -14504,7 +13895,7 @@
           <a:blip r:embed="rId2" cstate="print">
             <a:extLst>
               <a:ext uri="{28A0092B-C50C-407E-A947-70E740481C1C}">
-                <a14:useLocalDpi xmlns="" xmlns:a14="http://schemas.microsoft.com/office/drawing/2010/main" val="0"/>
+                <a14:useLocalDpi xmlns:a14="http://schemas.microsoft.com/office/drawing/2010/main" val="0"/>
               </a:ext>
             </a:extLst>
           </a:blip>
@@ -14641,7 +14032,7 @@
           <a:blip r:embed="rId3" cstate="print">
             <a:extLst>
               <a:ext uri="{28A0092B-C50C-407E-A947-70E740481C1C}">
-                <a14:useLocalDpi xmlns="" xmlns:a14="http://schemas.microsoft.com/office/drawing/2010/main" val="0"/>
+                <a14:useLocalDpi xmlns:a14="http://schemas.microsoft.com/office/drawing/2010/main" val="0"/>
               </a:ext>
             </a:extLst>
           </a:blip>
@@ -14665,14 +14056,14 @@
           <a:effectLst/>
           <a:extLst>
             <a:ext uri="{909E8E84-426E-40DD-AFC4-6F175D3DCCD1}">
-              <a14:hiddenFill xmlns="" xmlns:a14="http://schemas.microsoft.com/office/drawing/2010/main">
+              <a14:hiddenFill xmlns:a14="http://schemas.microsoft.com/office/drawing/2010/main">
                 <a:solidFill>
                   <a:schemeClr val="accent1"/>
                 </a:solidFill>
               </a14:hiddenFill>
             </a:ext>
             <a:ext uri="{91240B29-F687-4F45-9708-019B960494DF}">
-              <a14:hiddenLine xmlns="" xmlns:a14="http://schemas.microsoft.com/office/drawing/2010/main" w="9525">
+              <a14:hiddenLine xmlns:a14="http://schemas.microsoft.com/office/drawing/2010/main" w="9525">
                 <a:solidFill>
                   <a:schemeClr val="tx1"/>
                 </a:solidFill>
@@ -14682,7 +14073,7 @@
               </a14:hiddenLine>
             </a:ext>
             <a:ext uri="{AF507438-7753-43E0-B8FC-AC1667EBCBE1}">
-              <a14:hiddenEffects xmlns="" xmlns:a14="http://schemas.microsoft.com/office/drawing/2010/main">
+              <a14:hiddenEffects xmlns:a14="http://schemas.microsoft.com/office/drawing/2010/main">
                 <a:effectLst>
                   <a:outerShdw dist="35921" dir="2700000" algn="ctr" rotWithShape="0">
                     <a:schemeClr val="bg2"/>
@@ -14705,7 +14096,7 @@
           <a:blip r:embed="rId4" cstate="print">
             <a:extLst>
               <a:ext uri="{28A0092B-C50C-407E-A947-70E740481C1C}">
-                <a14:useLocalDpi xmlns="" xmlns:a14="http://schemas.microsoft.com/office/drawing/2010/main" val="0"/>
+                <a14:useLocalDpi xmlns:a14="http://schemas.microsoft.com/office/drawing/2010/main" val="0"/>
               </a:ext>
             </a:extLst>
           </a:blip>
@@ -14729,14 +14120,14 @@
           <a:effectLst/>
           <a:extLst>
             <a:ext uri="{909E8E84-426E-40DD-AFC4-6F175D3DCCD1}">
-              <a14:hiddenFill xmlns="" xmlns:a14="http://schemas.microsoft.com/office/drawing/2010/main">
+              <a14:hiddenFill xmlns:a14="http://schemas.microsoft.com/office/drawing/2010/main">
                 <a:solidFill>
                   <a:schemeClr val="accent1"/>
                 </a:solidFill>
               </a14:hiddenFill>
             </a:ext>
             <a:ext uri="{91240B29-F687-4F45-9708-019B960494DF}">
-              <a14:hiddenLine xmlns="" xmlns:a14="http://schemas.microsoft.com/office/drawing/2010/main" w="9525">
+              <a14:hiddenLine xmlns:a14="http://schemas.microsoft.com/office/drawing/2010/main" w="9525">
                 <a:solidFill>
                   <a:schemeClr val="tx1"/>
                 </a:solidFill>
@@ -14746,7 +14137,7 @@
               </a14:hiddenLine>
             </a:ext>
             <a:ext uri="{AF507438-7753-43E0-B8FC-AC1667EBCBE1}">
-              <a14:hiddenEffects xmlns="" xmlns:a14="http://schemas.microsoft.com/office/drawing/2010/main">
+              <a14:hiddenEffects xmlns:a14="http://schemas.microsoft.com/office/drawing/2010/main">
                 <a:effectLst>
                   <a:outerShdw dist="35921" dir="2700000" algn="ctr" rotWithShape="0">
                     <a:schemeClr val="bg2"/>
@@ -14760,7 +14151,7 @@
     </p:spTree>
     <p:extLst>
       <p:ext uri="{BB962C8B-B14F-4D97-AF65-F5344CB8AC3E}">
-        <p14:creationId xmlns="" xmlns:p14="http://schemas.microsoft.com/office/powerpoint/2010/main" val="4060812770"/>
+        <p14:creationId xmlns:p14="http://schemas.microsoft.com/office/powerpoint/2010/main" val="4060812770"/>
       </p:ext>
     </p:extLst>
   </p:cSld>

</xml_diff>